<commit_message>
fixed revisi, otw yudisium
</commit_message>
<xml_diff>
--- a/YUDISIUM/05111540000007-Faiq-Presentasi_TA.pptx
+++ b/YUDISIUM/05111540000007-Faiq-Presentasi_TA.pptx
@@ -2363,686 +2363,6 @@
       <dsp:cNvGrpSpPr/>
     </dsp:nvGrpSpPr>
     <dsp:grpSpPr/>
-    <dsp:sp modelId="{40AD3799-C167-4D3B-BD05-3BAEC85C844F}">
-      <dsp:nvSpPr>
-        <dsp:cNvPr id="0" name=""/>
-        <dsp:cNvSpPr/>
-      </dsp:nvSpPr>
-      <dsp:spPr>
-        <a:xfrm>
-          <a:off x="7143" y="1001183"/>
-          <a:ext cx="2135187" cy="1281112"/>
-        </a:xfrm>
-        <a:prstGeom prst="roundRect">
-          <a:avLst>
-            <a:gd name="adj" fmla="val 10000"/>
-          </a:avLst>
-        </a:prstGeom>
-        <a:solidFill>
-          <a:schemeClr val="accent1">
-            <a:hueOff val="0"/>
-            <a:satOff val="0"/>
-            <a:lumOff val="0"/>
-            <a:alphaOff val="0"/>
-          </a:schemeClr>
-        </a:solidFill>
-        <a:ln w="12700" cap="flat" cmpd="sng" algn="ctr">
-          <a:solidFill>
-            <a:schemeClr val="lt1">
-              <a:hueOff val="0"/>
-              <a:satOff val="0"/>
-              <a:lumOff val="0"/>
-              <a:alphaOff val="0"/>
-            </a:schemeClr>
-          </a:solidFill>
-          <a:prstDash val="solid"/>
-          <a:miter lim="800000"/>
-        </a:ln>
-        <a:effectLst/>
-      </dsp:spPr>
-      <dsp:style>
-        <a:lnRef idx="2">
-          <a:scrgbClr r="0" g="0" b="0"/>
-        </a:lnRef>
-        <a:fillRef idx="1">
-          <a:scrgbClr r="0" g="0" b="0"/>
-        </a:fillRef>
-        <a:effectRef idx="0">
-          <a:scrgbClr r="0" g="0" b="0"/>
-        </a:effectRef>
-        <a:fontRef idx="minor">
-          <a:schemeClr val="lt1"/>
-        </a:fontRef>
-      </dsp:style>
-      <dsp:txBody>
-        <a:bodyPr spcFirstLastPara="0" vert="horz" wrap="square" lIns="68580" tIns="68580" rIns="68580" bIns="68580" numCol="1" spcCol="1270" anchor="ctr" anchorCtr="0">
-          <a:noAutofit/>
-        </a:bodyPr>
-        <a:lstStyle/>
-        <a:p>
-          <a:pPr lvl="0" algn="ctr" defTabSz="800100">
-            <a:lnSpc>
-              <a:spcPct val="90000"/>
-            </a:lnSpc>
-            <a:spcBef>
-              <a:spcPct val="0"/>
-            </a:spcBef>
-            <a:spcAft>
-              <a:spcPct val="35000"/>
-            </a:spcAft>
-          </a:pPr>
-          <a:r>
-            <a:rPr lang="en-US" sz="1800" kern="1200" smtClean="0"/>
-            <a:t>Unduh file RDF tokoh DBpedia</a:t>
-          </a:r>
-          <a:endParaRPr lang="en-US" sz="1800" kern="1200"/>
-        </a:p>
-      </dsp:txBody>
-      <dsp:txXfrm>
-        <a:off x="44665" y="1038705"/>
-        <a:ext cx="2060143" cy="1206068"/>
-      </dsp:txXfrm>
-    </dsp:sp>
-    <dsp:sp modelId="{AC0006F9-2FA8-434E-9C3E-8AAE8FBF33DC}">
-      <dsp:nvSpPr>
-        <dsp:cNvPr id="0" name=""/>
-        <dsp:cNvSpPr/>
-      </dsp:nvSpPr>
-      <dsp:spPr>
-        <a:xfrm>
-          <a:off x="2330227" y="1376976"/>
-          <a:ext cx="452659" cy="529526"/>
-        </a:xfrm>
-        <a:prstGeom prst="rightArrow">
-          <a:avLst>
-            <a:gd name="adj1" fmla="val 60000"/>
-            <a:gd name="adj2" fmla="val 50000"/>
-          </a:avLst>
-        </a:prstGeom>
-        <a:solidFill>
-          <a:schemeClr val="accent1">
-            <a:tint val="60000"/>
-            <a:hueOff val="0"/>
-            <a:satOff val="0"/>
-            <a:lumOff val="0"/>
-            <a:alphaOff val="0"/>
-          </a:schemeClr>
-        </a:solidFill>
-        <a:ln>
-          <a:noFill/>
-        </a:ln>
-        <a:effectLst/>
-      </dsp:spPr>
-      <dsp:style>
-        <a:lnRef idx="0">
-          <a:scrgbClr r="0" g="0" b="0"/>
-        </a:lnRef>
-        <a:fillRef idx="1">
-          <a:scrgbClr r="0" g="0" b="0"/>
-        </a:fillRef>
-        <a:effectRef idx="0">
-          <a:scrgbClr r="0" g="0" b="0"/>
-        </a:effectRef>
-        <a:fontRef idx="minor">
-          <a:schemeClr val="lt1"/>
-        </a:fontRef>
-      </dsp:style>
-      <dsp:txBody>
-        <a:bodyPr spcFirstLastPara="0" vert="horz" wrap="square" lIns="0" tIns="0" rIns="0" bIns="0" numCol="1" spcCol="1270" anchor="ctr" anchorCtr="0">
-          <a:noAutofit/>
-        </a:bodyPr>
-        <a:lstStyle/>
-        <a:p>
-          <a:pPr lvl="0" algn="ctr" defTabSz="666750">
-            <a:lnSpc>
-              <a:spcPct val="90000"/>
-            </a:lnSpc>
-            <a:spcBef>
-              <a:spcPct val="0"/>
-            </a:spcBef>
-            <a:spcAft>
-              <a:spcPct val="35000"/>
-            </a:spcAft>
-          </a:pPr>
-          <a:endParaRPr lang="en-US" sz="1500" kern="1200"/>
-        </a:p>
-      </dsp:txBody>
-      <dsp:txXfrm>
-        <a:off x="2330227" y="1482881"/>
-        <a:ext cx="316861" cy="317716"/>
-      </dsp:txXfrm>
-    </dsp:sp>
-    <dsp:sp modelId="{E73E5B6E-70C9-4D6A-9A48-04BCF1BB6746}">
-      <dsp:nvSpPr>
-        <dsp:cNvPr id="0" name=""/>
-        <dsp:cNvSpPr/>
-      </dsp:nvSpPr>
-      <dsp:spPr>
-        <a:xfrm>
-          <a:off x="2996406" y="1001183"/>
-          <a:ext cx="2135187" cy="1281112"/>
-        </a:xfrm>
-        <a:prstGeom prst="roundRect">
-          <a:avLst>
-            <a:gd name="adj" fmla="val 10000"/>
-          </a:avLst>
-        </a:prstGeom>
-        <a:solidFill>
-          <a:schemeClr val="accent1">
-            <a:hueOff val="0"/>
-            <a:satOff val="0"/>
-            <a:lumOff val="0"/>
-            <a:alphaOff val="0"/>
-          </a:schemeClr>
-        </a:solidFill>
-        <a:ln w="12700" cap="flat" cmpd="sng" algn="ctr">
-          <a:solidFill>
-            <a:schemeClr val="lt1">
-              <a:hueOff val="0"/>
-              <a:satOff val="0"/>
-              <a:lumOff val="0"/>
-              <a:alphaOff val="0"/>
-            </a:schemeClr>
-          </a:solidFill>
-          <a:prstDash val="solid"/>
-          <a:miter lim="800000"/>
-        </a:ln>
-        <a:effectLst/>
-      </dsp:spPr>
-      <dsp:style>
-        <a:lnRef idx="2">
-          <a:scrgbClr r="0" g="0" b="0"/>
-        </a:lnRef>
-        <a:fillRef idx="1">
-          <a:scrgbClr r="0" g="0" b="0"/>
-        </a:fillRef>
-        <a:effectRef idx="0">
-          <a:scrgbClr r="0" g="0" b="0"/>
-        </a:effectRef>
-        <a:fontRef idx="minor">
-          <a:schemeClr val="lt1"/>
-        </a:fontRef>
-      </dsp:style>
-      <dsp:txBody>
-        <a:bodyPr spcFirstLastPara="0" vert="horz" wrap="square" lIns="68580" tIns="68580" rIns="68580" bIns="68580" numCol="1" spcCol="1270" anchor="ctr" anchorCtr="0">
-          <a:noAutofit/>
-        </a:bodyPr>
-        <a:lstStyle/>
-        <a:p>
-          <a:pPr lvl="0" algn="ctr" defTabSz="800100">
-            <a:lnSpc>
-              <a:spcPct val="90000"/>
-            </a:lnSpc>
-            <a:spcBef>
-              <a:spcPct val="0"/>
-            </a:spcBef>
-            <a:spcAft>
-              <a:spcPct val="35000"/>
-            </a:spcAft>
-          </a:pPr>
-          <a:r>
-            <a:rPr lang="en-US" sz="1800" kern="1200" smtClean="0"/>
-            <a:t>Pemodelan file RDF tokoh</a:t>
-          </a:r>
-          <a:endParaRPr lang="en-US" sz="1800" kern="1200"/>
-        </a:p>
-      </dsp:txBody>
-      <dsp:txXfrm>
-        <a:off x="3033928" y="1038705"/>
-        <a:ext cx="2060143" cy="1206068"/>
-      </dsp:txXfrm>
-    </dsp:sp>
-    <dsp:sp modelId="{8A1C7D42-2690-49D3-8662-9F1F6D78CD12}">
-      <dsp:nvSpPr>
-        <dsp:cNvPr id="0" name=""/>
-        <dsp:cNvSpPr/>
-      </dsp:nvSpPr>
-      <dsp:spPr>
-        <a:xfrm>
-          <a:off x="5319490" y="1376976"/>
-          <a:ext cx="452659" cy="529526"/>
-        </a:xfrm>
-        <a:prstGeom prst="rightArrow">
-          <a:avLst>
-            <a:gd name="adj1" fmla="val 60000"/>
-            <a:gd name="adj2" fmla="val 50000"/>
-          </a:avLst>
-        </a:prstGeom>
-        <a:solidFill>
-          <a:schemeClr val="accent1">
-            <a:tint val="60000"/>
-            <a:hueOff val="0"/>
-            <a:satOff val="0"/>
-            <a:lumOff val="0"/>
-            <a:alphaOff val="0"/>
-          </a:schemeClr>
-        </a:solidFill>
-        <a:ln>
-          <a:noFill/>
-        </a:ln>
-        <a:effectLst/>
-      </dsp:spPr>
-      <dsp:style>
-        <a:lnRef idx="0">
-          <a:scrgbClr r="0" g="0" b="0"/>
-        </a:lnRef>
-        <a:fillRef idx="1">
-          <a:scrgbClr r="0" g="0" b="0"/>
-        </a:fillRef>
-        <a:effectRef idx="0">
-          <a:scrgbClr r="0" g="0" b="0"/>
-        </a:effectRef>
-        <a:fontRef idx="minor">
-          <a:schemeClr val="lt1"/>
-        </a:fontRef>
-      </dsp:style>
-      <dsp:txBody>
-        <a:bodyPr spcFirstLastPara="0" vert="horz" wrap="square" lIns="0" tIns="0" rIns="0" bIns="0" numCol="1" spcCol="1270" anchor="ctr" anchorCtr="0">
-          <a:noAutofit/>
-        </a:bodyPr>
-        <a:lstStyle/>
-        <a:p>
-          <a:pPr lvl="0" algn="ctr" defTabSz="666750">
-            <a:lnSpc>
-              <a:spcPct val="90000"/>
-            </a:lnSpc>
-            <a:spcBef>
-              <a:spcPct val="0"/>
-            </a:spcBef>
-            <a:spcAft>
-              <a:spcPct val="35000"/>
-            </a:spcAft>
-          </a:pPr>
-          <a:endParaRPr lang="en-US" sz="1500" kern="1200"/>
-        </a:p>
-      </dsp:txBody>
-      <dsp:txXfrm>
-        <a:off x="5319490" y="1482881"/>
-        <a:ext cx="316861" cy="317716"/>
-      </dsp:txXfrm>
-    </dsp:sp>
-    <dsp:sp modelId="{429D9C87-E07D-462D-BFE4-100D443F346E}">
-      <dsp:nvSpPr>
-        <dsp:cNvPr id="0" name=""/>
-        <dsp:cNvSpPr/>
-      </dsp:nvSpPr>
-      <dsp:spPr>
-        <a:xfrm>
-          <a:off x="5985668" y="1001183"/>
-          <a:ext cx="2135187" cy="1281112"/>
-        </a:xfrm>
-        <a:prstGeom prst="roundRect">
-          <a:avLst>
-            <a:gd name="adj" fmla="val 10000"/>
-          </a:avLst>
-        </a:prstGeom>
-        <a:solidFill>
-          <a:schemeClr val="accent1">
-            <a:hueOff val="0"/>
-            <a:satOff val="0"/>
-            <a:lumOff val="0"/>
-            <a:alphaOff val="0"/>
-          </a:schemeClr>
-        </a:solidFill>
-        <a:ln w="12700" cap="flat" cmpd="sng" algn="ctr">
-          <a:solidFill>
-            <a:schemeClr val="lt1">
-              <a:hueOff val="0"/>
-              <a:satOff val="0"/>
-              <a:lumOff val="0"/>
-              <a:alphaOff val="0"/>
-            </a:schemeClr>
-          </a:solidFill>
-          <a:prstDash val="solid"/>
-          <a:miter lim="800000"/>
-        </a:ln>
-        <a:effectLst/>
-      </dsp:spPr>
-      <dsp:style>
-        <a:lnRef idx="2">
-          <a:scrgbClr r="0" g="0" b="0"/>
-        </a:lnRef>
-        <a:fillRef idx="1">
-          <a:scrgbClr r="0" g="0" b="0"/>
-        </a:fillRef>
-        <a:effectRef idx="0">
-          <a:scrgbClr r="0" g="0" b="0"/>
-        </a:effectRef>
-        <a:fontRef idx="minor">
-          <a:schemeClr val="lt1"/>
-        </a:fontRef>
-      </dsp:style>
-      <dsp:txBody>
-        <a:bodyPr spcFirstLastPara="0" vert="horz" wrap="square" lIns="68580" tIns="68580" rIns="68580" bIns="68580" numCol="1" spcCol="1270" anchor="ctr" anchorCtr="0">
-          <a:noAutofit/>
-        </a:bodyPr>
-        <a:lstStyle/>
-        <a:p>
-          <a:pPr lvl="0" algn="ctr" defTabSz="800100">
-            <a:lnSpc>
-              <a:spcPct val="90000"/>
-            </a:lnSpc>
-            <a:spcBef>
-              <a:spcPct val="0"/>
-            </a:spcBef>
-            <a:spcAft>
-              <a:spcPct val="35000"/>
-            </a:spcAft>
-          </a:pPr>
-          <a:r>
-            <a:rPr lang="en-US" sz="1800" kern="1200" smtClean="0"/>
-            <a:t>Penggabungan model tokoh dengan </a:t>
-          </a:r>
-          <a:r>
-            <a:rPr lang="en-US" sz="1800" i="1" kern="1200" smtClean="0"/>
-            <a:t>Family Relationship Ontology</a:t>
-          </a:r>
-          <a:endParaRPr lang="en-US" sz="1800" kern="1200"/>
-        </a:p>
-      </dsp:txBody>
-      <dsp:txXfrm>
-        <a:off x="6023190" y="1038705"/>
-        <a:ext cx="2060143" cy="1206068"/>
-      </dsp:txXfrm>
-    </dsp:sp>
-    <dsp:sp modelId="{4C8F4061-453C-4E1A-8E10-5F5884D8BA6B}">
-      <dsp:nvSpPr>
-        <dsp:cNvPr id="0" name=""/>
-        <dsp:cNvSpPr/>
-      </dsp:nvSpPr>
-      <dsp:spPr>
-        <a:xfrm rot="5400000">
-          <a:off x="6826932" y="2431759"/>
-          <a:ext cx="452659" cy="529526"/>
-        </a:xfrm>
-        <a:prstGeom prst="rightArrow">
-          <a:avLst>
-            <a:gd name="adj1" fmla="val 60000"/>
-            <a:gd name="adj2" fmla="val 50000"/>
-          </a:avLst>
-        </a:prstGeom>
-        <a:solidFill>
-          <a:schemeClr val="accent1">
-            <a:tint val="60000"/>
-            <a:hueOff val="0"/>
-            <a:satOff val="0"/>
-            <a:lumOff val="0"/>
-            <a:alphaOff val="0"/>
-          </a:schemeClr>
-        </a:solidFill>
-        <a:ln>
-          <a:noFill/>
-        </a:ln>
-        <a:effectLst/>
-      </dsp:spPr>
-      <dsp:style>
-        <a:lnRef idx="0">
-          <a:scrgbClr r="0" g="0" b="0"/>
-        </a:lnRef>
-        <a:fillRef idx="1">
-          <a:scrgbClr r="0" g="0" b="0"/>
-        </a:fillRef>
-        <a:effectRef idx="0">
-          <a:scrgbClr r="0" g="0" b="0"/>
-        </a:effectRef>
-        <a:fontRef idx="minor">
-          <a:schemeClr val="lt1"/>
-        </a:fontRef>
-      </dsp:style>
-      <dsp:txBody>
-        <a:bodyPr spcFirstLastPara="0" vert="horz" wrap="square" lIns="0" tIns="0" rIns="0" bIns="0" numCol="1" spcCol="1270" anchor="ctr" anchorCtr="0">
-          <a:noAutofit/>
-        </a:bodyPr>
-        <a:lstStyle/>
-        <a:p>
-          <a:pPr lvl="0" algn="ctr" defTabSz="666750">
-            <a:lnSpc>
-              <a:spcPct val="90000"/>
-            </a:lnSpc>
-            <a:spcBef>
-              <a:spcPct val="0"/>
-            </a:spcBef>
-            <a:spcAft>
-              <a:spcPct val="35000"/>
-            </a:spcAft>
-          </a:pPr>
-          <a:endParaRPr lang="en-US" sz="1500" kern="1200"/>
-        </a:p>
-      </dsp:txBody>
-      <dsp:txXfrm rot="-5400000">
-        <a:off x="6894404" y="2470192"/>
-        <a:ext cx="317716" cy="316861"/>
-      </dsp:txXfrm>
-    </dsp:sp>
-    <dsp:sp modelId="{C70EF33C-E069-4530-8080-C2321E05A449}">
-      <dsp:nvSpPr>
-        <dsp:cNvPr id="0" name=""/>
-        <dsp:cNvSpPr/>
-      </dsp:nvSpPr>
-      <dsp:spPr>
-        <a:xfrm>
-          <a:off x="5985668" y="3136371"/>
-          <a:ext cx="2135187" cy="1281112"/>
-        </a:xfrm>
-        <a:prstGeom prst="roundRect">
-          <a:avLst>
-            <a:gd name="adj" fmla="val 10000"/>
-          </a:avLst>
-        </a:prstGeom>
-        <a:solidFill>
-          <a:schemeClr val="accent1">
-            <a:hueOff val="0"/>
-            <a:satOff val="0"/>
-            <a:lumOff val="0"/>
-            <a:alphaOff val="0"/>
-          </a:schemeClr>
-        </a:solidFill>
-        <a:ln w="12700" cap="flat" cmpd="sng" algn="ctr">
-          <a:solidFill>
-            <a:schemeClr val="lt1">
-              <a:hueOff val="0"/>
-              <a:satOff val="0"/>
-              <a:lumOff val="0"/>
-              <a:alphaOff val="0"/>
-            </a:schemeClr>
-          </a:solidFill>
-          <a:prstDash val="solid"/>
-          <a:miter lim="800000"/>
-        </a:ln>
-        <a:effectLst/>
-      </dsp:spPr>
-      <dsp:style>
-        <a:lnRef idx="2">
-          <a:scrgbClr r="0" g="0" b="0"/>
-        </a:lnRef>
-        <a:fillRef idx="1">
-          <a:scrgbClr r="0" g="0" b="0"/>
-        </a:fillRef>
-        <a:effectRef idx="0">
-          <a:scrgbClr r="0" g="0" b="0"/>
-        </a:effectRef>
-        <a:fontRef idx="minor">
-          <a:schemeClr val="lt1"/>
-        </a:fontRef>
-      </dsp:style>
-      <dsp:txBody>
-        <a:bodyPr spcFirstLastPara="0" vert="horz" wrap="square" lIns="68580" tIns="68580" rIns="68580" bIns="68580" numCol="1" spcCol="1270" anchor="ctr" anchorCtr="0">
-          <a:noAutofit/>
-        </a:bodyPr>
-        <a:lstStyle/>
-        <a:p>
-          <a:pPr lvl="0" algn="ctr" defTabSz="800100">
-            <a:lnSpc>
-              <a:spcPct val="90000"/>
-            </a:lnSpc>
-            <a:spcBef>
-              <a:spcPct val="0"/>
-            </a:spcBef>
-            <a:spcAft>
-              <a:spcPct val="35000"/>
-            </a:spcAft>
-          </a:pPr>
-          <a:r>
-            <a:rPr lang="en-US" sz="1800" kern="1200" smtClean="0"/>
-            <a:t>Reasoning</a:t>
-          </a:r>
-          <a:endParaRPr lang="en-US" sz="1800" kern="1200"/>
-        </a:p>
-      </dsp:txBody>
-      <dsp:txXfrm>
-        <a:off x="6023190" y="3173893"/>
-        <a:ext cx="2060143" cy="1206068"/>
-      </dsp:txXfrm>
-    </dsp:sp>
-    <dsp:sp modelId="{B5EC5973-7E95-417E-BA33-C450CF622691}">
-      <dsp:nvSpPr>
-        <dsp:cNvPr id="0" name=""/>
-        <dsp:cNvSpPr/>
-      </dsp:nvSpPr>
-      <dsp:spPr>
-        <a:xfrm rot="10800000">
-          <a:off x="5345112" y="3512163"/>
-          <a:ext cx="452659" cy="529526"/>
-        </a:xfrm>
-        <a:prstGeom prst="rightArrow">
-          <a:avLst>
-            <a:gd name="adj1" fmla="val 60000"/>
-            <a:gd name="adj2" fmla="val 50000"/>
-          </a:avLst>
-        </a:prstGeom>
-        <a:solidFill>
-          <a:schemeClr val="accent1">
-            <a:tint val="60000"/>
-            <a:hueOff val="0"/>
-            <a:satOff val="0"/>
-            <a:lumOff val="0"/>
-            <a:alphaOff val="0"/>
-          </a:schemeClr>
-        </a:solidFill>
-        <a:ln>
-          <a:noFill/>
-        </a:ln>
-        <a:effectLst/>
-      </dsp:spPr>
-      <dsp:style>
-        <a:lnRef idx="0">
-          <a:scrgbClr r="0" g="0" b="0"/>
-        </a:lnRef>
-        <a:fillRef idx="1">
-          <a:scrgbClr r="0" g="0" b="0"/>
-        </a:fillRef>
-        <a:effectRef idx="0">
-          <a:scrgbClr r="0" g="0" b="0"/>
-        </a:effectRef>
-        <a:fontRef idx="minor">
-          <a:schemeClr val="lt1"/>
-        </a:fontRef>
-      </dsp:style>
-      <dsp:txBody>
-        <a:bodyPr spcFirstLastPara="0" vert="horz" wrap="square" lIns="0" tIns="0" rIns="0" bIns="0" numCol="1" spcCol="1270" anchor="ctr" anchorCtr="0">
-          <a:noAutofit/>
-        </a:bodyPr>
-        <a:lstStyle/>
-        <a:p>
-          <a:pPr lvl="0" algn="ctr" defTabSz="666750">
-            <a:lnSpc>
-              <a:spcPct val="90000"/>
-            </a:lnSpc>
-            <a:spcBef>
-              <a:spcPct val="0"/>
-            </a:spcBef>
-            <a:spcAft>
-              <a:spcPct val="35000"/>
-            </a:spcAft>
-          </a:pPr>
-          <a:endParaRPr lang="en-US" sz="1500" kern="1200"/>
-        </a:p>
-      </dsp:txBody>
-      <dsp:txXfrm rot="10800000">
-        <a:off x="5480910" y="3618068"/>
-        <a:ext cx="316861" cy="317716"/>
-      </dsp:txXfrm>
-    </dsp:sp>
-    <dsp:sp modelId="{43744F74-5A04-409E-86C9-0A9A2C6EF963}">
-      <dsp:nvSpPr>
-        <dsp:cNvPr id="0" name=""/>
-        <dsp:cNvSpPr/>
-      </dsp:nvSpPr>
-      <dsp:spPr>
-        <a:xfrm>
-          <a:off x="2996406" y="3136370"/>
-          <a:ext cx="2135187" cy="1281112"/>
-        </a:xfrm>
-        <a:prstGeom prst="roundRect">
-          <a:avLst>
-            <a:gd name="adj" fmla="val 10000"/>
-          </a:avLst>
-        </a:prstGeom>
-        <a:solidFill>
-          <a:schemeClr val="accent1">
-            <a:hueOff val="0"/>
-            <a:satOff val="0"/>
-            <a:lumOff val="0"/>
-            <a:alphaOff val="0"/>
-          </a:schemeClr>
-        </a:solidFill>
-        <a:ln w="12700" cap="flat" cmpd="sng" algn="ctr">
-          <a:solidFill>
-            <a:schemeClr val="lt1">
-              <a:hueOff val="0"/>
-              <a:satOff val="0"/>
-              <a:lumOff val="0"/>
-              <a:alphaOff val="0"/>
-            </a:schemeClr>
-          </a:solidFill>
-          <a:prstDash val="solid"/>
-          <a:miter lim="800000"/>
-        </a:ln>
-        <a:effectLst/>
-      </dsp:spPr>
-      <dsp:style>
-        <a:lnRef idx="2">
-          <a:scrgbClr r="0" g="0" b="0"/>
-        </a:lnRef>
-        <a:fillRef idx="1">
-          <a:scrgbClr r="0" g="0" b="0"/>
-        </a:fillRef>
-        <a:effectRef idx="0">
-          <a:scrgbClr r="0" g="0" b="0"/>
-        </a:effectRef>
-        <a:fontRef idx="minor">
-          <a:schemeClr val="lt1"/>
-        </a:fontRef>
-      </dsp:style>
-      <dsp:txBody>
-        <a:bodyPr spcFirstLastPara="0" vert="horz" wrap="square" lIns="68580" tIns="68580" rIns="68580" bIns="68580" numCol="1" spcCol="1270" anchor="ctr" anchorCtr="0">
-          <a:noAutofit/>
-        </a:bodyPr>
-        <a:lstStyle/>
-        <a:p>
-          <a:pPr lvl="0" algn="ctr" defTabSz="800100">
-            <a:lnSpc>
-              <a:spcPct val="90000"/>
-            </a:lnSpc>
-            <a:spcBef>
-              <a:spcPct val="0"/>
-            </a:spcBef>
-            <a:spcAft>
-              <a:spcPct val="35000"/>
-            </a:spcAft>
-          </a:pPr>
-          <a:r>
-            <a:rPr lang="en-US" sz="1800" kern="1200" smtClean="0"/>
-            <a:t>Mencetak model hasil reasoning</a:t>
-          </a:r>
-          <a:endParaRPr lang="en-US" sz="1800" kern="1200"/>
-        </a:p>
-      </dsp:txBody>
-      <dsp:txXfrm>
-        <a:off x="3033928" y="3173892"/>
-        <a:ext cx="2060143" cy="1206068"/>
-      </dsp:txXfrm>
-    </dsp:sp>
   </dsp:spTree>
 </dsp:drawing>
 </file>
@@ -3055,384 +2375,6 @@
       <dsp:cNvGrpSpPr/>
     </dsp:nvGrpSpPr>
     <dsp:grpSpPr/>
-    <dsp:sp modelId="{CB39116F-EB91-404F-85AA-B1CB5796507D}">
-      <dsp:nvSpPr>
-        <dsp:cNvPr id="0" name=""/>
-        <dsp:cNvSpPr/>
-      </dsp:nvSpPr>
-      <dsp:spPr>
-        <a:xfrm>
-          <a:off x="298748" y="2110"/>
-          <a:ext cx="2331327" cy="1398796"/>
-        </a:xfrm>
-        <a:prstGeom prst="roundRect">
-          <a:avLst>
-            <a:gd name="adj" fmla="val 10000"/>
-          </a:avLst>
-        </a:prstGeom>
-        <a:solidFill>
-          <a:schemeClr val="accent1">
-            <a:hueOff val="0"/>
-            <a:satOff val="0"/>
-            <a:lumOff val="0"/>
-            <a:alphaOff val="0"/>
-          </a:schemeClr>
-        </a:solidFill>
-        <a:ln w="12700" cap="flat" cmpd="sng" algn="ctr">
-          <a:solidFill>
-            <a:schemeClr val="lt1">
-              <a:hueOff val="0"/>
-              <a:satOff val="0"/>
-              <a:lumOff val="0"/>
-              <a:alphaOff val="0"/>
-            </a:schemeClr>
-          </a:solidFill>
-          <a:prstDash val="solid"/>
-          <a:miter lim="800000"/>
-        </a:ln>
-        <a:effectLst/>
-      </dsp:spPr>
-      <dsp:style>
-        <a:lnRef idx="2">
-          <a:scrgbClr r="0" g="0" b="0"/>
-        </a:lnRef>
-        <a:fillRef idx="1">
-          <a:scrgbClr r="0" g="0" b="0"/>
-        </a:fillRef>
-        <a:effectRef idx="0">
-          <a:scrgbClr r="0" g="0" b="0"/>
-        </a:effectRef>
-        <a:fontRef idx="minor">
-          <a:schemeClr val="lt1"/>
-        </a:fontRef>
-      </dsp:style>
-      <dsp:txBody>
-        <a:bodyPr spcFirstLastPara="0" vert="horz" wrap="square" lIns="76200" tIns="76200" rIns="76200" bIns="76200" numCol="1" spcCol="1270" anchor="ctr" anchorCtr="0">
-          <a:noAutofit/>
-        </a:bodyPr>
-        <a:lstStyle/>
-        <a:p>
-          <a:pPr lvl="0" algn="ctr" defTabSz="889000">
-            <a:lnSpc>
-              <a:spcPct val="90000"/>
-            </a:lnSpc>
-            <a:spcBef>
-              <a:spcPct val="0"/>
-            </a:spcBef>
-            <a:spcAft>
-              <a:spcPct val="35000"/>
-            </a:spcAft>
-          </a:pPr>
-          <a:r>
-            <a:rPr lang="en-US" sz="2000" kern="1200" smtClean="0"/>
-            <a:t>Unggah data hasil reasoning ke Apache Jena Fuseki</a:t>
-          </a:r>
-          <a:endParaRPr lang="en-US" sz="2000" kern="1200"/>
-        </a:p>
-      </dsp:txBody>
-      <dsp:txXfrm>
-        <a:off x="339717" y="43079"/>
-        <a:ext cx="2249389" cy="1316858"/>
-      </dsp:txXfrm>
-    </dsp:sp>
-    <dsp:sp modelId="{AF1C5D5E-39F3-4096-8D54-97716BD884B5}">
-      <dsp:nvSpPr>
-        <dsp:cNvPr id="0" name=""/>
-        <dsp:cNvSpPr/>
-      </dsp:nvSpPr>
-      <dsp:spPr>
-        <a:xfrm>
-          <a:off x="2835233" y="412424"/>
-          <a:ext cx="494241" cy="578169"/>
-        </a:xfrm>
-        <a:prstGeom prst="rightArrow">
-          <a:avLst>
-            <a:gd name="adj1" fmla="val 60000"/>
-            <a:gd name="adj2" fmla="val 50000"/>
-          </a:avLst>
-        </a:prstGeom>
-        <a:solidFill>
-          <a:schemeClr val="accent1">
-            <a:tint val="60000"/>
-            <a:hueOff val="0"/>
-            <a:satOff val="0"/>
-            <a:lumOff val="0"/>
-            <a:alphaOff val="0"/>
-          </a:schemeClr>
-        </a:solidFill>
-        <a:ln>
-          <a:noFill/>
-        </a:ln>
-        <a:effectLst/>
-      </dsp:spPr>
-      <dsp:style>
-        <a:lnRef idx="0">
-          <a:scrgbClr r="0" g="0" b="0"/>
-        </a:lnRef>
-        <a:fillRef idx="1">
-          <a:scrgbClr r="0" g="0" b="0"/>
-        </a:fillRef>
-        <a:effectRef idx="0">
-          <a:scrgbClr r="0" g="0" b="0"/>
-        </a:effectRef>
-        <a:fontRef idx="minor">
-          <a:schemeClr val="lt1"/>
-        </a:fontRef>
-      </dsp:style>
-      <dsp:txBody>
-        <a:bodyPr spcFirstLastPara="0" vert="horz" wrap="square" lIns="0" tIns="0" rIns="0" bIns="0" numCol="1" spcCol="1270" anchor="ctr" anchorCtr="0">
-          <a:noAutofit/>
-        </a:bodyPr>
-        <a:lstStyle/>
-        <a:p>
-          <a:pPr lvl="0" algn="ctr" defTabSz="711200">
-            <a:lnSpc>
-              <a:spcPct val="90000"/>
-            </a:lnSpc>
-            <a:spcBef>
-              <a:spcPct val="0"/>
-            </a:spcBef>
-            <a:spcAft>
-              <a:spcPct val="35000"/>
-            </a:spcAft>
-          </a:pPr>
-          <a:endParaRPr lang="en-US" sz="1600" kern="1200"/>
-        </a:p>
-      </dsp:txBody>
-      <dsp:txXfrm>
-        <a:off x="2835233" y="528058"/>
-        <a:ext cx="345969" cy="346901"/>
-      </dsp:txXfrm>
-    </dsp:sp>
-    <dsp:sp modelId="{6FC43BBB-5A7D-4190-A831-ECD39838A64D}">
-      <dsp:nvSpPr>
-        <dsp:cNvPr id="0" name=""/>
-        <dsp:cNvSpPr/>
-      </dsp:nvSpPr>
-      <dsp:spPr>
-        <a:xfrm>
-          <a:off x="3562607" y="2110"/>
-          <a:ext cx="2331327" cy="1398796"/>
-        </a:xfrm>
-        <a:prstGeom prst="roundRect">
-          <a:avLst>
-            <a:gd name="adj" fmla="val 10000"/>
-          </a:avLst>
-        </a:prstGeom>
-        <a:solidFill>
-          <a:schemeClr val="accent1">
-            <a:hueOff val="0"/>
-            <a:satOff val="0"/>
-            <a:lumOff val="0"/>
-            <a:alphaOff val="0"/>
-          </a:schemeClr>
-        </a:solidFill>
-        <a:ln w="12700" cap="flat" cmpd="sng" algn="ctr">
-          <a:solidFill>
-            <a:schemeClr val="lt1">
-              <a:hueOff val="0"/>
-              <a:satOff val="0"/>
-              <a:lumOff val="0"/>
-              <a:alphaOff val="0"/>
-            </a:schemeClr>
-          </a:solidFill>
-          <a:prstDash val="solid"/>
-          <a:miter lim="800000"/>
-        </a:ln>
-        <a:effectLst/>
-      </dsp:spPr>
-      <dsp:style>
-        <a:lnRef idx="2">
-          <a:scrgbClr r="0" g="0" b="0"/>
-        </a:lnRef>
-        <a:fillRef idx="1">
-          <a:scrgbClr r="0" g="0" b="0"/>
-        </a:fillRef>
-        <a:effectRef idx="0">
-          <a:scrgbClr r="0" g="0" b="0"/>
-        </a:effectRef>
-        <a:fontRef idx="minor">
-          <a:schemeClr val="lt1"/>
-        </a:fontRef>
-      </dsp:style>
-      <dsp:txBody>
-        <a:bodyPr spcFirstLastPara="0" vert="horz" wrap="square" lIns="76200" tIns="76200" rIns="76200" bIns="76200" numCol="1" spcCol="1270" anchor="ctr" anchorCtr="0">
-          <a:noAutofit/>
-        </a:bodyPr>
-        <a:lstStyle/>
-        <a:p>
-          <a:pPr lvl="0" algn="ctr" defTabSz="889000">
-            <a:lnSpc>
-              <a:spcPct val="90000"/>
-            </a:lnSpc>
-            <a:spcBef>
-              <a:spcPct val="0"/>
-            </a:spcBef>
-            <a:spcAft>
-              <a:spcPct val="35000"/>
-            </a:spcAft>
-          </a:pPr>
-          <a:r>
-            <a:rPr lang="en-US" sz="2000" kern="1200" smtClean="0"/>
-            <a:t>SPARQL Query</a:t>
-          </a:r>
-          <a:endParaRPr lang="en-US" sz="2000" kern="1200"/>
-        </a:p>
-      </dsp:txBody>
-      <dsp:txXfrm>
-        <a:off x="3603576" y="43079"/>
-        <a:ext cx="2249389" cy="1316858"/>
-      </dsp:txXfrm>
-    </dsp:sp>
-    <dsp:sp modelId="{18D28992-97C3-49BA-B5CB-BA5D346E6A6E}">
-      <dsp:nvSpPr>
-        <dsp:cNvPr id="0" name=""/>
-        <dsp:cNvSpPr/>
-      </dsp:nvSpPr>
-      <dsp:spPr>
-        <a:xfrm rot="5400000">
-          <a:off x="4481150" y="1564100"/>
-          <a:ext cx="494241" cy="578169"/>
-        </a:xfrm>
-        <a:prstGeom prst="rightArrow">
-          <a:avLst>
-            <a:gd name="adj1" fmla="val 60000"/>
-            <a:gd name="adj2" fmla="val 50000"/>
-          </a:avLst>
-        </a:prstGeom>
-        <a:solidFill>
-          <a:schemeClr val="accent1">
-            <a:tint val="60000"/>
-            <a:hueOff val="0"/>
-            <a:satOff val="0"/>
-            <a:lumOff val="0"/>
-            <a:alphaOff val="0"/>
-          </a:schemeClr>
-        </a:solidFill>
-        <a:ln>
-          <a:noFill/>
-        </a:ln>
-        <a:effectLst/>
-      </dsp:spPr>
-      <dsp:style>
-        <a:lnRef idx="0">
-          <a:scrgbClr r="0" g="0" b="0"/>
-        </a:lnRef>
-        <a:fillRef idx="1">
-          <a:scrgbClr r="0" g="0" b="0"/>
-        </a:fillRef>
-        <a:effectRef idx="0">
-          <a:scrgbClr r="0" g="0" b="0"/>
-        </a:effectRef>
-        <a:fontRef idx="minor">
-          <a:schemeClr val="lt1"/>
-        </a:fontRef>
-      </dsp:style>
-      <dsp:txBody>
-        <a:bodyPr spcFirstLastPara="0" vert="horz" wrap="square" lIns="0" tIns="0" rIns="0" bIns="0" numCol="1" spcCol="1270" anchor="ctr" anchorCtr="0">
-          <a:noAutofit/>
-        </a:bodyPr>
-        <a:lstStyle/>
-        <a:p>
-          <a:pPr lvl="0" algn="ctr" defTabSz="711200">
-            <a:lnSpc>
-              <a:spcPct val="90000"/>
-            </a:lnSpc>
-            <a:spcBef>
-              <a:spcPct val="0"/>
-            </a:spcBef>
-            <a:spcAft>
-              <a:spcPct val="35000"/>
-            </a:spcAft>
-          </a:pPr>
-          <a:endParaRPr lang="en-US" sz="1600" kern="1200"/>
-        </a:p>
-      </dsp:txBody>
-      <dsp:txXfrm rot="-5400000">
-        <a:off x="4554820" y="1606064"/>
-        <a:ext cx="346901" cy="345969"/>
-      </dsp:txXfrm>
-    </dsp:sp>
-    <dsp:sp modelId="{CDC2BA57-16AE-4341-9248-3145FA7CD566}">
-      <dsp:nvSpPr>
-        <dsp:cNvPr id="0" name=""/>
-        <dsp:cNvSpPr/>
-      </dsp:nvSpPr>
-      <dsp:spPr>
-        <a:xfrm>
-          <a:off x="3562607" y="2333438"/>
-          <a:ext cx="2331327" cy="1398796"/>
-        </a:xfrm>
-        <a:prstGeom prst="roundRect">
-          <a:avLst>
-            <a:gd name="adj" fmla="val 10000"/>
-          </a:avLst>
-        </a:prstGeom>
-        <a:solidFill>
-          <a:schemeClr val="accent1">
-            <a:hueOff val="0"/>
-            <a:satOff val="0"/>
-            <a:lumOff val="0"/>
-            <a:alphaOff val="0"/>
-          </a:schemeClr>
-        </a:solidFill>
-        <a:ln w="12700" cap="flat" cmpd="sng" algn="ctr">
-          <a:solidFill>
-            <a:schemeClr val="lt1">
-              <a:hueOff val="0"/>
-              <a:satOff val="0"/>
-              <a:lumOff val="0"/>
-              <a:alphaOff val="0"/>
-            </a:schemeClr>
-          </a:solidFill>
-          <a:prstDash val="solid"/>
-          <a:miter lim="800000"/>
-        </a:ln>
-        <a:effectLst/>
-      </dsp:spPr>
-      <dsp:style>
-        <a:lnRef idx="2">
-          <a:scrgbClr r="0" g="0" b="0"/>
-        </a:lnRef>
-        <a:fillRef idx="1">
-          <a:scrgbClr r="0" g="0" b="0"/>
-        </a:fillRef>
-        <a:effectRef idx="0">
-          <a:scrgbClr r="0" g="0" b="0"/>
-        </a:effectRef>
-        <a:fontRef idx="minor">
-          <a:schemeClr val="lt1"/>
-        </a:fontRef>
-      </dsp:style>
-      <dsp:txBody>
-        <a:bodyPr spcFirstLastPara="0" vert="horz" wrap="square" lIns="76200" tIns="76200" rIns="76200" bIns="76200" numCol="1" spcCol="1270" anchor="ctr" anchorCtr="0">
-          <a:noAutofit/>
-        </a:bodyPr>
-        <a:lstStyle/>
-        <a:p>
-          <a:pPr lvl="0" algn="ctr" defTabSz="889000">
-            <a:lnSpc>
-              <a:spcPct val="90000"/>
-            </a:lnSpc>
-            <a:spcBef>
-              <a:spcPct val="0"/>
-            </a:spcBef>
-            <a:spcAft>
-              <a:spcPct val="35000"/>
-            </a:spcAft>
-          </a:pPr>
-          <a:r>
-            <a:rPr lang="en-US" sz="2000" kern="1200" smtClean="0"/>
-            <a:t>Visualisasi struktur pohon keluarga</a:t>
-          </a:r>
-          <a:endParaRPr lang="en-US" sz="2000" kern="1200"/>
-        </a:p>
-      </dsp:txBody>
-      <dsp:txXfrm>
-        <a:off x="3603576" y="2374407"/>
-        <a:ext cx="2249389" cy="1316858"/>
-      </dsp:txXfrm>
-    </dsp:sp>
   </dsp:spTree>
 </dsp:drawing>
 </file>
@@ -5874,7 +4816,7 @@
           <p:cNvPr id="2" name="Header Placeholder 1">
             <a:extLst>
               <a:ext uri="{FF2B5EF4-FFF2-40B4-BE49-F238E27FC236}">
-                <a16:creationId xmlns:a16="http://schemas.microsoft.com/office/drawing/2014/main" xmlns="" id="{27243D74-B9C1-450A-B0F3-6C6DCB0CF20B}"/>
+                <a16:creationId xmlns="" xmlns:a16="http://schemas.microsoft.com/office/drawing/2014/main" id="{27243D74-B9C1-450A-B0F3-6C6DCB0CF20B}"/>
               </a:ext>
             </a:extLst>
           </p:cNvPr>
@@ -5911,7 +4853,7 @@
           <p:cNvPr id="3" name="Date Placeholder 2">
             <a:extLst>
               <a:ext uri="{FF2B5EF4-FFF2-40B4-BE49-F238E27FC236}">
-                <a16:creationId xmlns:a16="http://schemas.microsoft.com/office/drawing/2014/main" xmlns="" id="{32C27C33-9BB1-41D5-A236-12767E7E722F}"/>
+                <a16:creationId xmlns="" xmlns:a16="http://schemas.microsoft.com/office/drawing/2014/main" id="{32C27C33-9BB1-41D5-A236-12767E7E722F}"/>
               </a:ext>
             </a:extLst>
           </p:cNvPr>
@@ -5941,7 +4883,7 @@
           <a:p>
             <a:fld id="{97AB3EA8-A58D-4C92-A3AB-D271CCC294C7}" type="datetimeFigureOut">
               <a:rPr lang="en-US" smtClean="0"/>
-              <a:t>7/25/19</a:t>
+              <a:t>7/29/2019</a:t>
             </a:fld>
             <a:endParaRPr lang="en-US" dirty="0"/>
           </a:p>
@@ -5952,7 +4894,7 @@
           <p:cNvPr id="4" name="Footer Placeholder 3">
             <a:extLst>
               <a:ext uri="{FF2B5EF4-FFF2-40B4-BE49-F238E27FC236}">
-                <a16:creationId xmlns:a16="http://schemas.microsoft.com/office/drawing/2014/main" xmlns="" id="{44A7EADB-04A4-4093-B238-438E2C7317A1}"/>
+                <a16:creationId xmlns="" xmlns:a16="http://schemas.microsoft.com/office/drawing/2014/main" id="{44A7EADB-04A4-4093-B238-438E2C7317A1}"/>
               </a:ext>
             </a:extLst>
           </p:cNvPr>
@@ -5989,7 +4931,7 @@
           <p:cNvPr id="5" name="Slide Number Placeholder 4">
             <a:extLst>
               <a:ext uri="{FF2B5EF4-FFF2-40B4-BE49-F238E27FC236}">
-                <a16:creationId xmlns:a16="http://schemas.microsoft.com/office/drawing/2014/main" xmlns="" id="{EDDD8696-706D-440E-AE04-4C644F0613E8}"/>
+                <a16:creationId xmlns="" xmlns:a16="http://schemas.microsoft.com/office/drawing/2014/main" id="{EDDD8696-706D-440E-AE04-4C644F0613E8}"/>
               </a:ext>
             </a:extLst>
           </p:cNvPr>
@@ -6118,7 +5060,7 @@
           <a:p>
             <a:fld id="{0AEFB4FA-E877-413E-B608-88789D806C57}" type="datetimeFigureOut">
               <a:rPr lang="en-US" noProof="0" smtClean="0"/>
-              <a:t>7/25/19</a:t>
+              <a:t>7/29/2019</a:t>
             </a:fld>
             <a:endParaRPr lang="en-US" noProof="0" dirty="0"/>
           </a:p>
@@ -9002,7 +7944,7 @@
           <p:cNvPr id="2" name="Title 1">
             <a:extLst>
               <a:ext uri="{FF2B5EF4-FFF2-40B4-BE49-F238E27FC236}">
-                <a16:creationId xmlns:a16="http://schemas.microsoft.com/office/drawing/2014/main" xmlns="" id="{2456FD49-C258-4333-9422-358C976A341C}"/>
+                <a16:creationId xmlns="" xmlns:a16="http://schemas.microsoft.com/office/drawing/2014/main" id="{2456FD49-C258-4333-9422-358C976A341C}"/>
               </a:ext>
             </a:extLst>
           </p:cNvPr>
@@ -9046,7 +7988,7 @@
           <p:cNvPr id="3" name="Subtitle 2">
             <a:extLst>
               <a:ext uri="{FF2B5EF4-FFF2-40B4-BE49-F238E27FC236}">
-                <a16:creationId xmlns:a16="http://schemas.microsoft.com/office/drawing/2014/main" xmlns="" id="{59758E15-A93D-4FB9-843D-1490E27A151B}"/>
+                <a16:creationId xmlns="" xmlns:a16="http://schemas.microsoft.com/office/drawing/2014/main" id="{59758E15-A93D-4FB9-843D-1490E27A151B}"/>
               </a:ext>
             </a:extLst>
           </p:cNvPr>
@@ -9123,7 +8065,7 @@
           <p:cNvPr id="13" name="Picture Placeholder 12">
             <a:extLst>
               <a:ext uri="{FF2B5EF4-FFF2-40B4-BE49-F238E27FC236}">
-                <a16:creationId xmlns:a16="http://schemas.microsoft.com/office/drawing/2014/main" xmlns="" id="{BCCC559D-0EC3-432C-B397-6897B366DF36}"/>
+                <a16:creationId xmlns="" xmlns:a16="http://schemas.microsoft.com/office/drawing/2014/main" id="{BCCC559D-0EC3-432C-B397-6897B366DF36}"/>
               </a:ext>
             </a:extLst>
           </p:cNvPr>
@@ -9168,7 +8110,7 @@
           <p:cNvPr id="14" name="Group 13">
             <a:extLst>
               <a:ext uri="{FF2B5EF4-FFF2-40B4-BE49-F238E27FC236}">
-                <a16:creationId xmlns:a16="http://schemas.microsoft.com/office/drawing/2014/main" xmlns="" id="{0DC2055F-AE3F-46BE-B57E-A0F1A86D1C36}"/>
+                <a16:creationId xmlns="" xmlns:a16="http://schemas.microsoft.com/office/drawing/2014/main" id="{0DC2055F-AE3F-46BE-B57E-A0F1A86D1C36}"/>
               </a:ext>
             </a:extLst>
           </p:cNvPr>
@@ -9193,7 +8135,7 @@
             <p:cNvPr id="15" name="Freeform 5">
               <a:extLst>
                 <a:ext uri="{FF2B5EF4-FFF2-40B4-BE49-F238E27FC236}">
-                  <a16:creationId xmlns:a16="http://schemas.microsoft.com/office/drawing/2014/main" xmlns="" id="{C98EF042-A3B8-406D-BC16-153A989F571A}"/>
+                  <a16:creationId xmlns="" xmlns:a16="http://schemas.microsoft.com/office/drawing/2014/main" id="{C98EF042-A3B8-406D-BC16-153A989F571A}"/>
                 </a:ext>
               </a:extLst>
             </p:cNvPr>
@@ -9383,7 +8325,7 @@
             <p:cNvPr id="16" name="Freeform 6">
               <a:extLst>
                 <a:ext uri="{FF2B5EF4-FFF2-40B4-BE49-F238E27FC236}">
-                  <a16:creationId xmlns:a16="http://schemas.microsoft.com/office/drawing/2014/main" xmlns="" id="{68E5FAC9-A660-4D7A-AC84-0A7C8CC3BB65}"/>
+                  <a16:creationId xmlns="" xmlns:a16="http://schemas.microsoft.com/office/drawing/2014/main" id="{68E5FAC9-A660-4D7A-AC84-0A7C8CC3BB65}"/>
                 </a:ext>
               </a:extLst>
             </p:cNvPr>
@@ -9534,7 +8476,7 @@
           <p:cNvPr id="9" name="Picture 8">
             <a:extLst>
               <a:ext uri="{FF2B5EF4-FFF2-40B4-BE49-F238E27FC236}">
-                <a16:creationId xmlns:a16="http://schemas.microsoft.com/office/drawing/2014/main" xmlns="" id="{4FE28ACC-E44C-4381-B768-0310810E78D2}"/>
+                <a16:creationId xmlns="" xmlns:a16="http://schemas.microsoft.com/office/drawing/2014/main" id="{4FE28ACC-E44C-4381-B768-0310810E78D2}"/>
               </a:ext>
             </a:extLst>
           </p:cNvPr>
@@ -9570,7 +8512,7 @@
           <p:cNvPr id="5" name="Straight Connector 4">
             <a:extLst>
               <a:ext uri="{FF2B5EF4-FFF2-40B4-BE49-F238E27FC236}">
-                <a16:creationId xmlns:a16="http://schemas.microsoft.com/office/drawing/2014/main" xmlns="" id="{819AFA09-F4B1-493D-BCAD-FF30C20CD1AA}"/>
+                <a16:creationId xmlns="" xmlns:a16="http://schemas.microsoft.com/office/drawing/2014/main" id="{819AFA09-F4B1-493D-BCAD-FF30C20CD1AA}"/>
               </a:ext>
             </a:extLst>
           </p:cNvPr>
@@ -9636,7 +8578,7 @@
           <p:cNvPr id="3" name="Subtitle 2">
             <a:extLst>
               <a:ext uri="{FF2B5EF4-FFF2-40B4-BE49-F238E27FC236}">
-                <a16:creationId xmlns:a16="http://schemas.microsoft.com/office/drawing/2014/main" xmlns="" id="{59758E15-A93D-4FB9-843D-1490E27A151B}"/>
+                <a16:creationId xmlns="" xmlns:a16="http://schemas.microsoft.com/office/drawing/2014/main" id="{59758E15-A93D-4FB9-843D-1490E27A151B}"/>
               </a:ext>
             </a:extLst>
           </p:cNvPr>
@@ -9712,7 +8654,7 @@
           <p:cNvPr id="13" name="Picture Placeholder 12">
             <a:extLst>
               <a:ext uri="{FF2B5EF4-FFF2-40B4-BE49-F238E27FC236}">
-                <a16:creationId xmlns:a16="http://schemas.microsoft.com/office/drawing/2014/main" xmlns="" id="{BCCC559D-0EC3-432C-B397-6897B366DF36}"/>
+                <a16:creationId xmlns="" xmlns:a16="http://schemas.microsoft.com/office/drawing/2014/main" id="{BCCC559D-0EC3-432C-B397-6897B366DF36}"/>
               </a:ext>
             </a:extLst>
           </p:cNvPr>
@@ -9757,7 +8699,7 @@
           <p:cNvPr id="14" name="Group 13">
             <a:extLst>
               <a:ext uri="{FF2B5EF4-FFF2-40B4-BE49-F238E27FC236}">
-                <a16:creationId xmlns:a16="http://schemas.microsoft.com/office/drawing/2014/main" xmlns="" id="{0DC2055F-AE3F-46BE-B57E-A0F1A86D1C36}"/>
+                <a16:creationId xmlns="" xmlns:a16="http://schemas.microsoft.com/office/drawing/2014/main" id="{0DC2055F-AE3F-46BE-B57E-A0F1A86D1C36}"/>
               </a:ext>
             </a:extLst>
           </p:cNvPr>
@@ -9782,7 +8724,7 @@
             <p:cNvPr id="15" name="Freeform 5">
               <a:extLst>
                 <a:ext uri="{FF2B5EF4-FFF2-40B4-BE49-F238E27FC236}">
-                  <a16:creationId xmlns:a16="http://schemas.microsoft.com/office/drawing/2014/main" xmlns="" id="{C98EF042-A3B8-406D-BC16-153A989F571A}"/>
+                  <a16:creationId xmlns="" xmlns:a16="http://schemas.microsoft.com/office/drawing/2014/main" id="{C98EF042-A3B8-406D-BC16-153A989F571A}"/>
                 </a:ext>
               </a:extLst>
             </p:cNvPr>
@@ -9972,7 +8914,7 @@
             <p:cNvPr id="16" name="Freeform 6">
               <a:extLst>
                 <a:ext uri="{FF2B5EF4-FFF2-40B4-BE49-F238E27FC236}">
-                  <a16:creationId xmlns:a16="http://schemas.microsoft.com/office/drawing/2014/main" xmlns="" id="{68E5FAC9-A660-4D7A-AC84-0A7C8CC3BB65}"/>
+                  <a16:creationId xmlns="" xmlns:a16="http://schemas.microsoft.com/office/drawing/2014/main" id="{68E5FAC9-A660-4D7A-AC84-0A7C8CC3BB65}"/>
                 </a:ext>
               </a:extLst>
             </p:cNvPr>
@@ -10123,7 +9065,7 @@
           <p:cNvPr id="9" name="Picture 8">
             <a:extLst>
               <a:ext uri="{FF2B5EF4-FFF2-40B4-BE49-F238E27FC236}">
-                <a16:creationId xmlns:a16="http://schemas.microsoft.com/office/drawing/2014/main" xmlns="" id="{4FE28ACC-E44C-4381-B768-0310810E78D2}"/>
+                <a16:creationId xmlns="" xmlns:a16="http://schemas.microsoft.com/office/drawing/2014/main" id="{4FE28ACC-E44C-4381-B768-0310810E78D2}"/>
               </a:ext>
             </a:extLst>
           </p:cNvPr>
@@ -10159,7 +9101,7 @@
           <p:cNvPr id="5" name="Straight Connector 4">
             <a:extLst>
               <a:ext uri="{FF2B5EF4-FFF2-40B4-BE49-F238E27FC236}">
-                <a16:creationId xmlns:a16="http://schemas.microsoft.com/office/drawing/2014/main" xmlns="" id="{819AFA09-F4B1-493D-BCAD-FF30C20CD1AA}"/>
+                <a16:creationId xmlns="" xmlns:a16="http://schemas.microsoft.com/office/drawing/2014/main" id="{819AFA09-F4B1-493D-BCAD-FF30C20CD1AA}"/>
               </a:ext>
             </a:extLst>
           </p:cNvPr>
@@ -10195,7 +9137,7 @@
           <p:cNvPr id="7" name="Text Placeholder 6">
             <a:extLst>
               <a:ext uri="{FF2B5EF4-FFF2-40B4-BE49-F238E27FC236}">
-                <a16:creationId xmlns:a16="http://schemas.microsoft.com/office/drawing/2014/main" xmlns="" id="{4E0FBE0E-A6B0-483E-93DD-5C20DA069DBC}"/>
+                <a16:creationId xmlns="" xmlns:a16="http://schemas.microsoft.com/office/drawing/2014/main" id="{4E0FBE0E-A6B0-483E-93DD-5C20DA069DBC}"/>
               </a:ext>
             </a:extLst>
           </p:cNvPr>
@@ -10244,7 +9186,7 @@
           <p:cNvPr id="17" name="Graphic 16" descr="Envelope">
             <a:extLst>
               <a:ext uri="{FF2B5EF4-FFF2-40B4-BE49-F238E27FC236}">
-                <a16:creationId xmlns:a16="http://schemas.microsoft.com/office/drawing/2014/main" xmlns="" id="{E5B30B87-6C2E-48F1-9026-E4F6BEA1CFE7}"/>
+                <a16:creationId xmlns="" xmlns:a16="http://schemas.microsoft.com/office/drawing/2014/main" id="{E5B30B87-6C2E-48F1-9026-E4F6BEA1CFE7}"/>
               </a:ext>
             </a:extLst>
           </p:cNvPr>
@@ -10260,7 +9202,7 @@
                 <a14:useLocalDpi xmlns:a14="http://schemas.microsoft.com/office/drawing/2010/main"/>
               </a:ext>
               <a:ext uri="{96DAC541-7B7A-43D3-8B79-37D633B846F1}">
-                <asvg:svgBlip xmlns:asvg="http://schemas.microsoft.com/office/drawing/2016/SVG/main" xmlns="" r:embed="rId4"/>
+                <asvg:svgBlip xmlns="" xmlns:asvg="http://schemas.microsoft.com/office/drawing/2016/SVG/main" r:embed="rId4"/>
               </a:ext>
             </a:extLst>
           </a:blip>
@@ -10283,7 +9225,7 @@
           <p:cNvPr id="18" name="Graphic 17" descr="Network">
             <a:extLst>
               <a:ext uri="{FF2B5EF4-FFF2-40B4-BE49-F238E27FC236}">
-                <a16:creationId xmlns:a16="http://schemas.microsoft.com/office/drawing/2014/main" xmlns="" id="{2DA3CFE0-4ED8-4345-A158-94E70F463E99}"/>
+                <a16:creationId xmlns="" xmlns:a16="http://schemas.microsoft.com/office/drawing/2014/main" id="{2DA3CFE0-4ED8-4345-A158-94E70F463E99}"/>
               </a:ext>
             </a:extLst>
           </p:cNvPr>
@@ -10299,7 +9241,7 @@
                 <a14:useLocalDpi xmlns:a14="http://schemas.microsoft.com/office/drawing/2010/main"/>
               </a:ext>
               <a:ext uri="{96DAC541-7B7A-43D3-8B79-37D633B846F1}">
-                <asvg:svgBlip xmlns:asvg="http://schemas.microsoft.com/office/drawing/2016/SVG/main" xmlns="" r:embed="rId6"/>
+                <asvg:svgBlip xmlns="" xmlns:asvg="http://schemas.microsoft.com/office/drawing/2016/SVG/main" r:embed="rId6"/>
               </a:ext>
             </a:extLst>
           </a:blip>
@@ -10322,7 +9264,7 @@
           <p:cNvPr id="2" name="Title 1">
             <a:extLst>
               <a:ext uri="{FF2B5EF4-FFF2-40B4-BE49-F238E27FC236}">
-                <a16:creationId xmlns:a16="http://schemas.microsoft.com/office/drawing/2014/main" xmlns="" id="{2CE9908F-CF81-43F9-880A-401D0C0FB2ED}"/>
+                <a16:creationId xmlns="" xmlns:a16="http://schemas.microsoft.com/office/drawing/2014/main" id="{2CE9908F-CF81-43F9-880A-401D0C0FB2ED}"/>
               </a:ext>
             </a:extLst>
           </p:cNvPr>
@@ -10400,7 +9342,7 @@
           <p:cNvPr id="4" name="Rectangle 3">
             <a:extLst>
               <a:ext uri="{FF2B5EF4-FFF2-40B4-BE49-F238E27FC236}">
-                <a16:creationId xmlns:a16="http://schemas.microsoft.com/office/drawing/2014/main" xmlns="" id="{86299464-ED20-4919-8B3A-2CFAE8DA2347}"/>
+                <a16:creationId xmlns="" xmlns:a16="http://schemas.microsoft.com/office/drawing/2014/main" id="{86299464-ED20-4919-8B3A-2CFAE8DA2347}"/>
               </a:ext>
             </a:extLst>
           </p:cNvPr>
@@ -10452,7 +9394,7 @@
           <p:cNvPr id="13" name="Picture Placeholder 12">
             <a:extLst>
               <a:ext uri="{FF2B5EF4-FFF2-40B4-BE49-F238E27FC236}">
-                <a16:creationId xmlns:a16="http://schemas.microsoft.com/office/drawing/2014/main" xmlns="" id="{BCCC559D-0EC3-432C-B397-6897B366DF36}"/>
+                <a16:creationId xmlns="" xmlns:a16="http://schemas.microsoft.com/office/drawing/2014/main" id="{BCCC559D-0EC3-432C-B397-6897B366DF36}"/>
               </a:ext>
             </a:extLst>
           </p:cNvPr>
@@ -10497,7 +9439,7 @@
           <p:cNvPr id="14" name="Group 13">
             <a:extLst>
               <a:ext uri="{FF2B5EF4-FFF2-40B4-BE49-F238E27FC236}">
-                <a16:creationId xmlns:a16="http://schemas.microsoft.com/office/drawing/2014/main" xmlns="" id="{0DC2055F-AE3F-46BE-B57E-A0F1A86D1C36}"/>
+                <a16:creationId xmlns="" xmlns:a16="http://schemas.microsoft.com/office/drawing/2014/main" id="{0DC2055F-AE3F-46BE-B57E-A0F1A86D1C36}"/>
               </a:ext>
             </a:extLst>
           </p:cNvPr>
@@ -10522,7 +9464,7 @@
             <p:cNvPr id="15" name="Freeform 5">
               <a:extLst>
                 <a:ext uri="{FF2B5EF4-FFF2-40B4-BE49-F238E27FC236}">
-                  <a16:creationId xmlns:a16="http://schemas.microsoft.com/office/drawing/2014/main" xmlns="" id="{C98EF042-A3B8-406D-BC16-153A989F571A}"/>
+                  <a16:creationId xmlns="" xmlns:a16="http://schemas.microsoft.com/office/drawing/2014/main" id="{C98EF042-A3B8-406D-BC16-153A989F571A}"/>
                 </a:ext>
               </a:extLst>
             </p:cNvPr>
@@ -10712,7 +9654,7 @@
             <p:cNvPr id="16" name="Freeform 6">
               <a:extLst>
                 <a:ext uri="{FF2B5EF4-FFF2-40B4-BE49-F238E27FC236}">
-                  <a16:creationId xmlns:a16="http://schemas.microsoft.com/office/drawing/2014/main" xmlns="" id="{68E5FAC9-A660-4D7A-AC84-0A7C8CC3BB65}"/>
+                  <a16:creationId xmlns="" xmlns:a16="http://schemas.microsoft.com/office/drawing/2014/main" id="{68E5FAC9-A660-4D7A-AC84-0A7C8CC3BB65}"/>
                 </a:ext>
               </a:extLst>
             </p:cNvPr>
@@ -10863,7 +9805,7 @@
           <p:cNvPr id="9" name="Picture 8">
             <a:extLst>
               <a:ext uri="{FF2B5EF4-FFF2-40B4-BE49-F238E27FC236}">
-                <a16:creationId xmlns:a16="http://schemas.microsoft.com/office/drawing/2014/main" xmlns="" id="{4FE28ACC-E44C-4381-B768-0310810E78D2}"/>
+                <a16:creationId xmlns="" xmlns:a16="http://schemas.microsoft.com/office/drawing/2014/main" id="{4FE28ACC-E44C-4381-B768-0310810E78D2}"/>
               </a:ext>
             </a:extLst>
           </p:cNvPr>
@@ -10908,7 +9850,7 @@
           <p:cNvPr id="12" name="Straight Connector 11">
             <a:extLst>
               <a:ext uri="{FF2B5EF4-FFF2-40B4-BE49-F238E27FC236}">
-                <a16:creationId xmlns:a16="http://schemas.microsoft.com/office/drawing/2014/main" xmlns="" id="{77C312F4-62C2-4903-8C4B-423A8717E481}"/>
+                <a16:creationId xmlns="" xmlns:a16="http://schemas.microsoft.com/office/drawing/2014/main" id="{77C312F4-62C2-4903-8C4B-423A8717E481}"/>
               </a:ext>
             </a:extLst>
           </p:cNvPr>
@@ -10949,7 +9891,7 @@
           <p:cNvPr id="19" name="Graphic 18" descr="Envelope">
             <a:extLst>
               <a:ext uri="{FF2B5EF4-FFF2-40B4-BE49-F238E27FC236}">
-                <a16:creationId xmlns:a16="http://schemas.microsoft.com/office/drawing/2014/main" xmlns="" id="{A686352B-226C-4579-B831-0DC14EC3895E}"/>
+                <a16:creationId xmlns="" xmlns:a16="http://schemas.microsoft.com/office/drawing/2014/main" id="{A686352B-226C-4579-B831-0DC14EC3895E}"/>
               </a:ext>
             </a:extLst>
           </p:cNvPr>
@@ -10985,7 +9927,7 @@
           <p:cNvPr id="20" name="Graphic 19" descr="Network">
             <a:extLst>
               <a:ext uri="{FF2B5EF4-FFF2-40B4-BE49-F238E27FC236}">
-                <a16:creationId xmlns:a16="http://schemas.microsoft.com/office/drawing/2014/main" xmlns="" id="{460C8169-012B-451A-A6C2-6FEC0DC82AFC}"/>
+                <a16:creationId xmlns="" xmlns:a16="http://schemas.microsoft.com/office/drawing/2014/main" id="{460C8169-012B-451A-A6C2-6FEC0DC82AFC}"/>
               </a:ext>
             </a:extLst>
           </p:cNvPr>
@@ -11021,7 +9963,7 @@
           <p:cNvPr id="21" name="Subtitle 2">
             <a:extLst>
               <a:ext uri="{FF2B5EF4-FFF2-40B4-BE49-F238E27FC236}">
-                <a16:creationId xmlns:a16="http://schemas.microsoft.com/office/drawing/2014/main" xmlns="" id="{ADF17BC1-06CE-42EA-A970-31A7ED871AA4}"/>
+                <a16:creationId xmlns="" xmlns:a16="http://schemas.microsoft.com/office/drawing/2014/main" id="{ADF17BC1-06CE-42EA-A970-31A7ED871AA4}"/>
               </a:ext>
             </a:extLst>
           </p:cNvPr>
@@ -11097,7 +10039,7 @@
           <p:cNvPr id="22" name="Text Placeholder 6">
             <a:extLst>
               <a:ext uri="{FF2B5EF4-FFF2-40B4-BE49-F238E27FC236}">
-                <a16:creationId xmlns:a16="http://schemas.microsoft.com/office/drawing/2014/main" xmlns="" id="{7035F1B3-4E91-44FF-B4E7-E5D87C7A034C}"/>
+                <a16:creationId xmlns="" xmlns:a16="http://schemas.microsoft.com/office/drawing/2014/main" id="{7035F1B3-4E91-44FF-B4E7-E5D87C7A034C}"/>
               </a:ext>
             </a:extLst>
           </p:cNvPr>
@@ -11150,7 +10092,7 @@
           <p:cNvPr id="18" name="Title 1">
             <a:extLst>
               <a:ext uri="{FF2B5EF4-FFF2-40B4-BE49-F238E27FC236}">
-                <a16:creationId xmlns:a16="http://schemas.microsoft.com/office/drawing/2014/main" xmlns="" id="{525B5135-F466-4A63-A42C-3BB2BAA7D24D}"/>
+                <a16:creationId xmlns="" xmlns:a16="http://schemas.microsoft.com/office/drawing/2014/main" id="{525B5135-F466-4A63-A42C-3BB2BAA7D24D}"/>
               </a:ext>
             </a:extLst>
           </p:cNvPr>
@@ -11254,7 +10196,7 @@
           <p:cNvPr id="4" name="Rectangle 3">
             <a:extLst>
               <a:ext uri="{FF2B5EF4-FFF2-40B4-BE49-F238E27FC236}">
-                <a16:creationId xmlns:a16="http://schemas.microsoft.com/office/drawing/2014/main" xmlns="" id="{86299464-ED20-4919-8B3A-2CFAE8DA2347}"/>
+                <a16:creationId xmlns="" xmlns:a16="http://schemas.microsoft.com/office/drawing/2014/main" id="{86299464-ED20-4919-8B3A-2CFAE8DA2347}"/>
               </a:ext>
             </a:extLst>
           </p:cNvPr>
@@ -11306,7 +10248,7 @@
           <p:cNvPr id="6" name="Oval 5">
             <a:extLst>
               <a:ext uri="{FF2B5EF4-FFF2-40B4-BE49-F238E27FC236}">
-                <a16:creationId xmlns:a16="http://schemas.microsoft.com/office/drawing/2014/main" xmlns="" id="{1F54E98B-AC75-484D-9121-68498EB888AA}"/>
+                <a16:creationId xmlns="" xmlns:a16="http://schemas.microsoft.com/office/drawing/2014/main" id="{1F54E98B-AC75-484D-9121-68498EB888AA}"/>
               </a:ext>
             </a:extLst>
           </p:cNvPr>
@@ -11360,7 +10302,7 @@
           <p:cNvPr id="2" name="Title 1">
             <a:extLst>
               <a:ext uri="{FF2B5EF4-FFF2-40B4-BE49-F238E27FC236}">
-                <a16:creationId xmlns:a16="http://schemas.microsoft.com/office/drawing/2014/main" xmlns="" id="{2456FD49-C258-4333-9422-358C976A341C}"/>
+                <a16:creationId xmlns="" xmlns:a16="http://schemas.microsoft.com/office/drawing/2014/main" id="{2456FD49-C258-4333-9422-358C976A341C}"/>
               </a:ext>
             </a:extLst>
           </p:cNvPr>
@@ -11404,7 +10346,7 @@
           <p:cNvPr id="3" name="Subtitle 2">
             <a:extLst>
               <a:ext uri="{FF2B5EF4-FFF2-40B4-BE49-F238E27FC236}">
-                <a16:creationId xmlns:a16="http://schemas.microsoft.com/office/drawing/2014/main" xmlns="" id="{59758E15-A93D-4FB9-843D-1490E27A151B}"/>
+                <a16:creationId xmlns="" xmlns:a16="http://schemas.microsoft.com/office/drawing/2014/main" id="{59758E15-A93D-4FB9-843D-1490E27A151B}"/>
               </a:ext>
             </a:extLst>
           </p:cNvPr>
@@ -11481,7 +10423,7 @@
           <p:cNvPr id="14" name="Group 13">
             <a:extLst>
               <a:ext uri="{FF2B5EF4-FFF2-40B4-BE49-F238E27FC236}">
-                <a16:creationId xmlns:a16="http://schemas.microsoft.com/office/drawing/2014/main" xmlns="" id="{0DC2055F-AE3F-46BE-B57E-A0F1A86D1C36}"/>
+                <a16:creationId xmlns="" xmlns:a16="http://schemas.microsoft.com/office/drawing/2014/main" id="{0DC2055F-AE3F-46BE-B57E-A0F1A86D1C36}"/>
               </a:ext>
             </a:extLst>
           </p:cNvPr>
@@ -11506,7 +10448,7 @@
             <p:cNvPr id="15" name="Freeform 5">
               <a:extLst>
                 <a:ext uri="{FF2B5EF4-FFF2-40B4-BE49-F238E27FC236}">
-                  <a16:creationId xmlns:a16="http://schemas.microsoft.com/office/drawing/2014/main" xmlns="" id="{C98EF042-A3B8-406D-BC16-153A989F571A}"/>
+                  <a16:creationId xmlns="" xmlns:a16="http://schemas.microsoft.com/office/drawing/2014/main" id="{C98EF042-A3B8-406D-BC16-153A989F571A}"/>
                 </a:ext>
               </a:extLst>
             </p:cNvPr>
@@ -11696,7 +10638,7 @@
             <p:cNvPr id="16" name="Freeform 6">
               <a:extLst>
                 <a:ext uri="{FF2B5EF4-FFF2-40B4-BE49-F238E27FC236}">
-                  <a16:creationId xmlns:a16="http://schemas.microsoft.com/office/drawing/2014/main" xmlns="" id="{68E5FAC9-A660-4D7A-AC84-0A7C8CC3BB65}"/>
+                  <a16:creationId xmlns="" xmlns:a16="http://schemas.microsoft.com/office/drawing/2014/main" id="{68E5FAC9-A660-4D7A-AC84-0A7C8CC3BB65}"/>
                 </a:ext>
               </a:extLst>
             </p:cNvPr>
@@ -11847,7 +10789,7 @@
           <p:cNvPr id="9" name="Picture 8">
             <a:extLst>
               <a:ext uri="{FF2B5EF4-FFF2-40B4-BE49-F238E27FC236}">
-                <a16:creationId xmlns:a16="http://schemas.microsoft.com/office/drawing/2014/main" xmlns="" id="{4FE28ACC-E44C-4381-B768-0310810E78D2}"/>
+                <a16:creationId xmlns="" xmlns:a16="http://schemas.microsoft.com/office/drawing/2014/main" id="{4FE28ACC-E44C-4381-B768-0310810E78D2}"/>
               </a:ext>
             </a:extLst>
           </p:cNvPr>
@@ -11892,7 +10834,7 @@
           <p:cNvPr id="5" name="Straight Connector 4">
             <a:extLst>
               <a:ext uri="{FF2B5EF4-FFF2-40B4-BE49-F238E27FC236}">
-                <a16:creationId xmlns:a16="http://schemas.microsoft.com/office/drawing/2014/main" xmlns="" id="{819AFA09-F4B1-493D-BCAD-FF30C20CD1AA}"/>
+                <a16:creationId xmlns="" xmlns:a16="http://schemas.microsoft.com/office/drawing/2014/main" id="{819AFA09-F4B1-493D-BCAD-FF30C20CD1AA}"/>
               </a:ext>
             </a:extLst>
           </p:cNvPr>
@@ -11989,7 +10931,7 @@
           <p:cNvPr id="10" name="Rectangle 9">
             <a:extLst>
               <a:ext uri="{FF2B5EF4-FFF2-40B4-BE49-F238E27FC236}">
-                <a16:creationId xmlns:a16="http://schemas.microsoft.com/office/drawing/2014/main" xmlns="" id="{F9087E09-D75F-4E26-B01E-A1A09BA2EA70}"/>
+                <a16:creationId xmlns="" xmlns:a16="http://schemas.microsoft.com/office/drawing/2014/main" id="{F9087E09-D75F-4E26-B01E-A1A09BA2EA70}"/>
               </a:ext>
             </a:extLst>
           </p:cNvPr>
@@ -12041,7 +10983,7 @@
           <p:cNvPr id="2" name="Title 1">
             <a:extLst>
               <a:ext uri="{FF2B5EF4-FFF2-40B4-BE49-F238E27FC236}">
-                <a16:creationId xmlns:a16="http://schemas.microsoft.com/office/drawing/2014/main" xmlns="" id="{AF7A70B7-7ADE-4E0B-B956-363B0B1AA613}"/>
+                <a16:creationId xmlns="" xmlns:a16="http://schemas.microsoft.com/office/drawing/2014/main" id="{AF7A70B7-7ADE-4E0B-B956-363B0B1AA613}"/>
               </a:ext>
             </a:extLst>
           </p:cNvPr>
@@ -12085,7 +11027,7 @@
           <p:cNvPr id="8" name="Picture 7">
             <a:extLst>
               <a:ext uri="{FF2B5EF4-FFF2-40B4-BE49-F238E27FC236}">
-                <a16:creationId xmlns:a16="http://schemas.microsoft.com/office/drawing/2014/main" xmlns="" id="{25FC40B0-ED27-47E5-A3C2-32A8418567EE}"/>
+                <a16:creationId xmlns="" xmlns:a16="http://schemas.microsoft.com/office/drawing/2014/main" id="{25FC40B0-ED27-47E5-A3C2-32A8418567EE}"/>
               </a:ext>
             </a:extLst>
           </p:cNvPr>
@@ -12122,7 +11064,7 @@
           <p:cNvPr id="11" name="Oval 10">
             <a:extLst>
               <a:ext uri="{FF2B5EF4-FFF2-40B4-BE49-F238E27FC236}">
-                <a16:creationId xmlns:a16="http://schemas.microsoft.com/office/drawing/2014/main" xmlns="" id="{8931D2A9-0B92-4197-8802-80424C14EA7E}"/>
+                <a16:creationId xmlns="" xmlns:a16="http://schemas.microsoft.com/office/drawing/2014/main" id="{8931D2A9-0B92-4197-8802-80424C14EA7E}"/>
               </a:ext>
             </a:extLst>
           </p:cNvPr>
@@ -12174,7 +11116,7 @@
           <p:cNvPr id="6" name="Slide Number Placeholder 5">
             <a:extLst>
               <a:ext uri="{FF2B5EF4-FFF2-40B4-BE49-F238E27FC236}">
-                <a16:creationId xmlns:a16="http://schemas.microsoft.com/office/drawing/2014/main" xmlns="" id="{533B74B0-30B9-45C2-9AE6-45D1978AAFAE}"/>
+                <a16:creationId xmlns="" xmlns:a16="http://schemas.microsoft.com/office/drawing/2014/main" id="{533B74B0-30B9-45C2-9AE6-45D1978AAFAE}"/>
               </a:ext>
             </a:extLst>
           </p:cNvPr>
@@ -12218,7 +11160,7 @@
           <p:cNvPr id="4" name="Group 3">
             <a:extLst>
               <a:ext uri="{FF2B5EF4-FFF2-40B4-BE49-F238E27FC236}">
-                <a16:creationId xmlns:a16="http://schemas.microsoft.com/office/drawing/2014/main" xmlns="" id="{AD5251EA-F450-4DD1-995B-DC89513424C8}"/>
+                <a16:creationId xmlns="" xmlns:a16="http://schemas.microsoft.com/office/drawing/2014/main" id="{AD5251EA-F450-4DD1-995B-DC89513424C8}"/>
               </a:ext>
             </a:extLst>
           </p:cNvPr>
@@ -12238,7 +11180,7 @@
             <p:cNvPr id="17" name="Oval 16">
               <a:extLst>
                 <a:ext uri="{FF2B5EF4-FFF2-40B4-BE49-F238E27FC236}">
-                  <a16:creationId xmlns:a16="http://schemas.microsoft.com/office/drawing/2014/main" xmlns="" id="{44882F4E-E8C8-46FE-A9C8-7B79782767F6}"/>
+                  <a16:creationId xmlns="" xmlns:a16="http://schemas.microsoft.com/office/drawing/2014/main" id="{44882F4E-E8C8-46FE-A9C8-7B79782767F6}"/>
                 </a:ext>
               </a:extLst>
             </p:cNvPr>
@@ -12292,7 +11234,7 @@
             <p:cNvPr id="18" name="Group 17">
               <a:extLst>
                 <a:ext uri="{FF2B5EF4-FFF2-40B4-BE49-F238E27FC236}">
-                  <a16:creationId xmlns:a16="http://schemas.microsoft.com/office/drawing/2014/main" xmlns="" id="{965CD13B-04FB-40D5-AF62-2F43CF49BA9B}"/>
+                  <a16:creationId xmlns="" xmlns:a16="http://schemas.microsoft.com/office/drawing/2014/main" id="{965CD13B-04FB-40D5-AF62-2F43CF49BA9B}"/>
                 </a:ext>
               </a:extLst>
             </p:cNvPr>
@@ -12317,7 +11259,7 @@
               <p:cNvPr id="19" name="Freeform 5">
                 <a:extLst>
                   <a:ext uri="{FF2B5EF4-FFF2-40B4-BE49-F238E27FC236}">
-                    <a16:creationId xmlns:a16="http://schemas.microsoft.com/office/drawing/2014/main" xmlns="" id="{01876F8F-C11E-4FB2-8150-1F0602752F97}"/>
+                    <a16:creationId xmlns="" xmlns:a16="http://schemas.microsoft.com/office/drawing/2014/main" id="{01876F8F-C11E-4FB2-8150-1F0602752F97}"/>
                   </a:ext>
                 </a:extLst>
               </p:cNvPr>
@@ -12507,7 +11449,7 @@
               <p:cNvPr id="20" name="Freeform 6">
                 <a:extLst>
                   <a:ext uri="{FF2B5EF4-FFF2-40B4-BE49-F238E27FC236}">
-                    <a16:creationId xmlns:a16="http://schemas.microsoft.com/office/drawing/2014/main" xmlns="" id="{08A1D05F-5F61-4156-8C83-1A002AA1E886}"/>
+                    <a16:creationId xmlns="" xmlns:a16="http://schemas.microsoft.com/office/drawing/2014/main" id="{08A1D05F-5F61-4156-8C83-1A002AA1E886}"/>
                   </a:ext>
                 </a:extLst>
               </p:cNvPr>
@@ -12659,7 +11601,7 @@
           <p:cNvPr id="21" name="Text Placeholder 2">
             <a:extLst>
               <a:ext uri="{FF2B5EF4-FFF2-40B4-BE49-F238E27FC236}">
-                <a16:creationId xmlns:a16="http://schemas.microsoft.com/office/drawing/2014/main" xmlns="" id="{4D77C47B-CC1E-41DA-9146-5DFD63065491}"/>
+                <a16:creationId xmlns="" xmlns:a16="http://schemas.microsoft.com/office/drawing/2014/main" id="{4D77C47B-CC1E-41DA-9146-5DFD63065491}"/>
               </a:ext>
             </a:extLst>
           </p:cNvPr>
@@ -12830,7 +11772,7 @@
           <p:cNvPr id="22" name="Group 21">
             <a:extLst>
               <a:ext uri="{FF2B5EF4-FFF2-40B4-BE49-F238E27FC236}">
-                <a16:creationId xmlns:a16="http://schemas.microsoft.com/office/drawing/2014/main" xmlns="" id="{60E0B501-22AA-4685-BE9B-A267F6F675A7}"/>
+                <a16:creationId xmlns="" xmlns:a16="http://schemas.microsoft.com/office/drawing/2014/main" id="{60E0B501-22AA-4685-BE9B-A267F6F675A7}"/>
               </a:ext>
             </a:extLst>
           </p:cNvPr>
@@ -12855,7 +11797,7 @@
             <p:cNvPr id="24" name="Freeform 5">
               <a:extLst>
                 <a:ext uri="{FF2B5EF4-FFF2-40B4-BE49-F238E27FC236}">
-                  <a16:creationId xmlns:a16="http://schemas.microsoft.com/office/drawing/2014/main" xmlns="" id="{5D0E179E-CA3D-4874-9ACD-F8990F48F4BF}"/>
+                  <a16:creationId xmlns="" xmlns:a16="http://schemas.microsoft.com/office/drawing/2014/main" id="{5D0E179E-CA3D-4874-9ACD-F8990F48F4BF}"/>
                 </a:ext>
               </a:extLst>
             </p:cNvPr>
@@ -13045,7 +11987,7 @@
             <p:cNvPr id="25" name="Freeform 6">
               <a:extLst>
                 <a:ext uri="{FF2B5EF4-FFF2-40B4-BE49-F238E27FC236}">
-                  <a16:creationId xmlns:a16="http://schemas.microsoft.com/office/drawing/2014/main" xmlns="" id="{A9C53936-B93A-4CF6-8766-2FA93ACFEBE3}"/>
+                  <a16:creationId xmlns="" xmlns:a16="http://schemas.microsoft.com/office/drawing/2014/main" id="{A9C53936-B93A-4CF6-8766-2FA93ACFEBE3}"/>
                 </a:ext>
               </a:extLst>
             </p:cNvPr>
@@ -13195,7 +12137,7 @@
             <p:cNvPr id="26" name="Freeform 7">
               <a:extLst>
                 <a:ext uri="{FF2B5EF4-FFF2-40B4-BE49-F238E27FC236}">
-                  <a16:creationId xmlns:a16="http://schemas.microsoft.com/office/drawing/2014/main" xmlns="" id="{5776DEA2-5422-4F51-B359-652B71274D31}"/>
+                  <a16:creationId xmlns="" xmlns:a16="http://schemas.microsoft.com/office/drawing/2014/main" id="{5776DEA2-5422-4F51-B359-652B71274D31}"/>
                 </a:ext>
               </a:extLst>
             </p:cNvPr>
@@ -13336,7 +12278,7 @@
           <p:cNvPr id="7" name="Rectangle 6">
             <a:extLst>
               <a:ext uri="{FF2B5EF4-FFF2-40B4-BE49-F238E27FC236}">
-                <a16:creationId xmlns:a16="http://schemas.microsoft.com/office/drawing/2014/main" xmlns="" id="{76627016-BFC4-46D4-89DB-F72E3C3461EC}"/>
+                <a16:creationId xmlns="" xmlns:a16="http://schemas.microsoft.com/office/drawing/2014/main" id="{76627016-BFC4-46D4-89DB-F72E3C3461EC}"/>
               </a:ext>
             </a:extLst>
           </p:cNvPr>
@@ -13392,7 +12334,7 @@
           <p:cNvPr id="15" name="Oval 14">
             <a:extLst>
               <a:ext uri="{FF2B5EF4-FFF2-40B4-BE49-F238E27FC236}">
-                <a16:creationId xmlns:a16="http://schemas.microsoft.com/office/drawing/2014/main" xmlns="" id="{EF515B4A-CB20-4847-8E00-0DD66F1FEBB4}"/>
+                <a16:creationId xmlns="" xmlns:a16="http://schemas.microsoft.com/office/drawing/2014/main" id="{EF515B4A-CB20-4847-8E00-0DD66F1FEBB4}"/>
               </a:ext>
             </a:extLst>
           </p:cNvPr>
@@ -13444,7 +12386,7 @@
           <p:cNvPr id="16" name="Slide Number Placeholder 5">
             <a:extLst>
               <a:ext uri="{FF2B5EF4-FFF2-40B4-BE49-F238E27FC236}">
-                <a16:creationId xmlns:a16="http://schemas.microsoft.com/office/drawing/2014/main" xmlns="" id="{996B64B9-1DF0-4EE9-BAB5-72AFA94B9AFD}"/>
+                <a16:creationId xmlns="" xmlns:a16="http://schemas.microsoft.com/office/drawing/2014/main" id="{996B64B9-1DF0-4EE9-BAB5-72AFA94B9AFD}"/>
               </a:ext>
             </a:extLst>
           </p:cNvPr>
@@ -13488,7 +12430,7 @@
           <p:cNvPr id="27" name="Content Placeholder 2">
             <a:extLst>
               <a:ext uri="{FF2B5EF4-FFF2-40B4-BE49-F238E27FC236}">
-                <a16:creationId xmlns:a16="http://schemas.microsoft.com/office/drawing/2014/main" xmlns="" id="{1A1F33A2-66F7-4D85-99DD-7B00F265AC6D}"/>
+                <a16:creationId xmlns="" xmlns:a16="http://schemas.microsoft.com/office/drawing/2014/main" id="{1A1F33A2-66F7-4D85-99DD-7B00F265AC6D}"/>
               </a:ext>
             </a:extLst>
           </p:cNvPr>
@@ -13551,7 +12493,7 @@
           <p:cNvPr id="12" name="Picture 11">
             <a:extLst>
               <a:ext uri="{FF2B5EF4-FFF2-40B4-BE49-F238E27FC236}">
-                <a16:creationId xmlns:a16="http://schemas.microsoft.com/office/drawing/2014/main" xmlns="" id="{EC2DFD46-BF74-47BA-A496-92ED1979C360}"/>
+                <a16:creationId xmlns="" xmlns:a16="http://schemas.microsoft.com/office/drawing/2014/main" id="{EC2DFD46-BF74-47BA-A496-92ED1979C360}"/>
               </a:ext>
             </a:extLst>
           </p:cNvPr>
@@ -13587,7 +12529,7 @@
           <p:cNvPr id="13" name="Title 1">
             <a:extLst>
               <a:ext uri="{FF2B5EF4-FFF2-40B4-BE49-F238E27FC236}">
-                <a16:creationId xmlns:a16="http://schemas.microsoft.com/office/drawing/2014/main" xmlns="" id="{EF788279-D710-447A-9E71-4D1344575691}"/>
+                <a16:creationId xmlns="" xmlns:a16="http://schemas.microsoft.com/office/drawing/2014/main" id="{EF788279-D710-447A-9E71-4D1344575691}"/>
               </a:ext>
             </a:extLst>
           </p:cNvPr>
@@ -13657,7 +12599,7 @@
           <p:cNvPr id="18" name="Group 17">
             <a:extLst>
               <a:ext uri="{FF2B5EF4-FFF2-40B4-BE49-F238E27FC236}">
-                <a16:creationId xmlns:a16="http://schemas.microsoft.com/office/drawing/2014/main" xmlns="" id="{C2A6B906-ACDA-40FD-8AC8-0B693AB12796}"/>
+                <a16:creationId xmlns="" xmlns:a16="http://schemas.microsoft.com/office/drawing/2014/main" id="{C2A6B906-ACDA-40FD-8AC8-0B693AB12796}"/>
               </a:ext>
             </a:extLst>
           </p:cNvPr>
@@ -13682,7 +12624,7 @@
             <p:cNvPr id="19" name="Freeform 5">
               <a:extLst>
                 <a:ext uri="{FF2B5EF4-FFF2-40B4-BE49-F238E27FC236}">
-                  <a16:creationId xmlns:a16="http://schemas.microsoft.com/office/drawing/2014/main" xmlns="" id="{717F7366-5A99-4065-90C2-AE7DF5DD0F44}"/>
+                  <a16:creationId xmlns="" xmlns:a16="http://schemas.microsoft.com/office/drawing/2014/main" id="{717F7366-5A99-4065-90C2-AE7DF5DD0F44}"/>
                 </a:ext>
               </a:extLst>
             </p:cNvPr>
@@ -13872,7 +12814,7 @@
             <p:cNvPr id="20" name="Freeform 6">
               <a:extLst>
                 <a:ext uri="{FF2B5EF4-FFF2-40B4-BE49-F238E27FC236}">
-                  <a16:creationId xmlns:a16="http://schemas.microsoft.com/office/drawing/2014/main" xmlns="" id="{90A089CA-63B9-4456-B0B1-17C75EBFB982}"/>
+                  <a16:creationId xmlns="" xmlns:a16="http://schemas.microsoft.com/office/drawing/2014/main" id="{90A089CA-63B9-4456-B0B1-17C75EBFB982}"/>
                 </a:ext>
               </a:extLst>
             </p:cNvPr>
@@ -14022,7 +12964,7 @@
             <p:cNvPr id="22" name="Freeform 7">
               <a:extLst>
                 <a:ext uri="{FF2B5EF4-FFF2-40B4-BE49-F238E27FC236}">
-                  <a16:creationId xmlns:a16="http://schemas.microsoft.com/office/drawing/2014/main" xmlns="" id="{8D36B2D1-BCFE-43FC-8743-7B7A30E1AD5D}"/>
+                  <a16:creationId xmlns="" xmlns:a16="http://schemas.microsoft.com/office/drawing/2014/main" id="{8D36B2D1-BCFE-43FC-8743-7B7A30E1AD5D}"/>
                 </a:ext>
               </a:extLst>
             </p:cNvPr>
@@ -14163,7 +13105,7 @@
           <p:cNvPr id="7" name="Rectangle 6">
             <a:extLst>
               <a:ext uri="{FF2B5EF4-FFF2-40B4-BE49-F238E27FC236}">
-                <a16:creationId xmlns:a16="http://schemas.microsoft.com/office/drawing/2014/main" xmlns="" id="{76627016-BFC4-46D4-89DB-F72E3C3461EC}"/>
+                <a16:creationId xmlns="" xmlns:a16="http://schemas.microsoft.com/office/drawing/2014/main" id="{76627016-BFC4-46D4-89DB-F72E3C3461EC}"/>
               </a:ext>
             </a:extLst>
           </p:cNvPr>
@@ -14219,7 +13161,7 @@
           <p:cNvPr id="15" name="Oval 14">
             <a:extLst>
               <a:ext uri="{FF2B5EF4-FFF2-40B4-BE49-F238E27FC236}">
-                <a16:creationId xmlns:a16="http://schemas.microsoft.com/office/drawing/2014/main" xmlns="" id="{EF515B4A-CB20-4847-8E00-0DD66F1FEBB4}"/>
+                <a16:creationId xmlns="" xmlns:a16="http://schemas.microsoft.com/office/drawing/2014/main" id="{EF515B4A-CB20-4847-8E00-0DD66F1FEBB4}"/>
               </a:ext>
             </a:extLst>
           </p:cNvPr>
@@ -14271,7 +13213,7 @@
           <p:cNvPr id="16" name="Slide Number Placeholder 5">
             <a:extLst>
               <a:ext uri="{FF2B5EF4-FFF2-40B4-BE49-F238E27FC236}">
-                <a16:creationId xmlns:a16="http://schemas.microsoft.com/office/drawing/2014/main" xmlns="" id="{996B64B9-1DF0-4EE9-BAB5-72AFA94B9AFD}"/>
+                <a16:creationId xmlns="" xmlns:a16="http://schemas.microsoft.com/office/drawing/2014/main" id="{996B64B9-1DF0-4EE9-BAB5-72AFA94B9AFD}"/>
               </a:ext>
             </a:extLst>
           </p:cNvPr>
@@ -14315,7 +13257,7 @@
           <p:cNvPr id="14" name="Content Placeholder 2">
             <a:extLst>
               <a:ext uri="{FF2B5EF4-FFF2-40B4-BE49-F238E27FC236}">
-                <a16:creationId xmlns:a16="http://schemas.microsoft.com/office/drawing/2014/main" xmlns="" id="{079DA8F4-EDD3-4D62-A90B-8C3C1AFB0083}"/>
+                <a16:creationId xmlns="" xmlns:a16="http://schemas.microsoft.com/office/drawing/2014/main" id="{079DA8F4-EDD3-4D62-A90B-8C3C1AFB0083}"/>
               </a:ext>
             </a:extLst>
           </p:cNvPr>
@@ -14378,7 +13320,7 @@
           <p:cNvPr id="17" name="Content Placeholder 3">
             <a:extLst>
               <a:ext uri="{FF2B5EF4-FFF2-40B4-BE49-F238E27FC236}">
-                <a16:creationId xmlns:a16="http://schemas.microsoft.com/office/drawing/2014/main" xmlns="" id="{DA0DA994-B4A9-447A-BEBF-3EA31D3755A2}"/>
+                <a16:creationId xmlns="" xmlns:a16="http://schemas.microsoft.com/office/drawing/2014/main" id="{DA0DA994-B4A9-447A-BEBF-3EA31D3755A2}"/>
               </a:ext>
             </a:extLst>
           </p:cNvPr>
@@ -14441,7 +13383,7 @@
           <p:cNvPr id="13" name="Picture 12">
             <a:extLst>
               <a:ext uri="{FF2B5EF4-FFF2-40B4-BE49-F238E27FC236}">
-                <a16:creationId xmlns:a16="http://schemas.microsoft.com/office/drawing/2014/main" xmlns="" id="{332150F9-14BF-4DCB-884D-49596914C290}"/>
+                <a16:creationId xmlns="" xmlns:a16="http://schemas.microsoft.com/office/drawing/2014/main" id="{332150F9-14BF-4DCB-884D-49596914C290}"/>
               </a:ext>
             </a:extLst>
           </p:cNvPr>
@@ -14477,7 +13419,7 @@
           <p:cNvPr id="21" name="Title 1">
             <a:extLst>
               <a:ext uri="{FF2B5EF4-FFF2-40B4-BE49-F238E27FC236}">
-                <a16:creationId xmlns:a16="http://schemas.microsoft.com/office/drawing/2014/main" xmlns="" id="{19DEF115-82C2-4E9D-A22C-8DA561FB37B8}"/>
+                <a16:creationId xmlns="" xmlns:a16="http://schemas.microsoft.com/office/drawing/2014/main" id="{19DEF115-82C2-4E9D-A22C-8DA561FB37B8}"/>
               </a:ext>
             </a:extLst>
           </p:cNvPr>
@@ -14547,7 +13489,7 @@
           <p:cNvPr id="20" name="Group 19">
             <a:extLst>
               <a:ext uri="{FF2B5EF4-FFF2-40B4-BE49-F238E27FC236}">
-                <a16:creationId xmlns:a16="http://schemas.microsoft.com/office/drawing/2014/main" xmlns="" id="{616F52B4-215E-4237-893C-E22B23804744}"/>
+                <a16:creationId xmlns="" xmlns:a16="http://schemas.microsoft.com/office/drawing/2014/main" id="{616F52B4-215E-4237-893C-E22B23804744}"/>
               </a:ext>
             </a:extLst>
           </p:cNvPr>
@@ -14572,7 +13514,7 @@
             <p:cNvPr id="22" name="Freeform 5">
               <a:extLst>
                 <a:ext uri="{FF2B5EF4-FFF2-40B4-BE49-F238E27FC236}">
-                  <a16:creationId xmlns:a16="http://schemas.microsoft.com/office/drawing/2014/main" xmlns="" id="{B7C40C77-B795-4B07-B92D-2E8A56635773}"/>
+                  <a16:creationId xmlns="" xmlns:a16="http://schemas.microsoft.com/office/drawing/2014/main" id="{B7C40C77-B795-4B07-B92D-2E8A56635773}"/>
                 </a:ext>
               </a:extLst>
             </p:cNvPr>
@@ -14762,7 +13704,7 @@
             <p:cNvPr id="23" name="Freeform 6">
               <a:extLst>
                 <a:ext uri="{FF2B5EF4-FFF2-40B4-BE49-F238E27FC236}">
-                  <a16:creationId xmlns:a16="http://schemas.microsoft.com/office/drawing/2014/main" xmlns="" id="{6E703A1E-5F10-4BB5-9D52-77CB6F5994C0}"/>
+                  <a16:creationId xmlns="" xmlns:a16="http://schemas.microsoft.com/office/drawing/2014/main" id="{6E703A1E-5F10-4BB5-9D52-77CB6F5994C0}"/>
                 </a:ext>
               </a:extLst>
             </p:cNvPr>
@@ -14912,7 +13854,7 @@
             <p:cNvPr id="24" name="Freeform 7">
               <a:extLst>
                 <a:ext uri="{FF2B5EF4-FFF2-40B4-BE49-F238E27FC236}">
-                  <a16:creationId xmlns:a16="http://schemas.microsoft.com/office/drawing/2014/main" xmlns="" id="{22CEE04C-09CE-41CF-937D-EC2D3C23ECC6}"/>
+                  <a16:creationId xmlns="" xmlns:a16="http://schemas.microsoft.com/office/drawing/2014/main" id="{22CEE04C-09CE-41CF-937D-EC2D3C23ECC6}"/>
                 </a:ext>
               </a:extLst>
             </p:cNvPr>
@@ -15053,7 +13995,7 @@
           <p:cNvPr id="7" name="Rectangle 6">
             <a:extLst>
               <a:ext uri="{FF2B5EF4-FFF2-40B4-BE49-F238E27FC236}">
-                <a16:creationId xmlns:a16="http://schemas.microsoft.com/office/drawing/2014/main" xmlns="" id="{76627016-BFC4-46D4-89DB-F72E3C3461EC}"/>
+                <a16:creationId xmlns="" xmlns:a16="http://schemas.microsoft.com/office/drawing/2014/main" id="{76627016-BFC4-46D4-89DB-F72E3C3461EC}"/>
               </a:ext>
             </a:extLst>
           </p:cNvPr>
@@ -15109,7 +14051,7 @@
           <p:cNvPr id="15" name="Oval 14">
             <a:extLst>
               <a:ext uri="{FF2B5EF4-FFF2-40B4-BE49-F238E27FC236}">
-                <a16:creationId xmlns:a16="http://schemas.microsoft.com/office/drawing/2014/main" xmlns="" id="{EF515B4A-CB20-4847-8E00-0DD66F1FEBB4}"/>
+                <a16:creationId xmlns="" xmlns:a16="http://schemas.microsoft.com/office/drawing/2014/main" id="{EF515B4A-CB20-4847-8E00-0DD66F1FEBB4}"/>
               </a:ext>
             </a:extLst>
           </p:cNvPr>
@@ -15161,7 +14103,7 @@
           <p:cNvPr id="16" name="Slide Number Placeholder 5">
             <a:extLst>
               <a:ext uri="{FF2B5EF4-FFF2-40B4-BE49-F238E27FC236}">
-                <a16:creationId xmlns:a16="http://schemas.microsoft.com/office/drawing/2014/main" xmlns="" id="{996B64B9-1DF0-4EE9-BAB5-72AFA94B9AFD}"/>
+                <a16:creationId xmlns="" xmlns:a16="http://schemas.microsoft.com/office/drawing/2014/main" id="{996B64B9-1DF0-4EE9-BAB5-72AFA94B9AFD}"/>
               </a:ext>
             </a:extLst>
           </p:cNvPr>
@@ -15205,7 +14147,7 @@
           <p:cNvPr id="14" name="Text Placeholder 2">
             <a:extLst>
               <a:ext uri="{FF2B5EF4-FFF2-40B4-BE49-F238E27FC236}">
-                <a16:creationId xmlns:a16="http://schemas.microsoft.com/office/drawing/2014/main" xmlns="" id="{774CF4BA-8DCB-42CF-A2C4-D6AF95EE3F54}"/>
+                <a16:creationId xmlns="" xmlns:a16="http://schemas.microsoft.com/office/drawing/2014/main" id="{774CF4BA-8DCB-42CF-A2C4-D6AF95EE3F54}"/>
               </a:ext>
             </a:extLst>
           </p:cNvPr>
@@ -15280,7 +14222,7 @@
           <p:cNvPr id="17" name="Content Placeholder 3">
             <a:extLst>
               <a:ext uri="{FF2B5EF4-FFF2-40B4-BE49-F238E27FC236}">
-                <a16:creationId xmlns:a16="http://schemas.microsoft.com/office/drawing/2014/main" xmlns="" id="{67BA8B6E-A28D-4658-8C91-6CA7BD539B85}"/>
+                <a16:creationId xmlns="" xmlns:a16="http://schemas.microsoft.com/office/drawing/2014/main" id="{67BA8B6E-A28D-4658-8C91-6CA7BD539B85}"/>
               </a:ext>
             </a:extLst>
           </p:cNvPr>
@@ -15343,7 +14285,7 @@
           <p:cNvPr id="18" name="Text Placeholder 4">
             <a:extLst>
               <a:ext uri="{FF2B5EF4-FFF2-40B4-BE49-F238E27FC236}">
-                <a16:creationId xmlns:a16="http://schemas.microsoft.com/office/drawing/2014/main" xmlns="" id="{F73B3215-82DB-4DBF-9E77-3AE2308C6920}"/>
+                <a16:creationId xmlns="" xmlns:a16="http://schemas.microsoft.com/office/drawing/2014/main" id="{F73B3215-82DB-4DBF-9E77-3AE2308C6920}"/>
               </a:ext>
             </a:extLst>
           </p:cNvPr>
@@ -15418,7 +14360,7 @@
           <p:cNvPr id="19" name="Content Placeholder 5">
             <a:extLst>
               <a:ext uri="{FF2B5EF4-FFF2-40B4-BE49-F238E27FC236}">
-                <a16:creationId xmlns:a16="http://schemas.microsoft.com/office/drawing/2014/main" xmlns="" id="{8DFD34E8-36CC-4FFE-926B-C170208FEDB8}"/>
+                <a16:creationId xmlns="" xmlns:a16="http://schemas.microsoft.com/office/drawing/2014/main" id="{8DFD34E8-36CC-4FFE-926B-C170208FEDB8}"/>
               </a:ext>
             </a:extLst>
           </p:cNvPr>
@@ -15481,7 +14423,7 @@
           <p:cNvPr id="21" name="Picture 20">
             <a:extLst>
               <a:ext uri="{FF2B5EF4-FFF2-40B4-BE49-F238E27FC236}">
-                <a16:creationId xmlns:a16="http://schemas.microsoft.com/office/drawing/2014/main" xmlns="" id="{03383C6B-3BE4-4380-AF26-1C21492FCE8A}"/>
+                <a16:creationId xmlns="" xmlns:a16="http://schemas.microsoft.com/office/drawing/2014/main" id="{03383C6B-3BE4-4380-AF26-1C21492FCE8A}"/>
               </a:ext>
             </a:extLst>
           </p:cNvPr>
@@ -15517,7 +14459,7 @@
           <p:cNvPr id="25" name="Title 1">
             <a:extLst>
               <a:ext uri="{FF2B5EF4-FFF2-40B4-BE49-F238E27FC236}">
-                <a16:creationId xmlns:a16="http://schemas.microsoft.com/office/drawing/2014/main" xmlns="" id="{AE3770E9-CB74-47B0-8229-91F6F756015E}"/>
+                <a16:creationId xmlns="" xmlns:a16="http://schemas.microsoft.com/office/drawing/2014/main" id="{AE3770E9-CB74-47B0-8229-91F6F756015E}"/>
               </a:ext>
             </a:extLst>
           </p:cNvPr>
@@ -15587,7 +14529,7 @@
           <p:cNvPr id="22" name="Picture Placeholder 21">
             <a:extLst>
               <a:ext uri="{FF2B5EF4-FFF2-40B4-BE49-F238E27FC236}">
-                <a16:creationId xmlns:a16="http://schemas.microsoft.com/office/drawing/2014/main" xmlns="" id="{C57825D7-DD33-4B70-BBBE-D46E7A5352EC}"/>
+                <a16:creationId xmlns="" xmlns:a16="http://schemas.microsoft.com/office/drawing/2014/main" id="{C57825D7-DD33-4B70-BBBE-D46E7A5352EC}"/>
               </a:ext>
             </a:extLst>
           </p:cNvPr>
@@ -15725,7 +14667,7 @@
           <p:cNvPr id="14" name="Group 13">
             <a:extLst>
               <a:ext uri="{FF2B5EF4-FFF2-40B4-BE49-F238E27FC236}">
-                <a16:creationId xmlns:a16="http://schemas.microsoft.com/office/drawing/2014/main" xmlns="" id="{0DC2055F-AE3F-46BE-B57E-A0F1A86D1C36}"/>
+                <a16:creationId xmlns="" xmlns:a16="http://schemas.microsoft.com/office/drawing/2014/main" id="{0DC2055F-AE3F-46BE-B57E-A0F1A86D1C36}"/>
               </a:ext>
             </a:extLst>
           </p:cNvPr>
@@ -15750,7 +14692,7 @@
             <p:cNvPr id="15" name="Freeform 5">
               <a:extLst>
                 <a:ext uri="{FF2B5EF4-FFF2-40B4-BE49-F238E27FC236}">
-                  <a16:creationId xmlns:a16="http://schemas.microsoft.com/office/drawing/2014/main" xmlns="" id="{C98EF042-A3B8-406D-BC16-153A989F571A}"/>
+                  <a16:creationId xmlns="" xmlns:a16="http://schemas.microsoft.com/office/drawing/2014/main" id="{C98EF042-A3B8-406D-BC16-153A989F571A}"/>
                 </a:ext>
               </a:extLst>
             </p:cNvPr>
@@ -15940,7 +14882,7 @@
             <p:cNvPr id="16" name="Freeform 6">
               <a:extLst>
                 <a:ext uri="{FF2B5EF4-FFF2-40B4-BE49-F238E27FC236}">
-                  <a16:creationId xmlns:a16="http://schemas.microsoft.com/office/drawing/2014/main" xmlns="" id="{68E5FAC9-A660-4D7A-AC84-0A7C8CC3BB65}"/>
+                  <a16:creationId xmlns="" xmlns:a16="http://schemas.microsoft.com/office/drawing/2014/main" id="{68E5FAC9-A660-4D7A-AC84-0A7C8CC3BB65}"/>
                 </a:ext>
               </a:extLst>
             </p:cNvPr>
@@ -16091,7 +15033,7 @@
           <p:cNvPr id="19" name="Title 1">
             <a:extLst>
               <a:ext uri="{FF2B5EF4-FFF2-40B4-BE49-F238E27FC236}">
-                <a16:creationId xmlns:a16="http://schemas.microsoft.com/office/drawing/2014/main" xmlns="" id="{19A1397F-1946-4CBE-9EC5-159C3CBC78B6}"/>
+                <a16:creationId xmlns="" xmlns:a16="http://schemas.microsoft.com/office/drawing/2014/main" id="{19A1397F-1946-4CBE-9EC5-159C3CBC78B6}"/>
               </a:ext>
             </a:extLst>
           </p:cNvPr>
@@ -16129,7 +15071,7 @@
           <p:cNvPr id="20" name="Text Placeholder 3">
             <a:extLst>
               <a:ext uri="{FF2B5EF4-FFF2-40B4-BE49-F238E27FC236}">
-                <a16:creationId xmlns:a16="http://schemas.microsoft.com/office/drawing/2014/main" xmlns="" id="{C535F2AB-153E-44A9-97BE-00553BEC1770}"/>
+                <a16:creationId xmlns="" xmlns:a16="http://schemas.microsoft.com/office/drawing/2014/main" id="{C535F2AB-153E-44A9-97BE-00553BEC1770}"/>
               </a:ext>
             </a:extLst>
           </p:cNvPr>
@@ -16201,7 +15143,7 @@
           <p:cNvPr id="8" name="Picture 7">
             <a:extLst>
               <a:ext uri="{FF2B5EF4-FFF2-40B4-BE49-F238E27FC236}">
-                <a16:creationId xmlns:a16="http://schemas.microsoft.com/office/drawing/2014/main" xmlns="" id="{06298D65-1027-4897-A948-DCEEF8FC3D98}"/>
+                <a16:creationId xmlns="" xmlns:a16="http://schemas.microsoft.com/office/drawing/2014/main" id="{06298D65-1027-4897-A948-DCEEF8FC3D98}"/>
               </a:ext>
             </a:extLst>
           </p:cNvPr>
@@ -16267,7 +15209,7 @@
           <p:cNvPr id="19" name="Group 18">
             <a:extLst>
               <a:ext uri="{FF2B5EF4-FFF2-40B4-BE49-F238E27FC236}">
-                <a16:creationId xmlns:a16="http://schemas.microsoft.com/office/drawing/2014/main" xmlns="" id="{9F866E5C-B8AA-4805-B232-831BA01AAF16}"/>
+                <a16:creationId xmlns="" xmlns:a16="http://schemas.microsoft.com/office/drawing/2014/main" id="{9F866E5C-B8AA-4805-B232-831BA01AAF16}"/>
               </a:ext>
             </a:extLst>
           </p:cNvPr>
@@ -16292,7 +15234,7 @@
             <p:cNvPr id="20" name="Freeform 5">
               <a:extLst>
                 <a:ext uri="{FF2B5EF4-FFF2-40B4-BE49-F238E27FC236}">
-                  <a16:creationId xmlns:a16="http://schemas.microsoft.com/office/drawing/2014/main" xmlns="" id="{F98614F0-2DA3-4F29-8CB3-D61424AC8506}"/>
+                  <a16:creationId xmlns="" xmlns:a16="http://schemas.microsoft.com/office/drawing/2014/main" id="{F98614F0-2DA3-4F29-8CB3-D61424AC8506}"/>
                 </a:ext>
               </a:extLst>
             </p:cNvPr>
@@ -16482,7 +15424,7 @@
             <p:cNvPr id="22" name="Freeform 6">
               <a:extLst>
                 <a:ext uri="{FF2B5EF4-FFF2-40B4-BE49-F238E27FC236}">
-                  <a16:creationId xmlns:a16="http://schemas.microsoft.com/office/drawing/2014/main" xmlns="" id="{66D52F08-13EC-4AB4-BB79-89A5395A03BF}"/>
+                  <a16:creationId xmlns="" xmlns:a16="http://schemas.microsoft.com/office/drawing/2014/main" id="{66D52F08-13EC-4AB4-BB79-89A5395A03BF}"/>
                 </a:ext>
               </a:extLst>
             </p:cNvPr>
@@ -16632,7 +15574,7 @@
             <p:cNvPr id="23" name="Freeform 7">
               <a:extLst>
                 <a:ext uri="{FF2B5EF4-FFF2-40B4-BE49-F238E27FC236}">
-                  <a16:creationId xmlns:a16="http://schemas.microsoft.com/office/drawing/2014/main" xmlns="" id="{2544236D-8C3A-41EF-9A68-C84A8A7D0F5A}"/>
+                  <a16:creationId xmlns="" xmlns:a16="http://schemas.microsoft.com/office/drawing/2014/main" id="{2544236D-8C3A-41EF-9A68-C84A8A7D0F5A}"/>
                 </a:ext>
               </a:extLst>
             </p:cNvPr>
@@ -16773,7 +15715,7 @@
           <p:cNvPr id="7" name="Rectangle 6">
             <a:extLst>
               <a:ext uri="{FF2B5EF4-FFF2-40B4-BE49-F238E27FC236}">
-                <a16:creationId xmlns:a16="http://schemas.microsoft.com/office/drawing/2014/main" xmlns="" id="{76627016-BFC4-46D4-89DB-F72E3C3461EC}"/>
+                <a16:creationId xmlns="" xmlns:a16="http://schemas.microsoft.com/office/drawing/2014/main" id="{76627016-BFC4-46D4-89DB-F72E3C3461EC}"/>
               </a:ext>
             </a:extLst>
           </p:cNvPr>
@@ -16829,7 +15771,7 @@
           <p:cNvPr id="15" name="Oval 14">
             <a:extLst>
               <a:ext uri="{FF2B5EF4-FFF2-40B4-BE49-F238E27FC236}">
-                <a16:creationId xmlns:a16="http://schemas.microsoft.com/office/drawing/2014/main" xmlns="" id="{EF515B4A-CB20-4847-8E00-0DD66F1FEBB4}"/>
+                <a16:creationId xmlns="" xmlns:a16="http://schemas.microsoft.com/office/drawing/2014/main" id="{EF515B4A-CB20-4847-8E00-0DD66F1FEBB4}"/>
               </a:ext>
             </a:extLst>
           </p:cNvPr>
@@ -16881,7 +15823,7 @@
           <p:cNvPr id="16" name="Slide Number Placeholder 5">
             <a:extLst>
               <a:ext uri="{FF2B5EF4-FFF2-40B4-BE49-F238E27FC236}">
-                <a16:creationId xmlns:a16="http://schemas.microsoft.com/office/drawing/2014/main" xmlns="" id="{996B64B9-1DF0-4EE9-BAB5-72AFA94B9AFD}"/>
+                <a16:creationId xmlns="" xmlns:a16="http://schemas.microsoft.com/office/drawing/2014/main" id="{996B64B9-1DF0-4EE9-BAB5-72AFA94B9AFD}"/>
               </a:ext>
             </a:extLst>
           </p:cNvPr>
@@ -16925,7 +15867,7 @@
           <p:cNvPr id="14" name="Title 1">
             <a:extLst>
               <a:ext uri="{FF2B5EF4-FFF2-40B4-BE49-F238E27FC236}">
-                <a16:creationId xmlns:a16="http://schemas.microsoft.com/office/drawing/2014/main" xmlns="" id="{9009D5C6-6206-4291-8037-67DC025F0B4C}"/>
+                <a16:creationId xmlns="" xmlns:a16="http://schemas.microsoft.com/office/drawing/2014/main" id="{9009D5C6-6206-4291-8037-67DC025F0B4C}"/>
               </a:ext>
             </a:extLst>
           </p:cNvPr>
@@ -16963,7 +15905,7 @@
           <p:cNvPr id="17" name="Text Placeholder 3">
             <a:extLst>
               <a:ext uri="{FF2B5EF4-FFF2-40B4-BE49-F238E27FC236}">
-                <a16:creationId xmlns:a16="http://schemas.microsoft.com/office/drawing/2014/main" xmlns="" id="{BEB643FD-AA85-4A43-8EBD-AFD10DD98793}"/>
+                <a16:creationId xmlns="" xmlns:a16="http://schemas.microsoft.com/office/drawing/2014/main" id="{BEB643FD-AA85-4A43-8EBD-AFD10DD98793}"/>
               </a:ext>
             </a:extLst>
           </p:cNvPr>
@@ -17034,7 +15976,7 @@
           <p:cNvPr id="18" name="Content Placeholder 2">
             <a:extLst>
               <a:ext uri="{FF2B5EF4-FFF2-40B4-BE49-F238E27FC236}">
-                <a16:creationId xmlns:a16="http://schemas.microsoft.com/office/drawing/2014/main" xmlns="" id="{9001F313-F798-43BE-AFF0-A68C84C3640D}"/>
+                <a16:creationId xmlns="" xmlns:a16="http://schemas.microsoft.com/office/drawing/2014/main" id="{9001F313-F798-43BE-AFF0-A68C84C3640D}"/>
               </a:ext>
             </a:extLst>
           </p:cNvPr>
@@ -17125,7 +16067,7 @@
           <p:cNvPr id="13" name="Picture 12">
             <a:extLst>
               <a:ext uri="{FF2B5EF4-FFF2-40B4-BE49-F238E27FC236}">
-                <a16:creationId xmlns:a16="http://schemas.microsoft.com/office/drawing/2014/main" xmlns="" id="{91881DEA-0ECB-4310-ADF5-4337ACB4338B}"/>
+                <a16:creationId xmlns="" xmlns:a16="http://schemas.microsoft.com/office/drawing/2014/main" id="{91881DEA-0ECB-4310-ADF5-4337ACB4338B}"/>
               </a:ext>
             </a:extLst>
           </p:cNvPr>
@@ -17203,7 +16145,7 @@
           <a:p>
             <a:fld id="{11489015-5B70-4D85-AA05-A54131EA11AC}" type="datetime3">
               <a:rPr lang="en-US" smtClean="0"/>
-              <a:t>25 July 2019</a:t>
+              <a:t>29 July 2019</a:t>
             </a:fld>
             <a:endParaRPr lang="en-US"/>
           </a:p>
@@ -17309,7 +16251,7 @@
           <p:cNvPr id="4" name="Rectangle 3">
             <a:extLst>
               <a:ext uri="{FF2B5EF4-FFF2-40B4-BE49-F238E27FC236}">
-                <a16:creationId xmlns:a16="http://schemas.microsoft.com/office/drawing/2014/main" xmlns="" id="{86299464-ED20-4919-8B3A-2CFAE8DA2347}"/>
+                <a16:creationId xmlns="" xmlns:a16="http://schemas.microsoft.com/office/drawing/2014/main" id="{86299464-ED20-4919-8B3A-2CFAE8DA2347}"/>
               </a:ext>
             </a:extLst>
           </p:cNvPr>
@@ -17361,7 +16303,7 @@
           <p:cNvPr id="2" name="Title 1">
             <a:extLst>
               <a:ext uri="{FF2B5EF4-FFF2-40B4-BE49-F238E27FC236}">
-                <a16:creationId xmlns:a16="http://schemas.microsoft.com/office/drawing/2014/main" xmlns="" id="{2456FD49-C258-4333-9422-358C976A341C}"/>
+                <a16:creationId xmlns="" xmlns:a16="http://schemas.microsoft.com/office/drawing/2014/main" id="{2456FD49-C258-4333-9422-358C976A341C}"/>
               </a:ext>
             </a:extLst>
           </p:cNvPr>
@@ -17405,7 +16347,7 @@
           <p:cNvPr id="3" name="Subtitle 2">
             <a:extLst>
               <a:ext uri="{FF2B5EF4-FFF2-40B4-BE49-F238E27FC236}">
-                <a16:creationId xmlns:a16="http://schemas.microsoft.com/office/drawing/2014/main" xmlns="" id="{59758E15-A93D-4FB9-843D-1490E27A151B}"/>
+                <a16:creationId xmlns="" xmlns:a16="http://schemas.microsoft.com/office/drawing/2014/main" id="{59758E15-A93D-4FB9-843D-1490E27A151B}"/>
               </a:ext>
             </a:extLst>
           </p:cNvPr>
@@ -17482,7 +16424,7 @@
           <p:cNvPr id="13" name="Picture Placeholder 12">
             <a:extLst>
               <a:ext uri="{FF2B5EF4-FFF2-40B4-BE49-F238E27FC236}">
-                <a16:creationId xmlns:a16="http://schemas.microsoft.com/office/drawing/2014/main" xmlns="" id="{BCCC559D-0EC3-432C-B397-6897B366DF36}"/>
+                <a16:creationId xmlns="" xmlns:a16="http://schemas.microsoft.com/office/drawing/2014/main" id="{BCCC559D-0EC3-432C-B397-6897B366DF36}"/>
               </a:ext>
             </a:extLst>
           </p:cNvPr>
@@ -17527,7 +16469,7 @@
           <p:cNvPr id="14" name="Group 13">
             <a:extLst>
               <a:ext uri="{FF2B5EF4-FFF2-40B4-BE49-F238E27FC236}">
-                <a16:creationId xmlns:a16="http://schemas.microsoft.com/office/drawing/2014/main" xmlns="" id="{0DC2055F-AE3F-46BE-B57E-A0F1A86D1C36}"/>
+                <a16:creationId xmlns="" xmlns:a16="http://schemas.microsoft.com/office/drawing/2014/main" id="{0DC2055F-AE3F-46BE-B57E-A0F1A86D1C36}"/>
               </a:ext>
             </a:extLst>
           </p:cNvPr>
@@ -17552,7 +16494,7 @@
             <p:cNvPr id="15" name="Freeform 5">
               <a:extLst>
                 <a:ext uri="{FF2B5EF4-FFF2-40B4-BE49-F238E27FC236}">
-                  <a16:creationId xmlns:a16="http://schemas.microsoft.com/office/drawing/2014/main" xmlns="" id="{C98EF042-A3B8-406D-BC16-153A989F571A}"/>
+                  <a16:creationId xmlns="" xmlns:a16="http://schemas.microsoft.com/office/drawing/2014/main" id="{C98EF042-A3B8-406D-BC16-153A989F571A}"/>
                 </a:ext>
               </a:extLst>
             </p:cNvPr>
@@ -17742,7 +16684,7 @@
             <p:cNvPr id="16" name="Freeform 6">
               <a:extLst>
                 <a:ext uri="{FF2B5EF4-FFF2-40B4-BE49-F238E27FC236}">
-                  <a16:creationId xmlns:a16="http://schemas.microsoft.com/office/drawing/2014/main" xmlns="" id="{68E5FAC9-A660-4D7A-AC84-0A7C8CC3BB65}"/>
+                  <a16:creationId xmlns="" xmlns:a16="http://schemas.microsoft.com/office/drawing/2014/main" id="{68E5FAC9-A660-4D7A-AC84-0A7C8CC3BB65}"/>
                 </a:ext>
               </a:extLst>
             </p:cNvPr>
@@ -17893,7 +16835,7 @@
           <p:cNvPr id="9" name="Picture 8">
             <a:extLst>
               <a:ext uri="{FF2B5EF4-FFF2-40B4-BE49-F238E27FC236}">
-                <a16:creationId xmlns:a16="http://schemas.microsoft.com/office/drawing/2014/main" xmlns="" id="{4FE28ACC-E44C-4381-B768-0310810E78D2}"/>
+                <a16:creationId xmlns="" xmlns:a16="http://schemas.microsoft.com/office/drawing/2014/main" id="{4FE28ACC-E44C-4381-B768-0310810E78D2}"/>
               </a:ext>
             </a:extLst>
           </p:cNvPr>
@@ -17938,7 +16880,7 @@
           <p:cNvPr id="5" name="Straight Connector 4">
             <a:extLst>
               <a:ext uri="{FF2B5EF4-FFF2-40B4-BE49-F238E27FC236}">
-                <a16:creationId xmlns:a16="http://schemas.microsoft.com/office/drawing/2014/main" xmlns="" id="{819AFA09-F4B1-493D-BCAD-FF30C20CD1AA}"/>
+                <a16:creationId xmlns="" xmlns:a16="http://schemas.microsoft.com/office/drawing/2014/main" id="{819AFA09-F4B1-493D-BCAD-FF30C20CD1AA}"/>
               </a:ext>
             </a:extLst>
           </p:cNvPr>
@@ -18035,7 +16977,7 @@
           <p:cNvPr id="10" name="Rectangle 9">
             <a:extLst>
               <a:ext uri="{FF2B5EF4-FFF2-40B4-BE49-F238E27FC236}">
-                <a16:creationId xmlns:a16="http://schemas.microsoft.com/office/drawing/2014/main" xmlns="" id="{F9087E09-D75F-4E26-B01E-A1A09BA2EA70}"/>
+                <a16:creationId xmlns="" xmlns:a16="http://schemas.microsoft.com/office/drawing/2014/main" id="{F9087E09-D75F-4E26-B01E-A1A09BA2EA70}"/>
               </a:ext>
             </a:extLst>
           </p:cNvPr>
@@ -18087,7 +17029,7 @@
           <p:cNvPr id="2" name="Title 1">
             <a:extLst>
               <a:ext uri="{FF2B5EF4-FFF2-40B4-BE49-F238E27FC236}">
-                <a16:creationId xmlns:a16="http://schemas.microsoft.com/office/drawing/2014/main" xmlns="" id="{AF7A70B7-7ADE-4E0B-B956-363B0B1AA613}"/>
+                <a16:creationId xmlns="" xmlns:a16="http://schemas.microsoft.com/office/drawing/2014/main" id="{AF7A70B7-7ADE-4E0B-B956-363B0B1AA613}"/>
               </a:ext>
             </a:extLst>
           </p:cNvPr>
@@ -18131,7 +17073,7 @@
           <p:cNvPr id="3" name="Text Placeholder 2">
             <a:extLst>
               <a:ext uri="{FF2B5EF4-FFF2-40B4-BE49-F238E27FC236}">
-                <a16:creationId xmlns:a16="http://schemas.microsoft.com/office/drawing/2014/main" xmlns="" id="{4ACB5603-8A62-4D45-B6EF-0D7E2D5FC4F7}"/>
+                <a16:creationId xmlns="" xmlns:a16="http://schemas.microsoft.com/office/drawing/2014/main" id="{4ACB5603-8A62-4D45-B6EF-0D7E2D5FC4F7}"/>
               </a:ext>
             </a:extLst>
           </p:cNvPr>
@@ -18256,7 +17198,7 @@
           <p:cNvPr id="8" name="Picture 7">
             <a:extLst>
               <a:ext uri="{FF2B5EF4-FFF2-40B4-BE49-F238E27FC236}">
-                <a16:creationId xmlns:a16="http://schemas.microsoft.com/office/drawing/2014/main" xmlns="" id="{25FC40B0-ED27-47E5-A3C2-32A8418567EE}"/>
+                <a16:creationId xmlns="" xmlns:a16="http://schemas.microsoft.com/office/drawing/2014/main" id="{25FC40B0-ED27-47E5-A3C2-32A8418567EE}"/>
               </a:ext>
             </a:extLst>
           </p:cNvPr>
@@ -18293,7 +17235,7 @@
           <p:cNvPr id="11" name="Oval 10">
             <a:extLst>
               <a:ext uri="{FF2B5EF4-FFF2-40B4-BE49-F238E27FC236}">
-                <a16:creationId xmlns:a16="http://schemas.microsoft.com/office/drawing/2014/main" xmlns="" id="{8931D2A9-0B92-4197-8802-80424C14EA7E}"/>
+                <a16:creationId xmlns="" xmlns:a16="http://schemas.microsoft.com/office/drawing/2014/main" id="{8931D2A9-0B92-4197-8802-80424C14EA7E}"/>
               </a:ext>
             </a:extLst>
           </p:cNvPr>
@@ -18345,7 +17287,7 @@
           <p:cNvPr id="6" name="Slide Number Placeholder 5">
             <a:extLst>
               <a:ext uri="{FF2B5EF4-FFF2-40B4-BE49-F238E27FC236}">
-                <a16:creationId xmlns:a16="http://schemas.microsoft.com/office/drawing/2014/main" xmlns="" id="{533B74B0-30B9-45C2-9AE6-45D1978AAFAE}"/>
+                <a16:creationId xmlns="" xmlns:a16="http://schemas.microsoft.com/office/drawing/2014/main" id="{533B74B0-30B9-45C2-9AE6-45D1978AAFAE}"/>
               </a:ext>
             </a:extLst>
           </p:cNvPr>
@@ -18389,7 +17331,7 @@
           <p:cNvPr id="15" name="Picture Placeholder 14">
             <a:extLst>
               <a:ext uri="{FF2B5EF4-FFF2-40B4-BE49-F238E27FC236}">
-                <a16:creationId xmlns:a16="http://schemas.microsoft.com/office/drawing/2014/main" xmlns="" id="{B5A30B6B-EEDB-4142-8138-D50F5A307D76}"/>
+                <a16:creationId xmlns="" xmlns:a16="http://schemas.microsoft.com/office/drawing/2014/main" id="{B5A30B6B-EEDB-4142-8138-D50F5A307D76}"/>
               </a:ext>
             </a:extLst>
           </p:cNvPr>
@@ -18565,7 +17507,7 @@
           <p:cNvPr id="3" name="Content Placeholder 2">
             <a:extLst>
               <a:ext uri="{FF2B5EF4-FFF2-40B4-BE49-F238E27FC236}">
-                <a16:creationId xmlns:a16="http://schemas.microsoft.com/office/drawing/2014/main" xmlns="" id="{0FEE9886-36F0-4E06-A3A6-D8F00B0665A1}"/>
+                <a16:creationId xmlns="" xmlns:a16="http://schemas.microsoft.com/office/drawing/2014/main" id="{0FEE9886-36F0-4E06-A3A6-D8F00B0665A1}"/>
               </a:ext>
             </a:extLst>
           </p:cNvPr>
@@ -18646,7 +17588,7 @@
           <p:cNvPr id="7" name="Rectangle 6">
             <a:extLst>
               <a:ext uri="{FF2B5EF4-FFF2-40B4-BE49-F238E27FC236}">
-                <a16:creationId xmlns:a16="http://schemas.microsoft.com/office/drawing/2014/main" xmlns="" id="{76627016-BFC4-46D4-89DB-F72E3C3461EC}"/>
+                <a16:creationId xmlns="" xmlns:a16="http://schemas.microsoft.com/office/drawing/2014/main" id="{76627016-BFC4-46D4-89DB-F72E3C3461EC}"/>
               </a:ext>
             </a:extLst>
           </p:cNvPr>
@@ -18702,7 +17644,7 @@
           <p:cNvPr id="8" name="Picture 7">
             <a:extLst>
               <a:ext uri="{FF2B5EF4-FFF2-40B4-BE49-F238E27FC236}">
-                <a16:creationId xmlns:a16="http://schemas.microsoft.com/office/drawing/2014/main" xmlns="" id="{676C557E-B5A7-4416-BCC0-5743550BF152}"/>
+                <a16:creationId xmlns="" xmlns:a16="http://schemas.microsoft.com/office/drawing/2014/main" id="{676C557E-B5A7-4416-BCC0-5743550BF152}"/>
               </a:ext>
             </a:extLst>
           </p:cNvPr>
@@ -18738,7 +17680,7 @@
           <p:cNvPr id="10" name="Group 9">
             <a:extLst>
               <a:ext uri="{FF2B5EF4-FFF2-40B4-BE49-F238E27FC236}">
-                <a16:creationId xmlns:a16="http://schemas.microsoft.com/office/drawing/2014/main" xmlns="" id="{42E17FB3-B5C4-4B3A-A57B-C6493A9D0C66}"/>
+                <a16:creationId xmlns="" xmlns:a16="http://schemas.microsoft.com/office/drawing/2014/main" id="{42E17FB3-B5C4-4B3A-A57B-C6493A9D0C66}"/>
               </a:ext>
             </a:extLst>
           </p:cNvPr>
@@ -18761,7 +17703,7 @@
             <p:cNvPr id="11" name="Freeform 5">
               <a:extLst>
                 <a:ext uri="{FF2B5EF4-FFF2-40B4-BE49-F238E27FC236}">
-                  <a16:creationId xmlns:a16="http://schemas.microsoft.com/office/drawing/2014/main" xmlns="" id="{DCA6C454-F761-4265-BB5E-DFD947CC3592}"/>
+                  <a16:creationId xmlns="" xmlns:a16="http://schemas.microsoft.com/office/drawing/2014/main" id="{DCA6C454-F761-4265-BB5E-DFD947CC3592}"/>
                 </a:ext>
               </a:extLst>
             </p:cNvPr>
@@ -18951,7 +17893,7 @@
             <p:cNvPr id="12" name="Freeform 6">
               <a:extLst>
                 <a:ext uri="{FF2B5EF4-FFF2-40B4-BE49-F238E27FC236}">
-                  <a16:creationId xmlns:a16="http://schemas.microsoft.com/office/drawing/2014/main" xmlns="" id="{6B853B2F-9E1C-4AC4-9344-8610498D5B52}"/>
+                  <a16:creationId xmlns="" xmlns:a16="http://schemas.microsoft.com/office/drawing/2014/main" id="{6B853B2F-9E1C-4AC4-9344-8610498D5B52}"/>
                 </a:ext>
               </a:extLst>
             </p:cNvPr>
@@ -19101,7 +18043,7 @@
             <p:cNvPr id="13" name="Freeform 7">
               <a:extLst>
                 <a:ext uri="{FF2B5EF4-FFF2-40B4-BE49-F238E27FC236}">
-                  <a16:creationId xmlns:a16="http://schemas.microsoft.com/office/drawing/2014/main" xmlns="" id="{B7FCC84B-2235-4948-8277-8363DFC691A4}"/>
+                  <a16:creationId xmlns="" xmlns:a16="http://schemas.microsoft.com/office/drawing/2014/main" id="{B7FCC84B-2235-4948-8277-8363DFC691A4}"/>
                 </a:ext>
               </a:extLst>
             </p:cNvPr>
@@ -19242,7 +18184,7 @@
           <p:cNvPr id="15" name="Oval 14">
             <a:extLst>
               <a:ext uri="{FF2B5EF4-FFF2-40B4-BE49-F238E27FC236}">
-                <a16:creationId xmlns:a16="http://schemas.microsoft.com/office/drawing/2014/main" xmlns="" id="{EF515B4A-CB20-4847-8E00-0DD66F1FEBB4}"/>
+                <a16:creationId xmlns="" xmlns:a16="http://schemas.microsoft.com/office/drawing/2014/main" id="{EF515B4A-CB20-4847-8E00-0DD66F1FEBB4}"/>
               </a:ext>
             </a:extLst>
           </p:cNvPr>
@@ -19294,7 +18236,7 @@
           <p:cNvPr id="16" name="Slide Number Placeholder 5">
             <a:extLst>
               <a:ext uri="{FF2B5EF4-FFF2-40B4-BE49-F238E27FC236}">
-                <a16:creationId xmlns:a16="http://schemas.microsoft.com/office/drawing/2014/main" xmlns="" id="{996B64B9-1DF0-4EE9-BAB5-72AFA94B9AFD}"/>
+                <a16:creationId xmlns="" xmlns:a16="http://schemas.microsoft.com/office/drawing/2014/main" id="{996B64B9-1DF0-4EE9-BAB5-72AFA94B9AFD}"/>
               </a:ext>
             </a:extLst>
           </p:cNvPr>
@@ -19338,7 +18280,7 @@
           <p:cNvPr id="23" name="Picture Placeholder 22">
             <a:extLst>
               <a:ext uri="{FF2B5EF4-FFF2-40B4-BE49-F238E27FC236}">
-                <a16:creationId xmlns:a16="http://schemas.microsoft.com/office/drawing/2014/main" xmlns="" id="{26619E66-5354-4D60-8529-27917AC037C0}"/>
+                <a16:creationId xmlns="" xmlns:a16="http://schemas.microsoft.com/office/drawing/2014/main" id="{26619E66-5354-4D60-8529-27917AC037C0}"/>
               </a:ext>
             </a:extLst>
           </p:cNvPr>
@@ -19458,7 +18400,7 @@
           <p:cNvPr id="14" name="Title 1">
             <a:extLst>
               <a:ext uri="{FF2B5EF4-FFF2-40B4-BE49-F238E27FC236}">
-                <a16:creationId xmlns:a16="http://schemas.microsoft.com/office/drawing/2014/main" xmlns="" id="{2E646B4F-6CCB-724C-9D5E-6D5770023939}"/>
+                <a16:creationId xmlns="" xmlns:a16="http://schemas.microsoft.com/office/drawing/2014/main" id="{2E646B4F-6CCB-724C-9D5E-6D5770023939}"/>
               </a:ext>
             </a:extLst>
           </p:cNvPr>
@@ -19535,7 +18477,7 @@
           <p:cNvPr id="2" name="Title 1">
             <a:extLst>
               <a:ext uri="{FF2B5EF4-FFF2-40B4-BE49-F238E27FC236}">
-                <a16:creationId xmlns:a16="http://schemas.microsoft.com/office/drawing/2014/main" xmlns="" id="{32970CD0-696D-4313-96BA-4AA72C813BD0}"/>
+                <a16:creationId xmlns="" xmlns:a16="http://schemas.microsoft.com/office/drawing/2014/main" id="{32970CD0-696D-4313-96BA-4AA72C813BD0}"/>
               </a:ext>
             </a:extLst>
           </p:cNvPr>
@@ -19575,7 +18517,7 @@
           <p:cNvPr id="3" name="Content Placeholder 2">
             <a:extLst>
               <a:ext uri="{FF2B5EF4-FFF2-40B4-BE49-F238E27FC236}">
-                <a16:creationId xmlns:a16="http://schemas.microsoft.com/office/drawing/2014/main" xmlns="" id="{0FEE9886-36F0-4E06-A3A6-D8F00B0665A1}"/>
+                <a16:creationId xmlns="" xmlns:a16="http://schemas.microsoft.com/office/drawing/2014/main" id="{0FEE9886-36F0-4E06-A3A6-D8F00B0665A1}"/>
               </a:ext>
             </a:extLst>
           </p:cNvPr>
@@ -19655,7 +18597,7 @@
           <p:cNvPr id="7" name="Rectangle 6">
             <a:extLst>
               <a:ext uri="{FF2B5EF4-FFF2-40B4-BE49-F238E27FC236}">
-                <a16:creationId xmlns:a16="http://schemas.microsoft.com/office/drawing/2014/main" xmlns="" id="{76627016-BFC4-46D4-89DB-F72E3C3461EC}"/>
+                <a16:creationId xmlns="" xmlns:a16="http://schemas.microsoft.com/office/drawing/2014/main" id="{76627016-BFC4-46D4-89DB-F72E3C3461EC}"/>
               </a:ext>
             </a:extLst>
           </p:cNvPr>
@@ -19711,7 +18653,7 @@
           <p:cNvPr id="8" name="Picture 7">
             <a:extLst>
               <a:ext uri="{FF2B5EF4-FFF2-40B4-BE49-F238E27FC236}">
-                <a16:creationId xmlns:a16="http://schemas.microsoft.com/office/drawing/2014/main" xmlns="" id="{676C557E-B5A7-4416-BCC0-5743550BF152}"/>
+                <a16:creationId xmlns="" xmlns:a16="http://schemas.microsoft.com/office/drawing/2014/main" id="{676C557E-B5A7-4416-BCC0-5743550BF152}"/>
               </a:ext>
             </a:extLst>
           </p:cNvPr>
@@ -19747,7 +18689,7 @@
           <p:cNvPr id="15" name="Oval 14">
             <a:extLst>
               <a:ext uri="{FF2B5EF4-FFF2-40B4-BE49-F238E27FC236}">
-                <a16:creationId xmlns:a16="http://schemas.microsoft.com/office/drawing/2014/main" xmlns="" id="{EF515B4A-CB20-4847-8E00-0DD66F1FEBB4}"/>
+                <a16:creationId xmlns="" xmlns:a16="http://schemas.microsoft.com/office/drawing/2014/main" id="{EF515B4A-CB20-4847-8E00-0DD66F1FEBB4}"/>
               </a:ext>
             </a:extLst>
           </p:cNvPr>
@@ -19799,7 +18741,7 @@
           <p:cNvPr id="16" name="Slide Number Placeholder 5">
             <a:extLst>
               <a:ext uri="{FF2B5EF4-FFF2-40B4-BE49-F238E27FC236}">
-                <a16:creationId xmlns:a16="http://schemas.microsoft.com/office/drawing/2014/main" xmlns="" id="{996B64B9-1DF0-4EE9-BAB5-72AFA94B9AFD}"/>
+                <a16:creationId xmlns="" xmlns:a16="http://schemas.microsoft.com/office/drawing/2014/main" id="{996B64B9-1DF0-4EE9-BAB5-72AFA94B9AFD}"/>
               </a:ext>
             </a:extLst>
           </p:cNvPr>
@@ -19843,7 +18785,7 @@
           <p:cNvPr id="14" name="Rectangle 13">
             <a:extLst>
               <a:ext uri="{FF2B5EF4-FFF2-40B4-BE49-F238E27FC236}">
-                <a16:creationId xmlns:a16="http://schemas.microsoft.com/office/drawing/2014/main" xmlns="" id="{9D415693-E2CB-4DB4-B07C-2F96B0CAB302}"/>
+                <a16:creationId xmlns="" xmlns:a16="http://schemas.microsoft.com/office/drawing/2014/main" id="{9D415693-E2CB-4DB4-B07C-2F96B0CAB302}"/>
               </a:ext>
             </a:extLst>
           </p:cNvPr>
@@ -19899,7 +18841,7 @@
           <p:cNvPr id="4" name="Oval 3">
             <a:extLst>
               <a:ext uri="{FF2B5EF4-FFF2-40B4-BE49-F238E27FC236}">
-                <a16:creationId xmlns:a16="http://schemas.microsoft.com/office/drawing/2014/main" xmlns="" id="{14C1BF67-E354-4E04-8F94-BABF2B7D1AFB}"/>
+                <a16:creationId xmlns="" xmlns:a16="http://schemas.microsoft.com/office/drawing/2014/main" id="{14C1BF67-E354-4E04-8F94-BABF2B7D1AFB}"/>
               </a:ext>
             </a:extLst>
           </p:cNvPr>
@@ -19953,7 +18895,7 @@
           <p:cNvPr id="18" name="Picture Placeholder 5">
             <a:extLst>
               <a:ext uri="{FF2B5EF4-FFF2-40B4-BE49-F238E27FC236}">
-                <a16:creationId xmlns:a16="http://schemas.microsoft.com/office/drawing/2014/main" xmlns="" id="{FF6AC390-6F85-4B64-AE7A-E8E0D8FC89CF}"/>
+                <a16:creationId xmlns="" xmlns:a16="http://schemas.microsoft.com/office/drawing/2014/main" id="{FF6AC390-6F85-4B64-AE7A-E8E0D8FC89CF}"/>
               </a:ext>
             </a:extLst>
           </p:cNvPr>
@@ -20030,7 +18972,7 @@
           <p:cNvPr id="19" name="Rectangle 18">
             <a:extLst>
               <a:ext uri="{FF2B5EF4-FFF2-40B4-BE49-F238E27FC236}">
-                <a16:creationId xmlns:a16="http://schemas.microsoft.com/office/drawing/2014/main" xmlns="" id="{12E4E194-63F1-4D43-AC02-75733DF045E9}"/>
+                <a16:creationId xmlns="" xmlns:a16="http://schemas.microsoft.com/office/drawing/2014/main" id="{12E4E194-63F1-4D43-AC02-75733DF045E9}"/>
               </a:ext>
             </a:extLst>
           </p:cNvPr>
@@ -20082,7 +19024,7 @@
           <p:cNvPr id="22" name="Oval 21">
             <a:extLst>
               <a:ext uri="{FF2B5EF4-FFF2-40B4-BE49-F238E27FC236}">
-                <a16:creationId xmlns:a16="http://schemas.microsoft.com/office/drawing/2014/main" xmlns="" id="{E799E3E2-888B-2343-9A63-F84C03265CB5}"/>
+                <a16:creationId xmlns="" xmlns:a16="http://schemas.microsoft.com/office/drawing/2014/main" id="{E799E3E2-888B-2343-9A63-F84C03265CB5}"/>
               </a:ext>
             </a:extLst>
           </p:cNvPr>
@@ -20138,7 +19080,7 @@
           <p:cNvPr id="23" name="Picture Placeholder 11">
             <a:extLst>
               <a:ext uri="{FF2B5EF4-FFF2-40B4-BE49-F238E27FC236}">
-                <a16:creationId xmlns:a16="http://schemas.microsoft.com/office/drawing/2014/main" xmlns="" id="{8FEDE8EF-5B7A-A741-9A56-D365CAE01B62}"/>
+                <a16:creationId xmlns="" xmlns:a16="http://schemas.microsoft.com/office/drawing/2014/main" id="{8FEDE8EF-5B7A-A741-9A56-D365CAE01B62}"/>
               </a:ext>
             </a:extLst>
           </p:cNvPr>
@@ -20186,7 +19128,7 @@
           <p:cNvPr id="9" name="Rectangle 8">
             <a:extLst>
               <a:ext uri="{FF2B5EF4-FFF2-40B4-BE49-F238E27FC236}">
-                <a16:creationId xmlns:a16="http://schemas.microsoft.com/office/drawing/2014/main" xmlns="" id="{3755C1FB-E61C-4BBC-8179-D34908DEA1B6}"/>
+                <a16:creationId xmlns="" xmlns:a16="http://schemas.microsoft.com/office/drawing/2014/main" id="{3755C1FB-E61C-4BBC-8179-D34908DEA1B6}"/>
               </a:ext>
             </a:extLst>
           </p:cNvPr>
@@ -20238,7 +19180,7 @@
           <p:cNvPr id="4" name="Oval 3">
             <a:extLst>
               <a:ext uri="{FF2B5EF4-FFF2-40B4-BE49-F238E27FC236}">
-                <a16:creationId xmlns:a16="http://schemas.microsoft.com/office/drawing/2014/main" xmlns="" id="{8C1E0992-271E-4948-9461-C7AA54AF8FEA}"/>
+                <a16:creationId xmlns="" xmlns:a16="http://schemas.microsoft.com/office/drawing/2014/main" id="{8C1E0992-271E-4948-9461-C7AA54AF8FEA}"/>
               </a:ext>
             </a:extLst>
           </p:cNvPr>
@@ -20291,7 +19233,7 @@
           <p:cNvPr id="2" name="Title 1">
             <a:extLst>
               <a:ext uri="{FF2B5EF4-FFF2-40B4-BE49-F238E27FC236}">
-                <a16:creationId xmlns:a16="http://schemas.microsoft.com/office/drawing/2014/main" xmlns="" id="{32970CD0-696D-4313-96BA-4AA72C813BD0}"/>
+                <a16:creationId xmlns="" xmlns:a16="http://schemas.microsoft.com/office/drawing/2014/main" id="{32970CD0-696D-4313-96BA-4AA72C813BD0}"/>
               </a:ext>
             </a:extLst>
           </p:cNvPr>
@@ -20331,7 +19273,7 @@
           <p:cNvPr id="3" name="Content Placeholder 2">
             <a:extLst>
               <a:ext uri="{FF2B5EF4-FFF2-40B4-BE49-F238E27FC236}">
-                <a16:creationId xmlns:a16="http://schemas.microsoft.com/office/drawing/2014/main" xmlns="" id="{0FEE9886-36F0-4E06-A3A6-D8F00B0665A1}"/>
+                <a16:creationId xmlns="" xmlns:a16="http://schemas.microsoft.com/office/drawing/2014/main" id="{0FEE9886-36F0-4E06-A3A6-D8F00B0665A1}"/>
               </a:ext>
             </a:extLst>
           </p:cNvPr>
@@ -20388,7 +19330,7 @@
           <p:cNvPr id="7" name="Rectangle 6">
             <a:extLst>
               <a:ext uri="{FF2B5EF4-FFF2-40B4-BE49-F238E27FC236}">
-                <a16:creationId xmlns:a16="http://schemas.microsoft.com/office/drawing/2014/main" xmlns="" id="{76627016-BFC4-46D4-89DB-F72E3C3461EC}"/>
+                <a16:creationId xmlns="" xmlns:a16="http://schemas.microsoft.com/office/drawing/2014/main" id="{76627016-BFC4-46D4-89DB-F72E3C3461EC}"/>
               </a:ext>
             </a:extLst>
           </p:cNvPr>
@@ -20444,7 +19386,7 @@
           <p:cNvPr id="8" name="Picture 7">
             <a:extLst>
               <a:ext uri="{FF2B5EF4-FFF2-40B4-BE49-F238E27FC236}">
-                <a16:creationId xmlns:a16="http://schemas.microsoft.com/office/drawing/2014/main" xmlns="" id="{676C557E-B5A7-4416-BCC0-5743550BF152}"/>
+                <a16:creationId xmlns="" xmlns:a16="http://schemas.microsoft.com/office/drawing/2014/main" id="{676C557E-B5A7-4416-BCC0-5743550BF152}"/>
               </a:ext>
             </a:extLst>
           </p:cNvPr>
@@ -20480,7 +19422,7 @@
           <p:cNvPr id="15" name="Oval 14">
             <a:extLst>
               <a:ext uri="{FF2B5EF4-FFF2-40B4-BE49-F238E27FC236}">
-                <a16:creationId xmlns:a16="http://schemas.microsoft.com/office/drawing/2014/main" xmlns="" id="{EF515B4A-CB20-4847-8E00-0DD66F1FEBB4}"/>
+                <a16:creationId xmlns="" xmlns:a16="http://schemas.microsoft.com/office/drawing/2014/main" id="{EF515B4A-CB20-4847-8E00-0DD66F1FEBB4}"/>
               </a:ext>
             </a:extLst>
           </p:cNvPr>
@@ -20532,7 +19474,7 @@
           <p:cNvPr id="16" name="Slide Number Placeholder 5">
             <a:extLst>
               <a:ext uri="{FF2B5EF4-FFF2-40B4-BE49-F238E27FC236}">
-                <a16:creationId xmlns:a16="http://schemas.microsoft.com/office/drawing/2014/main" xmlns="" id="{996B64B9-1DF0-4EE9-BAB5-72AFA94B9AFD}"/>
+                <a16:creationId xmlns="" xmlns:a16="http://schemas.microsoft.com/office/drawing/2014/main" id="{996B64B9-1DF0-4EE9-BAB5-72AFA94B9AFD}"/>
               </a:ext>
             </a:extLst>
           </p:cNvPr>
@@ -20576,7 +19518,7 @@
           <p:cNvPr id="6" name="Picture Placeholder 5">
             <a:extLst>
               <a:ext uri="{FF2B5EF4-FFF2-40B4-BE49-F238E27FC236}">
-                <a16:creationId xmlns:a16="http://schemas.microsoft.com/office/drawing/2014/main" xmlns="" id="{35B71D50-AA4B-4E0C-8F6A-0F64F2C8A8C7}"/>
+                <a16:creationId xmlns="" xmlns:a16="http://schemas.microsoft.com/office/drawing/2014/main" id="{35B71D50-AA4B-4E0C-8F6A-0F64F2C8A8C7}"/>
               </a:ext>
             </a:extLst>
           </p:cNvPr>
@@ -20620,7 +19562,7 @@
           <p:cNvPr id="17" name="Content Placeholder 2">
             <a:extLst>
               <a:ext uri="{FF2B5EF4-FFF2-40B4-BE49-F238E27FC236}">
-                <a16:creationId xmlns:a16="http://schemas.microsoft.com/office/drawing/2014/main" xmlns="" id="{147C9C38-5B17-467D-B581-EF28ECB11E80}"/>
+                <a16:creationId xmlns="" xmlns:a16="http://schemas.microsoft.com/office/drawing/2014/main" id="{147C9C38-5B17-467D-B581-EF28ECB11E80}"/>
               </a:ext>
             </a:extLst>
           </p:cNvPr>
@@ -20677,7 +19619,7 @@
           <p:cNvPr id="20" name="Content Placeholder 2">
             <a:extLst>
               <a:ext uri="{FF2B5EF4-FFF2-40B4-BE49-F238E27FC236}">
-                <a16:creationId xmlns:a16="http://schemas.microsoft.com/office/drawing/2014/main" xmlns="" id="{FEB88DD7-AEB5-4718-AF2D-28B5B91ED715}"/>
+                <a16:creationId xmlns="" xmlns:a16="http://schemas.microsoft.com/office/drawing/2014/main" id="{FEB88DD7-AEB5-4718-AF2D-28B5B91ED715}"/>
               </a:ext>
             </a:extLst>
           </p:cNvPr>
@@ -20736,7 +19678,7 @@
           <p:cNvPr id="21" name="Content Placeholder 2">
             <a:extLst>
               <a:ext uri="{FF2B5EF4-FFF2-40B4-BE49-F238E27FC236}">
-                <a16:creationId xmlns:a16="http://schemas.microsoft.com/office/drawing/2014/main" xmlns="" id="{F694448B-800C-40EF-8F61-18C018E8374C}"/>
+                <a16:creationId xmlns="" xmlns:a16="http://schemas.microsoft.com/office/drawing/2014/main" id="{F694448B-800C-40EF-8F61-18C018E8374C}"/>
               </a:ext>
             </a:extLst>
           </p:cNvPr>
@@ -20795,7 +19737,7 @@
           <p:cNvPr id="12" name="Picture Placeholder 11">
             <a:extLst>
               <a:ext uri="{FF2B5EF4-FFF2-40B4-BE49-F238E27FC236}">
-                <a16:creationId xmlns:a16="http://schemas.microsoft.com/office/drawing/2014/main" xmlns="" id="{483B974E-5202-4EAD-9D55-4129C84BAE87}"/>
+                <a16:creationId xmlns="" xmlns:a16="http://schemas.microsoft.com/office/drawing/2014/main" id="{483B974E-5202-4EAD-9D55-4129C84BAE87}"/>
               </a:ext>
             </a:extLst>
           </p:cNvPr>
@@ -20873,7 +19815,7 @@
           <p:cNvPr id="22" name="Rectangle 21">
             <a:extLst>
               <a:ext uri="{FF2B5EF4-FFF2-40B4-BE49-F238E27FC236}">
-                <a16:creationId xmlns:a16="http://schemas.microsoft.com/office/drawing/2014/main" xmlns="" id="{1B6EB0C6-606C-4AFB-8FF8-AB43606B95BD}"/>
+                <a16:creationId xmlns="" xmlns:a16="http://schemas.microsoft.com/office/drawing/2014/main" id="{1B6EB0C6-606C-4AFB-8FF8-AB43606B95BD}"/>
               </a:ext>
             </a:extLst>
           </p:cNvPr>
@@ -20925,7 +19867,7 @@
           <p:cNvPr id="4" name="Rectangle 3">
             <a:extLst>
               <a:ext uri="{FF2B5EF4-FFF2-40B4-BE49-F238E27FC236}">
-                <a16:creationId xmlns:a16="http://schemas.microsoft.com/office/drawing/2014/main" xmlns="" id="{25CE6D5A-A5C0-4B12-A26A-691D5743FA5C}"/>
+                <a16:creationId xmlns="" xmlns:a16="http://schemas.microsoft.com/office/drawing/2014/main" id="{25CE6D5A-A5C0-4B12-A26A-691D5743FA5C}"/>
               </a:ext>
             </a:extLst>
           </p:cNvPr>
@@ -20977,7 +19919,7 @@
           <p:cNvPr id="2" name="Title 1">
             <a:extLst>
               <a:ext uri="{FF2B5EF4-FFF2-40B4-BE49-F238E27FC236}">
-                <a16:creationId xmlns:a16="http://schemas.microsoft.com/office/drawing/2014/main" xmlns="" id="{32970CD0-696D-4313-96BA-4AA72C813BD0}"/>
+                <a16:creationId xmlns="" xmlns:a16="http://schemas.microsoft.com/office/drawing/2014/main" id="{32970CD0-696D-4313-96BA-4AA72C813BD0}"/>
               </a:ext>
             </a:extLst>
           </p:cNvPr>
@@ -21017,7 +19959,7 @@
           <p:cNvPr id="3" name="Content Placeholder 2">
             <a:extLst>
               <a:ext uri="{FF2B5EF4-FFF2-40B4-BE49-F238E27FC236}">
-                <a16:creationId xmlns:a16="http://schemas.microsoft.com/office/drawing/2014/main" xmlns="" id="{0FEE9886-36F0-4E06-A3A6-D8F00B0665A1}"/>
+                <a16:creationId xmlns="" xmlns:a16="http://schemas.microsoft.com/office/drawing/2014/main" id="{0FEE9886-36F0-4E06-A3A6-D8F00B0665A1}"/>
               </a:ext>
             </a:extLst>
           </p:cNvPr>
@@ -21074,7 +20016,7 @@
           <p:cNvPr id="7" name="Rectangle 6">
             <a:extLst>
               <a:ext uri="{FF2B5EF4-FFF2-40B4-BE49-F238E27FC236}">
-                <a16:creationId xmlns:a16="http://schemas.microsoft.com/office/drawing/2014/main" xmlns="" id="{76627016-BFC4-46D4-89DB-F72E3C3461EC}"/>
+                <a16:creationId xmlns="" xmlns:a16="http://schemas.microsoft.com/office/drawing/2014/main" id="{76627016-BFC4-46D4-89DB-F72E3C3461EC}"/>
               </a:ext>
             </a:extLst>
           </p:cNvPr>
@@ -21130,7 +20072,7 @@
           <p:cNvPr id="8" name="Picture 7">
             <a:extLst>
               <a:ext uri="{FF2B5EF4-FFF2-40B4-BE49-F238E27FC236}">
-                <a16:creationId xmlns:a16="http://schemas.microsoft.com/office/drawing/2014/main" xmlns="" id="{676C557E-B5A7-4416-BCC0-5743550BF152}"/>
+                <a16:creationId xmlns="" xmlns:a16="http://schemas.microsoft.com/office/drawing/2014/main" id="{676C557E-B5A7-4416-BCC0-5743550BF152}"/>
               </a:ext>
             </a:extLst>
           </p:cNvPr>
@@ -21166,7 +20108,7 @@
           <p:cNvPr id="15" name="Oval 14">
             <a:extLst>
               <a:ext uri="{FF2B5EF4-FFF2-40B4-BE49-F238E27FC236}">
-                <a16:creationId xmlns:a16="http://schemas.microsoft.com/office/drawing/2014/main" xmlns="" id="{EF515B4A-CB20-4847-8E00-0DD66F1FEBB4}"/>
+                <a16:creationId xmlns="" xmlns:a16="http://schemas.microsoft.com/office/drawing/2014/main" id="{EF515B4A-CB20-4847-8E00-0DD66F1FEBB4}"/>
               </a:ext>
             </a:extLst>
           </p:cNvPr>
@@ -21218,7 +20160,7 @@
           <p:cNvPr id="16" name="Slide Number Placeholder 5">
             <a:extLst>
               <a:ext uri="{FF2B5EF4-FFF2-40B4-BE49-F238E27FC236}">
-                <a16:creationId xmlns:a16="http://schemas.microsoft.com/office/drawing/2014/main" xmlns="" id="{996B64B9-1DF0-4EE9-BAB5-72AFA94B9AFD}"/>
+                <a16:creationId xmlns="" xmlns:a16="http://schemas.microsoft.com/office/drawing/2014/main" id="{996B64B9-1DF0-4EE9-BAB5-72AFA94B9AFD}"/>
               </a:ext>
             </a:extLst>
           </p:cNvPr>
@@ -21262,7 +20204,7 @@
           <p:cNvPr id="20" name="Content Placeholder 2">
             <a:extLst>
               <a:ext uri="{FF2B5EF4-FFF2-40B4-BE49-F238E27FC236}">
-                <a16:creationId xmlns:a16="http://schemas.microsoft.com/office/drawing/2014/main" xmlns="" id="{FEB88DD7-AEB5-4718-AF2D-28B5B91ED715}"/>
+                <a16:creationId xmlns="" xmlns:a16="http://schemas.microsoft.com/office/drawing/2014/main" id="{FEB88DD7-AEB5-4718-AF2D-28B5B91ED715}"/>
               </a:ext>
             </a:extLst>
           </p:cNvPr>
@@ -21324,7 +20266,7 @@
           <p:cNvPr id="23" name="Content Placeholder 2">
             <a:extLst>
               <a:ext uri="{FF2B5EF4-FFF2-40B4-BE49-F238E27FC236}">
-                <a16:creationId xmlns:a16="http://schemas.microsoft.com/office/drawing/2014/main" xmlns="" id="{E5123CE7-2F8A-489B-BD99-0C2A33ADF49A}"/>
+                <a16:creationId xmlns="" xmlns:a16="http://schemas.microsoft.com/office/drawing/2014/main" id="{E5123CE7-2F8A-489B-BD99-0C2A33ADF49A}"/>
               </a:ext>
             </a:extLst>
           </p:cNvPr>
@@ -21381,7 +20323,7 @@
           <p:cNvPr id="25" name="Content Placeholder 2">
             <a:extLst>
               <a:ext uri="{FF2B5EF4-FFF2-40B4-BE49-F238E27FC236}">
-                <a16:creationId xmlns:a16="http://schemas.microsoft.com/office/drawing/2014/main" xmlns="" id="{07730BCF-AC2A-4FEC-8F01-63964DB444CF}"/>
+                <a16:creationId xmlns="" xmlns:a16="http://schemas.microsoft.com/office/drawing/2014/main" id="{07730BCF-AC2A-4FEC-8F01-63964DB444CF}"/>
               </a:ext>
             </a:extLst>
           </p:cNvPr>
@@ -21443,7 +20385,7 @@
           <p:cNvPr id="21" name="Oval 20">
             <a:extLst>
               <a:ext uri="{FF2B5EF4-FFF2-40B4-BE49-F238E27FC236}">
-                <a16:creationId xmlns:a16="http://schemas.microsoft.com/office/drawing/2014/main" xmlns="" id="{919C8692-230B-D543-A7F7-4FD61B04D1C6}"/>
+                <a16:creationId xmlns="" xmlns:a16="http://schemas.microsoft.com/office/drawing/2014/main" id="{919C8692-230B-D543-A7F7-4FD61B04D1C6}"/>
               </a:ext>
             </a:extLst>
           </p:cNvPr>
@@ -21496,7 +20438,7 @@
           <p:cNvPr id="24" name="Picture Placeholder 11">
             <a:extLst>
               <a:ext uri="{FF2B5EF4-FFF2-40B4-BE49-F238E27FC236}">
-                <a16:creationId xmlns:a16="http://schemas.microsoft.com/office/drawing/2014/main" xmlns="" id="{E150BFC7-A11D-CC46-B5A2-8BD93C269506}"/>
+                <a16:creationId xmlns="" xmlns:a16="http://schemas.microsoft.com/office/drawing/2014/main" id="{E150BFC7-A11D-CC46-B5A2-8BD93C269506}"/>
               </a:ext>
             </a:extLst>
           </p:cNvPr>
@@ -21544,7 +20486,7 @@
           <p:cNvPr id="28" name="Oval 27">
             <a:extLst>
               <a:ext uri="{FF2B5EF4-FFF2-40B4-BE49-F238E27FC236}">
-                <a16:creationId xmlns:a16="http://schemas.microsoft.com/office/drawing/2014/main" xmlns="" id="{F95B55F4-B501-3440-8904-A1C7F049CBE8}"/>
+                <a16:creationId xmlns="" xmlns:a16="http://schemas.microsoft.com/office/drawing/2014/main" id="{F95B55F4-B501-3440-8904-A1C7F049CBE8}"/>
               </a:ext>
             </a:extLst>
           </p:cNvPr>
@@ -21600,7 +20542,7 @@
           <p:cNvPr id="29" name="Picture Placeholder 11">
             <a:extLst>
               <a:ext uri="{FF2B5EF4-FFF2-40B4-BE49-F238E27FC236}">
-                <a16:creationId xmlns:a16="http://schemas.microsoft.com/office/drawing/2014/main" xmlns="" id="{F2116994-BE3E-6A43-9C15-E71BA8EC821F}"/>
+                <a16:creationId xmlns="" xmlns:a16="http://schemas.microsoft.com/office/drawing/2014/main" id="{F2116994-BE3E-6A43-9C15-E71BA8EC821F}"/>
               </a:ext>
             </a:extLst>
           </p:cNvPr>
@@ -21678,7 +20620,7 @@
           <p:cNvPr id="11" name="Group 10">
             <a:extLst>
               <a:ext uri="{FF2B5EF4-FFF2-40B4-BE49-F238E27FC236}">
-                <a16:creationId xmlns:a16="http://schemas.microsoft.com/office/drawing/2014/main" xmlns="" id="{04B31150-A166-4DB3-A898-2154C9665891}"/>
+                <a16:creationId xmlns="" xmlns:a16="http://schemas.microsoft.com/office/drawing/2014/main" id="{04B31150-A166-4DB3-A898-2154C9665891}"/>
               </a:ext>
             </a:extLst>
           </p:cNvPr>
@@ -21703,7 +20645,7 @@
             <p:cNvPr id="12" name="Freeform 5">
               <a:extLst>
                 <a:ext uri="{FF2B5EF4-FFF2-40B4-BE49-F238E27FC236}">
-                  <a16:creationId xmlns:a16="http://schemas.microsoft.com/office/drawing/2014/main" xmlns="" id="{1C1A95BC-42CA-4166-918D-DF4306881408}"/>
+                  <a16:creationId xmlns="" xmlns:a16="http://schemas.microsoft.com/office/drawing/2014/main" id="{1C1A95BC-42CA-4166-918D-DF4306881408}"/>
                 </a:ext>
               </a:extLst>
             </p:cNvPr>
@@ -21893,7 +20835,7 @@
             <p:cNvPr id="13" name="Freeform 6">
               <a:extLst>
                 <a:ext uri="{FF2B5EF4-FFF2-40B4-BE49-F238E27FC236}">
-                  <a16:creationId xmlns:a16="http://schemas.microsoft.com/office/drawing/2014/main" xmlns="" id="{4B4D5F91-2158-4A30-B83C-5CC9CC6E5D4F}"/>
+                  <a16:creationId xmlns="" xmlns:a16="http://schemas.microsoft.com/office/drawing/2014/main" id="{4B4D5F91-2158-4A30-B83C-5CC9CC6E5D4F}"/>
                 </a:ext>
               </a:extLst>
             </p:cNvPr>
@@ -22043,7 +20985,7 @@
             <p:cNvPr id="14" name="Freeform 7">
               <a:extLst>
                 <a:ext uri="{FF2B5EF4-FFF2-40B4-BE49-F238E27FC236}">
-                  <a16:creationId xmlns:a16="http://schemas.microsoft.com/office/drawing/2014/main" xmlns="" id="{C509E5D6-79CC-4E1D-AAF4-C6F28F3C1777}"/>
+                  <a16:creationId xmlns="" xmlns:a16="http://schemas.microsoft.com/office/drawing/2014/main" id="{C509E5D6-79CC-4E1D-AAF4-C6F28F3C1777}"/>
                 </a:ext>
               </a:extLst>
             </p:cNvPr>
@@ -22184,7 +21126,7 @@
           <p:cNvPr id="6" name="Title 1">
             <a:extLst>
               <a:ext uri="{FF2B5EF4-FFF2-40B4-BE49-F238E27FC236}">
-                <a16:creationId xmlns:a16="http://schemas.microsoft.com/office/drawing/2014/main" xmlns="" id="{B70E2287-0F7B-4DD3-A805-DB19BBF3C716}"/>
+                <a16:creationId xmlns="" xmlns:a16="http://schemas.microsoft.com/office/drawing/2014/main" id="{B70E2287-0F7B-4DD3-A805-DB19BBF3C716}"/>
               </a:ext>
             </a:extLst>
           </p:cNvPr>
@@ -22224,7 +21166,7 @@
           <p:cNvPr id="7" name="Rectangle 6">
             <a:extLst>
               <a:ext uri="{FF2B5EF4-FFF2-40B4-BE49-F238E27FC236}">
-                <a16:creationId xmlns:a16="http://schemas.microsoft.com/office/drawing/2014/main" xmlns="" id="{8DCE74CE-BEFF-42B3-BF3E-C41B1B1F1EE4}"/>
+                <a16:creationId xmlns="" xmlns:a16="http://schemas.microsoft.com/office/drawing/2014/main" id="{8DCE74CE-BEFF-42B3-BF3E-C41B1B1F1EE4}"/>
               </a:ext>
             </a:extLst>
           </p:cNvPr>
@@ -22280,7 +21222,7 @@
           <p:cNvPr id="8" name="Picture 7">
             <a:extLst>
               <a:ext uri="{FF2B5EF4-FFF2-40B4-BE49-F238E27FC236}">
-                <a16:creationId xmlns:a16="http://schemas.microsoft.com/office/drawing/2014/main" xmlns="" id="{8B0944B4-FE4A-459A-85B1-3476FE6C4C49}"/>
+                <a16:creationId xmlns="" xmlns:a16="http://schemas.microsoft.com/office/drawing/2014/main" id="{8B0944B4-FE4A-459A-85B1-3476FE6C4C49}"/>
               </a:ext>
             </a:extLst>
           </p:cNvPr>
@@ -22316,7 +21258,7 @@
           <p:cNvPr id="9" name="Oval 8">
             <a:extLst>
               <a:ext uri="{FF2B5EF4-FFF2-40B4-BE49-F238E27FC236}">
-                <a16:creationId xmlns:a16="http://schemas.microsoft.com/office/drawing/2014/main" xmlns="" id="{1B26B4BC-3D52-4C1C-85FB-226F0B5201F1}"/>
+                <a16:creationId xmlns="" xmlns:a16="http://schemas.microsoft.com/office/drawing/2014/main" id="{1B26B4BC-3D52-4C1C-85FB-226F0B5201F1}"/>
               </a:ext>
             </a:extLst>
           </p:cNvPr>
@@ -22368,7 +21310,7 @@
           <p:cNvPr id="10" name="Slide Number Placeholder 5">
             <a:extLst>
               <a:ext uri="{FF2B5EF4-FFF2-40B4-BE49-F238E27FC236}">
-                <a16:creationId xmlns:a16="http://schemas.microsoft.com/office/drawing/2014/main" xmlns="" id="{CEC6B25A-6AA2-46A7-84BE-5C907CA51B02}"/>
+                <a16:creationId xmlns="" xmlns:a16="http://schemas.microsoft.com/office/drawing/2014/main" id="{CEC6B25A-6AA2-46A7-84BE-5C907CA51B02}"/>
               </a:ext>
             </a:extLst>
           </p:cNvPr>
@@ -22442,7 +21384,7 @@
           <p:cNvPr id="35" name="Group 34">
             <a:extLst>
               <a:ext uri="{FF2B5EF4-FFF2-40B4-BE49-F238E27FC236}">
-                <a16:creationId xmlns:a16="http://schemas.microsoft.com/office/drawing/2014/main" xmlns="" id="{431CD316-21C7-4FA9-A45A-374D6AE71ED5}"/>
+                <a16:creationId xmlns="" xmlns:a16="http://schemas.microsoft.com/office/drawing/2014/main" id="{431CD316-21C7-4FA9-A45A-374D6AE71ED5}"/>
               </a:ext>
             </a:extLst>
           </p:cNvPr>
@@ -22467,7 +21409,7 @@
             <p:cNvPr id="36" name="Freeform 5">
               <a:extLst>
                 <a:ext uri="{FF2B5EF4-FFF2-40B4-BE49-F238E27FC236}">
-                  <a16:creationId xmlns:a16="http://schemas.microsoft.com/office/drawing/2014/main" xmlns="" id="{E107D9FB-3967-4583-A9DA-6787AF71202C}"/>
+                  <a16:creationId xmlns="" xmlns:a16="http://schemas.microsoft.com/office/drawing/2014/main" id="{E107D9FB-3967-4583-A9DA-6787AF71202C}"/>
                 </a:ext>
               </a:extLst>
             </p:cNvPr>
@@ -22657,7 +21599,7 @@
             <p:cNvPr id="37" name="Freeform 6">
               <a:extLst>
                 <a:ext uri="{FF2B5EF4-FFF2-40B4-BE49-F238E27FC236}">
-                  <a16:creationId xmlns:a16="http://schemas.microsoft.com/office/drawing/2014/main" xmlns="" id="{138D5FEB-37FF-4F26-B625-CE2BE91FF21B}"/>
+                  <a16:creationId xmlns="" xmlns:a16="http://schemas.microsoft.com/office/drawing/2014/main" id="{138D5FEB-37FF-4F26-B625-CE2BE91FF21B}"/>
                 </a:ext>
               </a:extLst>
             </p:cNvPr>
@@ -22807,7 +21749,7 @@
             <p:cNvPr id="38" name="Freeform 7">
               <a:extLst>
                 <a:ext uri="{FF2B5EF4-FFF2-40B4-BE49-F238E27FC236}">
-                  <a16:creationId xmlns:a16="http://schemas.microsoft.com/office/drawing/2014/main" xmlns="" id="{6C2B67E8-673C-422C-B021-296E2E2B952D}"/>
+                  <a16:creationId xmlns="" xmlns:a16="http://schemas.microsoft.com/office/drawing/2014/main" id="{6C2B67E8-673C-422C-B021-296E2E2B952D}"/>
                 </a:ext>
               </a:extLst>
             </p:cNvPr>
@@ -22948,7 +21890,7 @@
           <p:cNvPr id="23" name="Oval 22">
             <a:extLst>
               <a:ext uri="{FF2B5EF4-FFF2-40B4-BE49-F238E27FC236}">
-                <a16:creationId xmlns:a16="http://schemas.microsoft.com/office/drawing/2014/main" xmlns="" id="{687010E4-ADF2-486D-8DF7-B0FF38C6DADF}"/>
+                <a16:creationId xmlns="" xmlns:a16="http://schemas.microsoft.com/office/drawing/2014/main" id="{687010E4-ADF2-486D-8DF7-B0FF38C6DADF}"/>
               </a:ext>
             </a:extLst>
           </p:cNvPr>
@@ -23002,7 +21944,7 @@
           <p:cNvPr id="24" name="Oval 23">
             <a:extLst>
               <a:ext uri="{FF2B5EF4-FFF2-40B4-BE49-F238E27FC236}">
-                <a16:creationId xmlns:a16="http://schemas.microsoft.com/office/drawing/2014/main" xmlns="" id="{9159AA79-2237-4A27-BBC2-D44032158D19}"/>
+                <a16:creationId xmlns="" xmlns:a16="http://schemas.microsoft.com/office/drawing/2014/main" id="{9159AA79-2237-4A27-BBC2-D44032158D19}"/>
               </a:ext>
             </a:extLst>
           </p:cNvPr>
@@ -23056,7 +21998,7 @@
           <p:cNvPr id="25" name="Oval 24">
             <a:extLst>
               <a:ext uri="{FF2B5EF4-FFF2-40B4-BE49-F238E27FC236}">
-                <a16:creationId xmlns:a16="http://schemas.microsoft.com/office/drawing/2014/main" xmlns="" id="{0272B962-9566-42D2-B4C3-E7AA81884A83}"/>
+                <a16:creationId xmlns="" xmlns:a16="http://schemas.microsoft.com/office/drawing/2014/main" id="{0272B962-9566-42D2-B4C3-E7AA81884A83}"/>
               </a:ext>
             </a:extLst>
           </p:cNvPr>
@@ -23110,7 +22052,7 @@
           <p:cNvPr id="26" name="Oval 25">
             <a:extLst>
               <a:ext uri="{FF2B5EF4-FFF2-40B4-BE49-F238E27FC236}">
-                <a16:creationId xmlns:a16="http://schemas.microsoft.com/office/drawing/2014/main" xmlns="" id="{19733285-016C-4C38-816C-83D30C075C70}"/>
+                <a16:creationId xmlns="" xmlns:a16="http://schemas.microsoft.com/office/drawing/2014/main" id="{19733285-016C-4C38-816C-83D30C075C70}"/>
               </a:ext>
             </a:extLst>
           </p:cNvPr>
@@ -23164,7 +22106,7 @@
           <p:cNvPr id="20" name="Freeform: Shape 19">
             <a:extLst>
               <a:ext uri="{FF2B5EF4-FFF2-40B4-BE49-F238E27FC236}">
-                <a16:creationId xmlns:a16="http://schemas.microsoft.com/office/drawing/2014/main" xmlns="" id="{EF40DBA4-AB63-4B47-B37F-BCC3D59B5392}"/>
+                <a16:creationId xmlns="" xmlns:a16="http://schemas.microsoft.com/office/drawing/2014/main" id="{EF40DBA4-AB63-4B47-B37F-BCC3D59B5392}"/>
               </a:ext>
             </a:extLst>
           </p:cNvPr>
@@ -23279,7 +22221,7 @@
           <p:cNvPr id="21" name="Freeform: Shape 20">
             <a:extLst>
               <a:ext uri="{FF2B5EF4-FFF2-40B4-BE49-F238E27FC236}">
-                <a16:creationId xmlns:a16="http://schemas.microsoft.com/office/drawing/2014/main" xmlns="" id="{33EF0AFB-D099-4FF1-8963-7DA87268867F}"/>
+                <a16:creationId xmlns="" xmlns:a16="http://schemas.microsoft.com/office/drawing/2014/main" id="{33EF0AFB-D099-4FF1-8963-7DA87268867F}"/>
               </a:ext>
             </a:extLst>
           </p:cNvPr>
@@ -23394,7 +22336,7 @@
           <p:cNvPr id="22" name="Freeform: Shape 21">
             <a:extLst>
               <a:ext uri="{FF2B5EF4-FFF2-40B4-BE49-F238E27FC236}">
-                <a16:creationId xmlns:a16="http://schemas.microsoft.com/office/drawing/2014/main" xmlns="" id="{6872C96E-9AF3-4FA0-8180-C213C7F2209E}"/>
+                <a16:creationId xmlns="" xmlns:a16="http://schemas.microsoft.com/office/drawing/2014/main" id="{6872C96E-9AF3-4FA0-8180-C213C7F2209E}"/>
               </a:ext>
             </a:extLst>
           </p:cNvPr>
@@ -23509,7 +22451,7 @@
           <p:cNvPr id="17" name="Freeform: Shape 16">
             <a:extLst>
               <a:ext uri="{FF2B5EF4-FFF2-40B4-BE49-F238E27FC236}">
-                <a16:creationId xmlns:a16="http://schemas.microsoft.com/office/drawing/2014/main" xmlns="" id="{3A08BE29-CFA5-4E0D-9DBE-A430AE1B8072}"/>
+                <a16:creationId xmlns="" xmlns:a16="http://schemas.microsoft.com/office/drawing/2014/main" id="{3A08BE29-CFA5-4E0D-9DBE-A430AE1B8072}"/>
               </a:ext>
             </a:extLst>
           </p:cNvPr>
@@ -23624,7 +22566,7 @@
           <p:cNvPr id="6" name="Title 1">
             <a:extLst>
               <a:ext uri="{FF2B5EF4-FFF2-40B4-BE49-F238E27FC236}">
-                <a16:creationId xmlns:a16="http://schemas.microsoft.com/office/drawing/2014/main" xmlns="" id="{B70E2287-0F7B-4DD3-A805-DB19BBF3C716}"/>
+                <a16:creationId xmlns="" xmlns:a16="http://schemas.microsoft.com/office/drawing/2014/main" id="{B70E2287-0F7B-4DD3-A805-DB19BBF3C716}"/>
               </a:ext>
             </a:extLst>
           </p:cNvPr>
@@ -23664,7 +22606,7 @@
           <p:cNvPr id="7" name="Rectangle 6">
             <a:extLst>
               <a:ext uri="{FF2B5EF4-FFF2-40B4-BE49-F238E27FC236}">
-                <a16:creationId xmlns:a16="http://schemas.microsoft.com/office/drawing/2014/main" xmlns="" id="{8DCE74CE-BEFF-42B3-BF3E-C41B1B1F1EE4}"/>
+                <a16:creationId xmlns="" xmlns:a16="http://schemas.microsoft.com/office/drawing/2014/main" id="{8DCE74CE-BEFF-42B3-BF3E-C41B1B1F1EE4}"/>
               </a:ext>
             </a:extLst>
           </p:cNvPr>
@@ -23720,7 +22662,7 @@
           <p:cNvPr id="8" name="Picture 7">
             <a:extLst>
               <a:ext uri="{FF2B5EF4-FFF2-40B4-BE49-F238E27FC236}">
-                <a16:creationId xmlns:a16="http://schemas.microsoft.com/office/drawing/2014/main" xmlns="" id="{8B0944B4-FE4A-459A-85B1-3476FE6C4C49}"/>
+                <a16:creationId xmlns="" xmlns:a16="http://schemas.microsoft.com/office/drawing/2014/main" id="{8B0944B4-FE4A-459A-85B1-3476FE6C4C49}"/>
               </a:ext>
             </a:extLst>
           </p:cNvPr>
@@ -23756,7 +22698,7 @@
           <p:cNvPr id="9" name="Oval 8">
             <a:extLst>
               <a:ext uri="{FF2B5EF4-FFF2-40B4-BE49-F238E27FC236}">
-                <a16:creationId xmlns:a16="http://schemas.microsoft.com/office/drawing/2014/main" xmlns="" id="{1B26B4BC-3D52-4C1C-85FB-226F0B5201F1}"/>
+                <a16:creationId xmlns="" xmlns:a16="http://schemas.microsoft.com/office/drawing/2014/main" id="{1B26B4BC-3D52-4C1C-85FB-226F0B5201F1}"/>
               </a:ext>
             </a:extLst>
           </p:cNvPr>
@@ -23808,7 +22750,7 @@
           <p:cNvPr id="10" name="Slide Number Placeholder 5">
             <a:extLst>
               <a:ext uri="{FF2B5EF4-FFF2-40B4-BE49-F238E27FC236}">
-                <a16:creationId xmlns:a16="http://schemas.microsoft.com/office/drawing/2014/main" xmlns="" id="{CEC6B25A-6AA2-46A7-84BE-5C907CA51B02}"/>
+                <a16:creationId xmlns="" xmlns:a16="http://schemas.microsoft.com/office/drawing/2014/main" id="{CEC6B25A-6AA2-46A7-84BE-5C907CA51B02}"/>
               </a:ext>
             </a:extLst>
           </p:cNvPr>
@@ -23852,7 +22794,7 @@
           <p:cNvPr id="3" name="Picture Placeholder 2">
             <a:extLst>
               <a:ext uri="{FF2B5EF4-FFF2-40B4-BE49-F238E27FC236}">
-                <a16:creationId xmlns:a16="http://schemas.microsoft.com/office/drawing/2014/main" xmlns="" id="{B1B995BE-66C2-4379-885F-4BE069DA39E4}"/>
+                <a16:creationId xmlns="" xmlns:a16="http://schemas.microsoft.com/office/drawing/2014/main" id="{B1B995BE-66C2-4379-885F-4BE069DA39E4}"/>
               </a:ext>
             </a:extLst>
           </p:cNvPr>
@@ -23899,7 +22841,7 @@
           <p:cNvPr id="11" name="Picture Placeholder 2">
             <a:extLst>
               <a:ext uri="{FF2B5EF4-FFF2-40B4-BE49-F238E27FC236}">
-                <a16:creationId xmlns:a16="http://schemas.microsoft.com/office/drawing/2014/main" xmlns="" id="{9B56B6C6-9F3C-4E80-BBAD-280E697B895C}"/>
+                <a16:creationId xmlns="" xmlns:a16="http://schemas.microsoft.com/office/drawing/2014/main" id="{9B56B6C6-9F3C-4E80-BBAD-280E697B895C}"/>
               </a:ext>
             </a:extLst>
           </p:cNvPr>
@@ -23946,7 +22888,7 @@
           <p:cNvPr id="12" name="Picture Placeholder 2">
             <a:extLst>
               <a:ext uri="{FF2B5EF4-FFF2-40B4-BE49-F238E27FC236}">
-                <a16:creationId xmlns:a16="http://schemas.microsoft.com/office/drawing/2014/main" xmlns="" id="{54704160-1ED7-4B90-8963-0F887C73E94D}"/>
+                <a16:creationId xmlns="" xmlns:a16="http://schemas.microsoft.com/office/drawing/2014/main" id="{54704160-1ED7-4B90-8963-0F887C73E94D}"/>
               </a:ext>
             </a:extLst>
           </p:cNvPr>
@@ -23993,7 +22935,7 @@
           <p:cNvPr id="13" name="Picture Placeholder 2">
             <a:extLst>
               <a:ext uri="{FF2B5EF4-FFF2-40B4-BE49-F238E27FC236}">
-                <a16:creationId xmlns:a16="http://schemas.microsoft.com/office/drawing/2014/main" xmlns="" id="{36610597-6A76-4A06-82A5-A8FFC5BAEA0F}"/>
+                <a16:creationId xmlns="" xmlns:a16="http://schemas.microsoft.com/office/drawing/2014/main" id="{36610597-6A76-4A06-82A5-A8FFC5BAEA0F}"/>
               </a:ext>
             </a:extLst>
           </p:cNvPr>
@@ -24040,7 +22982,7 @@
           <p:cNvPr id="27" name="Content Placeholder 2">
             <a:extLst>
               <a:ext uri="{FF2B5EF4-FFF2-40B4-BE49-F238E27FC236}">
-                <a16:creationId xmlns:a16="http://schemas.microsoft.com/office/drawing/2014/main" xmlns="" id="{FF56D2E5-86E4-473A-A62F-B7029E5B2558}"/>
+                <a16:creationId xmlns="" xmlns:a16="http://schemas.microsoft.com/office/drawing/2014/main" id="{FF56D2E5-86E4-473A-A62F-B7029E5B2558}"/>
               </a:ext>
             </a:extLst>
           </p:cNvPr>
@@ -24097,7 +23039,7 @@
           <p:cNvPr id="28" name="Content Placeholder 2">
             <a:extLst>
               <a:ext uri="{FF2B5EF4-FFF2-40B4-BE49-F238E27FC236}">
-                <a16:creationId xmlns:a16="http://schemas.microsoft.com/office/drawing/2014/main" xmlns="" id="{93934E34-6CC7-492D-9515-EBEC72EFF4CB}"/>
+                <a16:creationId xmlns="" xmlns:a16="http://schemas.microsoft.com/office/drawing/2014/main" id="{93934E34-6CC7-492D-9515-EBEC72EFF4CB}"/>
               </a:ext>
             </a:extLst>
           </p:cNvPr>
@@ -24159,7 +23101,7 @@
           <p:cNvPr id="29" name="Content Placeholder 2">
             <a:extLst>
               <a:ext uri="{FF2B5EF4-FFF2-40B4-BE49-F238E27FC236}">
-                <a16:creationId xmlns:a16="http://schemas.microsoft.com/office/drawing/2014/main" xmlns="" id="{E4E27467-A1AA-4773-AAB5-A96267FBD712}"/>
+                <a16:creationId xmlns="" xmlns:a16="http://schemas.microsoft.com/office/drawing/2014/main" id="{E4E27467-A1AA-4773-AAB5-A96267FBD712}"/>
               </a:ext>
             </a:extLst>
           </p:cNvPr>
@@ -24216,7 +23158,7 @@
           <p:cNvPr id="30" name="Content Placeholder 2">
             <a:extLst>
               <a:ext uri="{FF2B5EF4-FFF2-40B4-BE49-F238E27FC236}">
-                <a16:creationId xmlns:a16="http://schemas.microsoft.com/office/drawing/2014/main" xmlns="" id="{6CABD5EB-4A8B-448B-8ED1-B8B420815B2D}"/>
+                <a16:creationId xmlns="" xmlns:a16="http://schemas.microsoft.com/office/drawing/2014/main" id="{6CABD5EB-4A8B-448B-8ED1-B8B420815B2D}"/>
               </a:ext>
             </a:extLst>
           </p:cNvPr>
@@ -24278,7 +23220,7 @@
           <p:cNvPr id="31" name="Content Placeholder 2">
             <a:extLst>
               <a:ext uri="{FF2B5EF4-FFF2-40B4-BE49-F238E27FC236}">
-                <a16:creationId xmlns:a16="http://schemas.microsoft.com/office/drawing/2014/main" xmlns="" id="{0D86883C-E501-47FF-AE1A-E9CE8B71B421}"/>
+                <a16:creationId xmlns="" xmlns:a16="http://schemas.microsoft.com/office/drawing/2014/main" id="{0D86883C-E501-47FF-AE1A-E9CE8B71B421}"/>
               </a:ext>
             </a:extLst>
           </p:cNvPr>
@@ -24335,7 +23277,7 @@
           <p:cNvPr id="32" name="Content Placeholder 2">
             <a:extLst>
               <a:ext uri="{FF2B5EF4-FFF2-40B4-BE49-F238E27FC236}">
-                <a16:creationId xmlns:a16="http://schemas.microsoft.com/office/drawing/2014/main" xmlns="" id="{3683A037-F698-4CC9-904D-F377D71F690F}"/>
+                <a16:creationId xmlns="" xmlns:a16="http://schemas.microsoft.com/office/drawing/2014/main" id="{3683A037-F698-4CC9-904D-F377D71F690F}"/>
               </a:ext>
             </a:extLst>
           </p:cNvPr>
@@ -24397,7 +23339,7 @@
           <p:cNvPr id="33" name="Content Placeholder 2">
             <a:extLst>
               <a:ext uri="{FF2B5EF4-FFF2-40B4-BE49-F238E27FC236}">
-                <a16:creationId xmlns:a16="http://schemas.microsoft.com/office/drawing/2014/main" xmlns="" id="{0A095594-2B82-44ED-8C9B-DA7C4D3D2872}"/>
+                <a16:creationId xmlns="" xmlns:a16="http://schemas.microsoft.com/office/drawing/2014/main" id="{0A095594-2B82-44ED-8C9B-DA7C4D3D2872}"/>
               </a:ext>
             </a:extLst>
           </p:cNvPr>
@@ -24454,7 +23396,7 @@
           <p:cNvPr id="34" name="Content Placeholder 2">
             <a:extLst>
               <a:ext uri="{FF2B5EF4-FFF2-40B4-BE49-F238E27FC236}">
-                <a16:creationId xmlns:a16="http://schemas.microsoft.com/office/drawing/2014/main" xmlns="" id="{54CDD46A-22ED-48F5-9B5F-13B1B5C4B320}"/>
+                <a16:creationId xmlns="" xmlns:a16="http://schemas.microsoft.com/office/drawing/2014/main" id="{54CDD46A-22ED-48F5-9B5F-13B1B5C4B320}"/>
               </a:ext>
             </a:extLst>
           </p:cNvPr>
@@ -24551,7 +23493,7 @@
           <p:cNvPr id="2" name="Title Placeholder 1">
             <a:extLst>
               <a:ext uri="{FF2B5EF4-FFF2-40B4-BE49-F238E27FC236}">
-                <a16:creationId xmlns:a16="http://schemas.microsoft.com/office/drawing/2014/main" xmlns="" id="{BCC4D7FA-B85E-4477-8C62-94955B340F14}"/>
+                <a16:creationId xmlns="" xmlns:a16="http://schemas.microsoft.com/office/drawing/2014/main" id="{BCC4D7FA-B85E-4477-8C62-94955B340F14}"/>
               </a:ext>
             </a:extLst>
           </p:cNvPr>
@@ -24590,7 +23532,7 @@
           <p:cNvPr id="3" name="Text Placeholder 2">
             <a:extLst>
               <a:ext uri="{FF2B5EF4-FFF2-40B4-BE49-F238E27FC236}">
-                <a16:creationId xmlns:a16="http://schemas.microsoft.com/office/drawing/2014/main" xmlns="" id="{1F1226BB-3E56-4E7F-8172-7EC03C9F0BCF}"/>
+                <a16:creationId xmlns="" xmlns:a16="http://schemas.microsoft.com/office/drawing/2014/main" id="{1F1226BB-3E56-4E7F-8172-7EC03C9F0BCF}"/>
               </a:ext>
             </a:extLst>
           </p:cNvPr>
@@ -24657,7 +23599,7 @@
           <p:cNvPr id="4" name="Date Placeholder 3">
             <a:extLst>
               <a:ext uri="{FF2B5EF4-FFF2-40B4-BE49-F238E27FC236}">
-                <a16:creationId xmlns:a16="http://schemas.microsoft.com/office/drawing/2014/main" xmlns="" id="{D95D08EF-72FB-4F19-9916-65815A9CA99C}"/>
+                <a16:creationId xmlns="" xmlns:a16="http://schemas.microsoft.com/office/drawing/2014/main" id="{D95D08EF-72FB-4F19-9916-65815A9CA99C}"/>
               </a:ext>
             </a:extLst>
           </p:cNvPr>
@@ -24693,7 +23635,7 @@
           <a:p>
             <a:fld id="{D951F27F-98F9-A147-8986-34441C7B752D}" type="datetime1">
               <a:rPr lang="en-US" noProof="0" smtClean="0"/>
-              <a:t>7/25/19</a:t>
+              <a:t>7/29/2019</a:t>
             </a:fld>
             <a:endParaRPr lang="en-US" noProof="0" dirty="0"/>
           </a:p>
@@ -24704,7 +23646,7 @@
           <p:cNvPr id="5" name="Footer Placeholder 4">
             <a:extLst>
               <a:ext uri="{FF2B5EF4-FFF2-40B4-BE49-F238E27FC236}">
-                <a16:creationId xmlns:a16="http://schemas.microsoft.com/office/drawing/2014/main" xmlns="" id="{1365084D-BC85-4A55-BD80-93876AD10108}"/>
+                <a16:creationId xmlns="" xmlns:a16="http://schemas.microsoft.com/office/drawing/2014/main" id="{1365084D-BC85-4A55-BD80-93876AD10108}"/>
               </a:ext>
             </a:extLst>
           </p:cNvPr>
@@ -24747,7 +23689,7 @@
           <p:cNvPr id="6" name="Slide Number Placeholder 5">
             <a:extLst>
               <a:ext uri="{FF2B5EF4-FFF2-40B4-BE49-F238E27FC236}">
-                <a16:creationId xmlns:a16="http://schemas.microsoft.com/office/drawing/2014/main" xmlns="" id="{45FDEF23-A140-4DD6-A0D0-A86BD4DF3404}"/>
+                <a16:creationId xmlns="" xmlns:a16="http://schemas.microsoft.com/office/drawing/2014/main" id="{45FDEF23-A140-4DD6-A0D0-A86BD4DF3404}"/>
               </a:ext>
             </a:extLst>
           </p:cNvPr>
@@ -25198,7 +24140,7 @@
           <p:cNvPr id="2" name="Title 1">
             <a:extLst>
               <a:ext uri="{FF2B5EF4-FFF2-40B4-BE49-F238E27FC236}">
-                <a16:creationId xmlns:a16="http://schemas.microsoft.com/office/drawing/2014/main" xmlns="" id="{FBAB08B8-3DB3-4637-AE23-B8DB96D9FCEC}"/>
+                <a16:creationId xmlns="" xmlns:a16="http://schemas.microsoft.com/office/drawing/2014/main" id="{FBAB08B8-3DB3-4637-AE23-B8DB96D9FCEC}"/>
               </a:ext>
             </a:extLst>
           </p:cNvPr>
@@ -25430,11 +24372,6 @@
               </a:rPr>
               <a:t> : </a:t>
             </a:r>
-            <a:endParaRPr lang="en-US" sz="2000" dirty="0" smtClean="0">
-              <a:solidFill>
-                <a:schemeClr val="bg1"/>
-              </a:solidFill>
-            </a:endParaRPr>
           </a:p>
           <a:p>
             <a:endParaRPr lang="en-US" sz="2000" dirty="0" smtClean="0">
@@ -32907,8 +31844,10 @@
       </p:sp>
       <p:pic>
         <p:nvPicPr>
-          <p:cNvPr id="6" name="Picture 5" descr="C:\Users\ASUS\Pictures\arsitektur TA.JPG"/>
-          <p:cNvPicPr/>
+          <p:cNvPr id="2" name="Picture 1"/>
+          <p:cNvPicPr>
+            <a:picLocks noChangeAspect="1"/>
+          </p:cNvPicPr>
           <p:nvPr/>
         </p:nvPicPr>
         <p:blipFill>
@@ -32919,23 +31858,18 @@
               </a:ext>
             </a:extLst>
           </a:blip>
-          <a:srcRect/>
           <a:stretch>
             <a:fillRect/>
           </a:stretch>
         </p:blipFill>
-        <p:spPr bwMode="auto">
+        <p:spPr>
           <a:xfrm>
-            <a:off x="2142423" y="1375646"/>
-            <a:ext cx="8500056" cy="5267460"/>
+            <a:off x="2478452" y="1464971"/>
+            <a:ext cx="6232198" cy="5275194"/>
           </a:xfrm>
           <a:prstGeom prst="rect">
             <a:avLst/>
           </a:prstGeom>
-          <a:noFill/>
-          <a:ln>
-            <a:noFill/>
-          </a:ln>
         </p:spPr>
       </p:pic>
     </p:spTree>
@@ -38892,11 +37826,11 @@
   <p:clrMapOvr>
     <a:masterClrMapping/>
   </p:clrMapOvr>
-  <mc:AlternateContent xmlns:mc="http://schemas.openxmlformats.org/markup-compatibility/2006">
-    <mc:Choice xmlns:p14="http://schemas.microsoft.com/office/powerpoint/2010/main" Requires="p14">
+  <mc:AlternateContent xmlns:mc="http://schemas.openxmlformats.org/markup-compatibility/2006" xmlns:p14="http://schemas.microsoft.com/office/powerpoint/2010/main">
+    <mc:Choice Requires="p14">
       <p:transition spd="slow" p14:dur="2000"/>
     </mc:Choice>
-    <mc:Fallback>
+    <mc:Fallback xmlns="">
       <p:transition spd="slow"/>
     </mc:Fallback>
   </mc:AlternateContent>
@@ -39157,11 +38091,11 @@
   <p:clrMapOvr>
     <a:masterClrMapping/>
   </p:clrMapOvr>
-  <mc:AlternateContent xmlns:mc="http://schemas.openxmlformats.org/markup-compatibility/2006">
-    <mc:Choice xmlns:p14="http://schemas.microsoft.com/office/powerpoint/2010/main" Requires="p14">
+  <mc:AlternateContent xmlns:mc="http://schemas.openxmlformats.org/markup-compatibility/2006" xmlns:p14="http://schemas.microsoft.com/office/powerpoint/2010/main">
+    <mc:Choice Requires="p14">
       <p:transition spd="slow" p14:dur="2000"/>
     </mc:Choice>
-    <mc:Fallback>
+    <mc:Fallback xmlns="">
       <p:transition spd="slow"/>
     </mc:Fallback>
   </mc:AlternateContent>
@@ -39360,11 +38294,11 @@
   <p:clrMapOvr>
     <a:masterClrMapping/>
   </p:clrMapOvr>
-  <mc:AlternateContent xmlns:mc="http://schemas.openxmlformats.org/markup-compatibility/2006">
-    <mc:Choice xmlns:p14="http://schemas.microsoft.com/office/powerpoint/2010/main" Requires="p14">
+  <mc:AlternateContent xmlns:mc="http://schemas.openxmlformats.org/markup-compatibility/2006" xmlns:p14="http://schemas.microsoft.com/office/powerpoint/2010/main">
+    <mc:Choice Requires="p14">
       <p:transition spd="slow" p14:dur="2000"/>
     </mc:Choice>
-    <mc:Fallback>
+    <mc:Fallback xmlns="">
       <p:transition spd="slow"/>
     </mc:Fallback>
   </mc:AlternateContent>
@@ -39563,11 +38497,11 @@
   <p:clrMapOvr>
     <a:masterClrMapping/>
   </p:clrMapOvr>
-  <mc:AlternateContent xmlns:mc="http://schemas.openxmlformats.org/markup-compatibility/2006">
-    <mc:Choice xmlns:p14="http://schemas.microsoft.com/office/powerpoint/2010/main" Requires="p14">
+  <mc:AlternateContent xmlns:mc="http://schemas.openxmlformats.org/markup-compatibility/2006" xmlns:p14="http://schemas.microsoft.com/office/powerpoint/2010/main">
+    <mc:Choice Requires="p14">
       <p:transition spd="slow" p14:dur="2000"/>
     </mc:Choice>
-    <mc:Fallback>
+    <mc:Fallback xmlns="">
       <p:transition spd="slow"/>
     </mc:Fallback>
   </mc:AlternateContent>
@@ -39766,11 +38700,11 @@
   <p:clrMapOvr>
     <a:masterClrMapping/>
   </p:clrMapOvr>
-  <mc:AlternateContent xmlns:mc="http://schemas.openxmlformats.org/markup-compatibility/2006">
-    <mc:Choice xmlns:p14="http://schemas.microsoft.com/office/powerpoint/2010/main" Requires="p14">
+  <mc:AlternateContent xmlns:mc="http://schemas.openxmlformats.org/markup-compatibility/2006" xmlns:p14="http://schemas.microsoft.com/office/powerpoint/2010/main">
+    <mc:Choice Requires="p14">
       <p:transition spd="slow" p14:dur="2000"/>
     </mc:Choice>
-    <mc:Fallback>
+    <mc:Fallback xmlns="">
       <p:transition spd="slow"/>
     </mc:Fallback>
   </mc:AlternateContent>
@@ -41336,7 +40270,7 @@
           <p:cNvPr id="2" name="Title 1">
             <a:extLst>
               <a:ext uri="{FF2B5EF4-FFF2-40B4-BE49-F238E27FC236}">
-                <a16:creationId xmlns:a16="http://schemas.microsoft.com/office/drawing/2014/main" xmlns="" id="{FBAB08B8-3DB3-4637-AE23-B8DB96D9FCEC}"/>
+                <a16:creationId xmlns="" xmlns:a16="http://schemas.microsoft.com/office/drawing/2014/main" id="{FBAB08B8-3DB3-4637-AE23-B8DB96D9FCEC}"/>
               </a:ext>
             </a:extLst>
           </p:cNvPr>
@@ -43263,11 +42197,11 @@
   <p:clrMapOvr>
     <a:masterClrMapping/>
   </p:clrMapOvr>
-  <mc:AlternateContent xmlns:mc="http://schemas.openxmlformats.org/markup-compatibility/2006">
-    <mc:Choice xmlns:p14="http://schemas.microsoft.com/office/powerpoint/2010/main" Requires="p14">
+  <mc:AlternateContent xmlns:mc="http://schemas.openxmlformats.org/markup-compatibility/2006" xmlns:p14="http://schemas.microsoft.com/office/powerpoint/2010/main">
+    <mc:Choice Requires="p14">
       <p:transition spd="slow" p14:dur="2000"/>
     </mc:Choice>
-    <mc:Fallback>
+    <mc:Fallback xmlns="">
       <p:transition spd="slow"/>
     </mc:Fallback>
   </mc:AlternateContent>
@@ -44073,15 +43007,6 @@
 </file>
 
 <file path=customXml/item1.xml><?xml version="1.0" encoding="utf-8"?>
-<?mso-contentType ?>
-<FormTemplates xmlns="http://schemas.microsoft.com/sharepoint/v3/contenttype/forms">
-  <Display>DocumentLibraryForm</Display>
-  <Edit>DocumentLibraryForm</Edit>
-  <New>DocumentLibraryForm</New>
-</FormTemplates>
-</file>
-
-<file path=customXml/item2.xml><?xml version="1.0" encoding="utf-8"?>
 <ct:contentTypeSchema xmlns:ct="http://schemas.microsoft.com/office/2006/metadata/contentType" xmlns:ma="http://schemas.microsoft.com/office/2006/metadata/properties/metaAttributes" ct:_="" ma:_="" ma:contentTypeName="Document" ma:contentTypeID="0x01010079F111ED35F8CC479449609E8A0923A6" ma:contentTypeVersion="11" ma:contentTypeDescription="Create a new document." ma:contentTypeScope="" ma:versionID="9677210f24a1be23c92c90fd886aa0aa">
   <xsd:schema xmlns:xsd="http://www.w3.org/2001/XMLSchema" xmlns:xs="http://www.w3.org/2001/XMLSchema" xmlns:p="http://schemas.microsoft.com/office/2006/metadata/properties" xmlns:ns2="71af3243-3dd4-4a8d-8c0d-dd76da1f02a5" xmlns:ns3="16c05727-aa75-4e4a-9b5f-8a80a1165891" targetNamespace="http://schemas.microsoft.com/office/2006/metadata/properties" ma:root="true" ma:fieldsID="60e05723c5c1908df1a1a4ebf11d344e" ns2:_="" ns3:_="">
     <xsd:import namespace="71af3243-3dd4-4a8d-8c0d-dd76da1f02a5"/>
@@ -44292,7 +43217,7 @@
 </ct:contentTypeSchema>
 </file>
 
-<file path=customXml/item3.xml><?xml version="1.0" encoding="utf-8"?>
+<file path=customXml/item2.xml><?xml version="1.0" encoding="utf-8"?>
 <p:properties xmlns:p="http://schemas.microsoft.com/office/2006/metadata/properties" xmlns:xsi="http://www.w3.org/2001/XMLSchema-instance" xmlns:pc="http://schemas.microsoft.com/office/infopath/2007/PartnerControls">
   <documentManagement>
     <MediaServiceKeyPoints xmlns="71af3243-3dd4-4a8d-8c0d-dd76da1f02a5" xsi:nil="true"/>
@@ -44300,15 +43225,16 @@
 </p:properties>
 </file>
 
-<file path=customXml/itemProps1.xml><?xml version="1.0" encoding="utf-8"?>
-<ds:datastoreItem xmlns:ds="http://schemas.openxmlformats.org/officeDocument/2006/customXml" ds:itemID="{B0C07E3D-60A7-4F4E-8208-D9CCD01982CB}">
-  <ds:schemaRefs>
-    <ds:schemaRef ds:uri="http://schemas.microsoft.com/sharepoint/v3/contenttype/forms"/>
-  </ds:schemaRefs>
-</ds:datastoreItem>
+<file path=customXml/item3.xml><?xml version="1.0" encoding="utf-8"?>
+<?mso-contentType ?>
+<FormTemplates xmlns="http://schemas.microsoft.com/sharepoint/v3/contenttype/forms">
+  <Display>DocumentLibraryForm</Display>
+  <Edit>DocumentLibraryForm</Edit>
+  <New>DocumentLibraryForm</New>
+</FormTemplates>
 </file>
 
-<file path=customXml/itemProps2.xml><?xml version="1.0" encoding="utf-8"?>
+<file path=customXml/itemProps1.xml><?xml version="1.0" encoding="utf-8"?>
 <ds:datastoreItem xmlns:ds="http://schemas.openxmlformats.org/officeDocument/2006/customXml" ds:itemID="{631071E6-22AE-499A-B09C-BF21CF5F7483}">
   <ds:schemaRefs>
     <ds:schemaRef ds:uri="http://schemas.microsoft.com/office/2006/metadata/contentType"/>
@@ -44327,7 +43253,7 @@
 </ds:datastoreItem>
 </file>
 
-<file path=customXml/itemProps3.xml><?xml version="1.0" encoding="utf-8"?>
+<file path=customXml/itemProps2.xml><?xml version="1.0" encoding="utf-8"?>
 <ds:datastoreItem xmlns:ds="http://schemas.openxmlformats.org/officeDocument/2006/customXml" ds:itemID="{CEA9B47F-3DD8-4645-81DC-B88780643C07}">
   <ds:schemaRefs>
     <ds:schemaRef ds:uri="16c05727-aa75-4e4a-9b5f-8a80a1165891"/>
@@ -44342,4 +43268,12 @@
     <ds:schemaRef ds:uri="http://www.w3.org/XML/1998/namespace"/>
   </ds:schemaRefs>
 </ds:datastoreItem>
+</file>
+
+<file path=customXml/itemProps3.xml><?xml version="1.0" encoding="utf-8"?>
+<ds:datastoreItem xmlns:ds="http://schemas.openxmlformats.org/officeDocument/2006/customXml" ds:itemID="{B0C07E3D-60A7-4F4E-8208-D9CCD01982CB}">
+  <ds:schemaRefs>
+    <ds:schemaRef ds:uri="http://schemas.microsoft.com/sharepoint/v3/contenttype/forms"/>
+  </ds:schemaRefs>
+</ds:datastoreItem>
 </file>
</xml_diff>